<commit_message>
fixes resolution for template and data import sheets
</commit_message>
<xml_diff>
--- a/powerpoints/data-import.pptx
+++ b/powerpoints/data-import.pptx
@@ -4296,225 +4296,9 @@
           </a:p>
         </p:txBody>
       </p:sp>
-      <p:grpSp>
-        <p:nvGrpSpPr>
-          <p:cNvPr id="152" name="Group"/>
-          <p:cNvGrpSpPr/>
-          <p:nvPr/>
-        </p:nvGrpSpPr>
-        <p:grpSpPr>
-          <a:xfrm>
-            <a:off x="333196" y="1268279"/>
-            <a:ext cx="3067130" cy="1752601"/>
-            <a:chOff x="0" y="0"/>
-            <a:chExt cx="3067128" cy="1752600"/>
-          </a:xfrm>
-        </p:grpSpPr>
-        <p:sp>
-          <p:nvSpPr>
-            <p:cNvPr id="149" name="R’s tidyverse is built around tidy data stored in  tibbles, which are enhanced data frames.…"/>
-            <p:cNvSpPr txBox="1"/>
-            <p:nvPr/>
-          </p:nvSpPr>
-          <p:spPr>
-            <a:xfrm>
-              <a:off x="0" y="0"/>
-              <a:ext cx="3067129" cy="1752600"/>
-            </a:xfrm>
-            <a:prstGeom prst="rect">
-              <a:avLst/>
-            </a:prstGeom>
-            <a:noFill/>
-            <a:ln w="12700" cap="flat">
-              <a:noFill/>
-              <a:miter lim="400000"/>
-            </a:ln>
-            <a:effectLst/>
-            <a:extLst>
-              <a:ext uri="{C572A759-6A51-4108-AA02-DFA0A04FC94B}">
-                <ma14:wrappingTextBoxFlag xmlns:ma14="http://schemas.microsoft.com/office/mac/drawingml/2011/main" val="1"/>
-              </a:ext>
-            </a:extLst>
-          </p:spPr>
-          <p:txBody>
-            <a:bodyPr wrap="square" lIns="50800" tIns="50800" rIns="50800" bIns="50800" numCol="1" anchor="t">
-              <a:spAutoFit/>
-            </a:bodyPr>
-            <a:lstStyle/>
-            <a:p>
-              <a:pPr>
-                <a:spcBef>
-                  <a:spcPts val="500"/>
-                </a:spcBef>
-                <a:buClr>
-                  <a:srgbClr val="F39019"/>
-                </a:buClr>
-                <a:defRPr b="0">
-                  <a:solidFill>
-                    <a:srgbClr val="000000"/>
-                  </a:solidFill>
-                </a:defRPr>
-              </a:pPr>
-              <a:r>
-                <a:t>R’s</a:t>
-              </a:r>
-              <a:r>
-                <a:rPr b="1"/>
-                <a:t> </a:t>
-              </a:r>
-              <a:r>
-                <a:rPr b="1"/>
-                <a:t>tidyverse</a:t>
-              </a:r>
-              <a:r>
-                <a:t> is built around </a:t>
-              </a:r>
-              <a:r>
-                <a:rPr b="1"/>
-                <a:t>tidy data</a:t>
-              </a:r>
-              <a:r>
-                <a:t> stored in  </a:t>
-              </a:r>
-              <a:r>
-                <a:rPr b="1"/>
-                <a:t>tibbles</a:t>
-              </a:r>
-              <a:r>
-                <a:t>, which are enhanced data frames. </a:t>
-              </a:r>
-            </a:p>
-            <a:p>
-              <a:pPr marL="114300">
-                <a:spcBef>
-                  <a:spcPts val="500"/>
-                </a:spcBef>
-                <a:buClr>
-                  <a:srgbClr val="FF7E79"/>
-                </a:buClr>
-                <a:defRPr b="0">
-                  <a:solidFill>
-                    <a:srgbClr val="000000"/>
-                  </a:solidFill>
-                </a:defRPr>
-              </a:pPr>
-              <a:r>
-                <a:t>The front side of this sheet shows how to read text files into R with </a:t>
-              </a:r>
-              <a:r>
-                <a:rPr b="1"/>
-                <a:t>readr</a:t>
-              </a:r>
-              <a:r>
-                <a:t>.</a:t>
-              </a:r>
-            </a:p>
-            <a:p>
-              <a:pPr marL="114300">
-                <a:spcBef>
-                  <a:spcPts val="300"/>
-                </a:spcBef>
-                <a:buClr>
-                  <a:srgbClr val="FF7E79"/>
-                </a:buClr>
-                <a:defRPr b="0">
-                  <a:solidFill>
-                    <a:srgbClr val="000000"/>
-                  </a:solidFill>
-                </a:defRPr>
-              </a:pPr>
-              <a:r>
-                <a:t>The reverse side shows how to create tibbles with </a:t>
-              </a:r>
-              <a:r>
-                <a:rPr b="1"/>
-                <a:t>tibble</a:t>
-              </a:r>
-              <a:r>
-                <a:t> and to layout tidy data with </a:t>
-              </a:r>
-              <a:r>
-                <a:rPr b="1"/>
-                <a:t>tidyr</a:t>
-              </a:r>
-              <a:r>
-                <a:t>. </a:t>
-              </a:r>
-            </a:p>
-          </p:txBody>
-        </p:sp>
-        <p:pic>
-          <p:nvPicPr>
-            <p:cNvPr id="150" name="Image" descr="Image"/>
-            <p:cNvPicPr>
-              <a:picLocks noChangeAspect="1"/>
-            </p:cNvPicPr>
-            <p:nvPr/>
-          </p:nvPicPr>
-          <p:blipFill>
-            <a:blip r:embed="rId2">
-              <a:extLst/>
-            </a:blip>
-            <a:stretch>
-              <a:fillRect/>
-            </a:stretch>
-          </p:blipFill>
-          <p:spPr>
-            <a:xfrm>
-              <a:off x="123747" y="472536"/>
-              <a:ext cx="533401" cy="599716"/>
-            </a:xfrm>
-            <a:prstGeom prst="rect">
-              <a:avLst/>
-            </a:prstGeom>
-            <a:ln w="12700" cap="flat">
-              <a:noFill/>
-              <a:miter lim="400000"/>
-            </a:ln>
-            <a:effectLst/>
-          </p:spPr>
-        </p:pic>
-        <p:pic>
-          <p:nvPicPr>
-            <p:cNvPr id="151" name="tidyr.png" descr="tidyr.png"/>
-            <p:cNvPicPr>
-              <a:picLocks noChangeAspect="1"/>
-            </p:cNvPicPr>
-            <p:nvPr/>
-          </p:nvPicPr>
-          <p:blipFill>
-            <a:blip r:embed="rId3">
-              <a:extLst/>
-            </a:blip>
-            <a:stretch>
-              <a:fillRect/>
-            </a:stretch>
-          </p:blipFill>
-          <p:spPr>
-            <a:xfrm>
-              <a:off x="149147" y="1085563"/>
-              <a:ext cx="476928" cy="552744"/>
-            </a:xfrm>
-            <a:prstGeom prst="rect">
-              <a:avLst/>
-            </a:prstGeom>
-            <a:ln w="12700" cap="flat">
-              <a:noFill/>
-              <a:miter lim="400000"/>
-            </a:ln>
-            <a:effectLst>
-              <a:outerShdw sx="100000" sy="100000" kx="0" ky="0" algn="b" rotWithShape="0" blurRad="12700" dist="12700" dir="5400000">
-                <a:srgbClr val="000000">
-                  <a:alpha val="50000"/>
-                </a:srgbClr>
-              </a:outerShdw>
-            </a:effectLst>
-          </p:spPr>
-        </p:pic>
-      </p:grpSp>
       <p:sp>
         <p:nvSpPr>
-          <p:cNvPr id="153" name="Save Data"/>
+          <p:cNvPr id="149" name="Save Data"/>
           <p:cNvSpPr txBox="1"/>
           <p:nvPr/>
         </p:nvSpPr>
@@ -4566,7 +4350,7 @@
       </p:sp>
       <p:sp>
         <p:nvSpPr>
-          <p:cNvPr id="154" name="Line"/>
+          <p:cNvPr id="150" name="Line"/>
           <p:cNvSpPr/>
           <p:nvPr/>
         </p:nvSpPr>
@@ -4607,7 +4391,7 @@
       </p:sp>
       <p:sp>
         <p:nvSpPr>
-          <p:cNvPr id="155" name="Data Import : : CHEAT SHEET"/>
+          <p:cNvPr id="151" name="Data Import : : CHEAT SHEET"/>
           <p:cNvSpPr txBox="1"/>
           <p:nvPr>
             <p:ph type="title"/>
@@ -4647,7 +4431,7 @@
       </p:sp>
       <p:sp>
         <p:nvSpPr>
-          <p:cNvPr id="156" name="Line"/>
+          <p:cNvPr id="152" name="Line"/>
           <p:cNvSpPr/>
           <p:nvPr/>
         </p:nvSpPr>
@@ -4688,7 +4472,7 @@
       </p:sp>
       <p:sp>
         <p:nvSpPr>
-          <p:cNvPr id="157" name="Read Tabular Data - These functions share the common arguments:"/>
+          <p:cNvPr id="153" name="Read Tabular Data - These functions share the common arguments:"/>
           <p:cNvSpPr txBox="1"/>
           <p:nvPr/>
         </p:nvSpPr>
@@ -4745,7 +4529,7 @@
       </p:sp>
       <p:sp>
         <p:nvSpPr>
-          <p:cNvPr id="158" name="Line"/>
+          <p:cNvPr id="154" name="Line"/>
           <p:cNvSpPr/>
           <p:nvPr/>
         </p:nvSpPr>
@@ -4786,7 +4570,7 @@
       </p:sp>
       <p:sp>
         <p:nvSpPr>
-          <p:cNvPr id="159" name="Data types"/>
+          <p:cNvPr id="155" name="Data types"/>
           <p:cNvSpPr txBox="1"/>
           <p:nvPr/>
         </p:nvSpPr>
@@ -4838,7 +4622,7 @@
       </p:sp>
       <p:sp>
         <p:nvSpPr>
-          <p:cNvPr id="160" name="Line"/>
+          <p:cNvPr id="156" name="Line"/>
           <p:cNvSpPr/>
           <p:nvPr/>
         </p:nvSpPr>
@@ -4879,7 +4663,7 @@
       </p:sp>
       <p:sp>
         <p:nvSpPr>
-          <p:cNvPr id="161" name="USEFUL ARGUMENTS"/>
+          <p:cNvPr id="157" name="USEFUL ARGUMENTS"/>
           <p:cNvSpPr txBox="1"/>
           <p:nvPr/>
         </p:nvSpPr>
@@ -4915,7 +4699,7 @@
       </p:sp>
       <p:sp>
         <p:nvSpPr>
-          <p:cNvPr id="162" name="Line"/>
+          <p:cNvPr id="158" name="Line"/>
           <p:cNvSpPr/>
           <p:nvPr/>
         </p:nvSpPr>
@@ -4956,67 +4740,9 @@
           </a:p>
         </p:txBody>
       </p:sp>
-      <p:pic>
-        <p:nvPicPr>
-          <p:cNvPr id="163" name="readr.png" descr="readr.png"/>
-          <p:cNvPicPr>
-            <a:picLocks noChangeAspect="1"/>
-          </p:cNvPicPr>
-          <p:nvPr/>
-        </p:nvPicPr>
-        <p:blipFill>
-          <a:blip r:embed="rId4">
-            <a:extLst/>
-          </a:blip>
-          <a:stretch>
-            <a:fillRect/>
-          </a:stretch>
-        </p:blipFill>
-        <p:spPr>
-          <a:xfrm>
-            <a:off x="12294644" y="198849"/>
-            <a:ext cx="1378971" cy="1598182"/>
-          </a:xfrm>
-          <a:prstGeom prst="rect">
-            <a:avLst/>
-          </a:prstGeom>
-          <a:ln w="12700">
-            <a:miter lim="400000"/>
-          </a:ln>
-        </p:spPr>
-      </p:pic>
-      <p:pic>
-        <p:nvPicPr>
-          <p:cNvPr id="164" name="Image" descr="Image"/>
-          <p:cNvPicPr>
-            <a:picLocks noChangeAspect="1"/>
-          </p:cNvPicPr>
-          <p:nvPr/>
-        </p:nvPicPr>
-        <p:blipFill>
-          <a:blip r:embed="rId5">
-            <a:extLst/>
-          </a:blip>
-          <a:stretch>
-            <a:fillRect/>
-          </a:stretch>
-        </p:blipFill>
-        <p:spPr>
-          <a:xfrm>
-            <a:off x="238823" y="9978474"/>
-            <a:ext cx="1754521" cy="616478"/>
-          </a:xfrm>
-          <a:prstGeom prst="rect">
-            <a:avLst/>
-          </a:prstGeom>
-          <a:ln w="12700">
-            <a:miter lim="400000"/>
-          </a:ln>
-        </p:spPr>
-      </p:pic>
       <p:sp>
         <p:nvSpPr>
-          <p:cNvPr id="165" name="Line"/>
+          <p:cNvPr id="159" name="Line"/>
           <p:cNvSpPr/>
           <p:nvPr/>
         </p:nvSpPr>
@@ -5057,7 +4783,7 @@
       </p:sp>
       <p:sp>
         <p:nvSpPr>
-          <p:cNvPr id="166" name="OTHER TYPES OF DATA"/>
+          <p:cNvPr id="160" name="OTHER TYPES OF DATA"/>
           <p:cNvSpPr txBox="1"/>
           <p:nvPr/>
         </p:nvSpPr>
@@ -5111,7 +4837,7 @@
       </p:sp>
       <p:sp>
         <p:nvSpPr>
-          <p:cNvPr id="167" name="Comma delimited file…"/>
+          <p:cNvPr id="161" name="Comma delimited file…"/>
           <p:cNvSpPr txBox="1"/>
           <p:nvPr/>
         </p:nvSpPr>
@@ -5475,7 +5201,7 @@
       </p:sp>
       <p:sp>
         <p:nvSpPr>
-          <p:cNvPr id="168" name="Save x, an R object, to path, a file path, as:"/>
+          <p:cNvPr id="162" name="Save x, an R object, to path, a file path, as:"/>
           <p:cNvSpPr txBox="1"/>
           <p:nvPr/>
         </p:nvSpPr>
@@ -5553,7 +5279,7 @@
       </p:sp>
       <p:sp>
         <p:nvSpPr>
-          <p:cNvPr id="169" name="Skip lines…"/>
+          <p:cNvPr id="163" name="Skip lines…"/>
           <p:cNvSpPr txBox="1"/>
           <p:nvPr/>
         </p:nvSpPr>
@@ -5775,7 +5501,7 @@
       </p:sp>
       <p:sp>
         <p:nvSpPr>
-          <p:cNvPr id="170" name="Comma Delimited Files…"/>
+          <p:cNvPr id="164" name="Comma Delimited Files…"/>
           <p:cNvSpPr txBox="1"/>
           <p:nvPr/>
         </p:nvSpPr>
@@ -6262,7 +5988,7 @@
       </p:sp>
       <p:grpSp>
         <p:nvGrpSpPr>
-          <p:cNvPr id="175" name="Group"/>
+          <p:cNvPr id="169" name="Group"/>
           <p:cNvGrpSpPr/>
           <p:nvPr/>
         </p:nvGrpSpPr>
@@ -6276,7 +6002,7 @@
         </p:grpSpPr>
         <p:grpSp>
           <p:nvGrpSpPr>
-            <p:cNvPr id="173" name="Group"/>
+            <p:cNvPr id="167" name="Group"/>
             <p:cNvGrpSpPr/>
             <p:nvPr/>
           </p:nvGrpSpPr>
@@ -6290,14 +6016,14 @@
           </p:grpSpPr>
           <p:pic>
             <p:nvPicPr>
-              <p:cNvPr id="171" name="Image" descr="Image"/>
+              <p:cNvPr id="165" name="Image" descr="Image"/>
               <p:cNvPicPr>
                 <a:picLocks noChangeAspect="1"/>
               </p:cNvPicPr>
               <p:nvPr/>
             </p:nvPicPr>
             <p:blipFill>
-              <a:blip r:embed="rId6">
+              <a:blip r:embed="rId2">
                 <a:extLst/>
               </a:blip>
               <a:stretch>
@@ -6327,7 +6053,7 @@
           </p:pic>
           <p:sp>
             <p:nvSpPr>
-              <p:cNvPr id="172" name="Triangle"/>
+              <p:cNvPr id="166" name="Triangle"/>
               <p:cNvSpPr/>
               <p:nvPr/>
             </p:nvSpPr>
@@ -6404,7 +6130,7 @@
         </p:grpSp>
         <p:sp>
           <p:nvSpPr>
-            <p:cNvPr id="174" name="a,b,c…"/>
+            <p:cNvPr id="168" name="a,b,c…"/>
             <p:cNvSpPr txBox="1"/>
             <p:nvPr/>
           </p:nvSpPr>
@@ -6504,7 +6230,7 @@
       </p:grpSp>
       <p:grpSp>
         <p:nvGrpSpPr>
-          <p:cNvPr id="180" name="Group"/>
+          <p:cNvPr id="174" name="Group"/>
           <p:cNvGrpSpPr/>
           <p:nvPr/>
         </p:nvGrpSpPr>
@@ -6518,7 +6244,7 @@
         </p:grpSpPr>
         <p:grpSp>
           <p:nvGrpSpPr>
-            <p:cNvPr id="178" name="Group"/>
+            <p:cNvPr id="172" name="Group"/>
             <p:cNvGrpSpPr/>
             <p:nvPr/>
           </p:nvGrpSpPr>
@@ -6532,14 +6258,14 @@
           </p:grpSpPr>
           <p:pic>
             <p:nvPicPr>
-              <p:cNvPr id="176" name="Image" descr="Image"/>
+              <p:cNvPr id="170" name="Image" descr="Image"/>
               <p:cNvPicPr>
                 <a:picLocks noChangeAspect="1"/>
               </p:cNvPicPr>
               <p:nvPr/>
             </p:nvPicPr>
             <p:blipFill>
-              <a:blip r:embed="rId6">
+              <a:blip r:embed="rId2">
                 <a:extLst/>
               </a:blip>
               <a:stretch>
@@ -6569,7 +6295,7 @@
           </p:pic>
           <p:sp>
             <p:nvSpPr>
-              <p:cNvPr id="177" name="Triangle"/>
+              <p:cNvPr id="171" name="Triangle"/>
               <p:cNvSpPr/>
               <p:nvPr/>
             </p:nvSpPr>
@@ -6646,7 +6372,7 @@
         </p:grpSp>
         <p:sp>
           <p:nvSpPr>
-            <p:cNvPr id="179" name="a;b;c…"/>
+            <p:cNvPr id="173" name="a;b;c…"/>
             <p:cNvSpPr txBox="1"/>
             <p:nvPr/>
           </p:nvSpPr>
@@ -6746,7 +6472,7 @@
       </p:grpSp>
       <p:grpSp>
         <p:nvGrpSpPr>
-          <p:cNvPr id="185" name="Group"/>
+          <p:cNvPr id="179" name="Group"/>
           <p:cNvGrpSpPr/>
           <p:nvPr/>
         </p:nvGrpSpPr>
@@ -6760,7 +6486,7 @@
         </p:grpSpPr>
         <p:grpSp>
           <p:nvGrpSpPr>
-            <p:cNvPr id="183" name="Group"/>
+            <p:cNvPr id="177" name="Group"/>
             <p:cNvGrpSpPr/>
             <p:nvPr/>
           </p:nvGrpSpPr>
@@ -6774,14 +6500,14 @@
           </p:grpSpPr>
           <p:pic>
             <p:nvPicPr>
-              <p:cNvPr id="181" name="Image" descr="Image"/>
+              <p:cNvPr id="175" name="Image" descr="Image"/>
               <p:cNvPicPr>
                 <a:picLocks noChangeAspect="1"/>
               </p:cNvPicPr>
               <p:nvPr/>
             </p:nvPicPr>
             <p:blipFill>
-              <a:blip r:embed="rId6">
+              <a:blip r:embed="rId2">
                 <a:extLst/>
               </a:blip>
               <a:stretch>
@@ -6811,7 +6537,7 @@
           </p:pic>
           <p:sp>
             <p:nvSpPr>
-              <p:cNvPr id="182" name="Triangle"/>
+              <p:cNvPr id="176" name="Triangle"/>
               <p:cNvSpPr/>
               <p:nvPr/>
             </p:nvSpPr>
@@ -6888,7 +6614,7 @@
         </p:grpSp>
         <p:sp>
           <p:nvSpPr>
-            <p:cNvPr id="184" name="a|b|c…"/>
+            <p:cNvPr id="178" name="a|b|c…"/>
             <p:cNvSpPr txBox="1"/>
             <p:nvPr/>
           </p:nvSpPr>
@@ -6988,7 +6714,7 @@
       </p:grpSp>
       <p:grpSp>
         <p:nvGrpSpPr>
-          <p:cNvPr id="190" name="Group"/>
+          <p:cNvPr id="184" name="Group"/>
           <p:cNvGrpSpPr/>
           <p:nvPr/>
         </p:nvGrpSpPr>
@@ -7002,7 +6728,7 @@
         </p:grpSpPr>
         <p:grpSp>
           <p:nvGrpSpPr>
-            <p:cNvPr id="188" name="Group"/>
+            <p:cNvPr id="182" name="Group"/>
             <p:cNvGrpSpPr/>
             <p:nvPr/>
           </p:nvGrpSpPr>
@@ -7016,14 +6742,14 @@
           </p:grpSpPr>
           <p:pic>
             <p:nvPicPr>
-              <p:cNvPr id="186" name="Image" descr="Image"/>
+              <p:cNvPr id="180" name="Image" descr="Image"/>
               <p:cNvPicPr>
                 <a:picLocks noChangeAspect="1"/>
               </p:cNvPicPr>
               <p:nvPr/>
             </p:nvPicPr>
             <p:blipFill>
-              <a:blip r:embed="rId6">
+              <a:blip r:embed="rId2">
                 <a:extLst/>
               </a:blip>
               <a:stretch>
@@ -7053,7 +6779,7 @@
           </p:pic>
           <p:sp>
             <p:nvSpPr>
-              <p:cNvPr id="187" name="Triangle"/>
+              <p:cNvPr id="181" name="Triangle"/>
               <p:cNvSpPr/>
               <p:nvPr/>
             </p:nvSpPr>
@@ -7130,7 +6856,7 @@
         </p:grpSp>
         <p:sp>
           <p:nvSpPr>
-            <p:cNvPr id="189" name="a  b  c…"/>
+            <p:cNvPr id="183" name="a  b  c…"/>
             <p:cNvSpPr txBox="1"/>
             <p:nvPr/>
           </p:nvSpPr>
@@ -7230,7 +6956,7 @@
       </p:grpSp>
       <p:graphicFrame>
         <p:nvGraphicFramePr>
-          <p:cNvPr id="191" name="Table"/>
+          <p:cNvPr id="185" name="Table"/>
           <p:cNvGraphicFramePr/>
           <p:nvPr/>
         </p:nvGraphicFramePr>
@@ -7412,7 +7138,7 @@
       </p:graphicFrame>
       <p:graphicFrame>
         <p:nvGraphicFramePr>
-          <p:cNvPr id="192" name="Table"/>
+          <p:cNvPr id="186" name="Table"/>
           <p:cNvGraphicFramePr/>
           <p:nvPr/>
         </p:nvGraphicFramePr>
@@ -7644,7 +7370,7 @@
       </p:graphicFrame>
       <p:graphicFrame>
         <p:nvGraphicFramePr>
-          <p:cNvPr id="193" name="Table"/>
+          <p:cNvPr id="187" name="Table"/>
           <p:cNvGraphicFramePr/>
           <p:nvPr/>
         </p:nvGraphicFramePr>
@@ -7926,7 +7652,7 @@
       </p:graphicFrame>
       <p:graphicFrame>
         <p:nvGraphicFramePr>
-          <p:cNvPr id="194" name="Table"/>
+          <p:cNvPr id="188" name="Table"/>
           <p:cNvGraphicFramePr/>
           <p:nvPr/>
         </p:nvGraphicFramePr>
@@ -8167,7 +7893,7 @@
       </p:graphicFrame>
       <p:graphicFrame>
         <p:nvGraphicFramePr>
-          <p:cNvPr id="195" name="Table"/>
+          <p:cNvPr id="189" name="Table"/>
           <p:cNvGraphicFramePr/>
           <p:nvPr/>
         </p:nvGraphicFramePr>
@@ -8349,12 +8075,894 @@
       </p:graphicFrame>
       <p:graphicFrame>
         <p:nvGraphicFramePr>
+          <p:cNvPr id="190" name="Table"/>
+          <p:cNvGraphicFramePr/>
+          <p:nvPr/>
+        </p:nvGraphicFramePr>
+        <p:xfrm>
+          <a:off x="5095880" y="2439268"/>
+          <a:ext cx="1188952" cy="1524001"/>
+        </p:xfrm>
+        <a:graphic xmlns:a="http://schemas.openxmlformats.org/drawingml/2006/main">
+          <a:graphicData uri="http://schemas.openxmlformats.org/drawingml/2006/table">
+            <a:tbl>
+              <a:tblPr firstCol="0" firstRow="1" lastCol="0" lastRow="0" bandCol="0" bandRow="0" rtl="0">
+                <a:tableStyleId>{33BA23B1-9221-436E-865A-0063620EA4FD}</a:tableStyleId>
+              </a:tblPr>
+              <a:tblGrid>
+                <a:gridCol w="222840"/>
+                <a:gridCol w="222840"/>
+                <a:gridCol w="222840"/>
+              </a:tblGrid>
+              <a:tr h="160866">
+                <a:tc>
+                  <a:txBody>
+                    <a:bodyPr/>
+                    <a:lstStyle/>
+                    <a:p>
+                      <a:pPr defTabSz="914400">
+                        <a:defRPr b="0">
+                          <a:solidFill>
+                            <a:srgbClr val="000000"/>
+                          </a:solidFill>
+                        </a:defRPr>
+                      </a:pPr>
+                      <a:r>
+                        <a:rPr b="1" sz="900">
+                          <a:solidFill>
+                            <a:srgbClr val="FFFFFF"/>
+                          </a:solidFill>
+                          <a:latin typeface="Helvetica"/>
+                          <a:ea typeface="Helvetica"/>
+                          <a:cs typeface="Helvetica"/>
+                          <a:sym typeface="Helvetica"/>
+                        </a:rPr>
+                        <a:t>A</a:t>
+                      </a:r>
+                    </a:p>
+                  </a:txBody>
+                  <a:tcPr marL="0" marR="0" marT="0" marB="0" anchor="ctr" anchorCtr="0" horzOverflow="overflow">
+                    <a:solidFill>
+                      <a:srgbClr val="797979"/>
+                    </a:solidFill>
+                  </a:tcPr>
+                </a:tc>
+                <a:tc>
+                  <a:txBody>
+                    <a:bodyPr/>
+                    <a:lstStyle/>
+                    <a:p>
+                      <a:pPr defTabSz="914400">
+                        <a:defRPr b="0">
+                          <a:solidFill>
+                            <a:srgbClr val="000000"/>
+                          </a:solidFill>
+                        </a:defRPr>
+                      </a:pPr>
+                      <a:r>
+                        <a:rPr b="1" sz="900">
+                          <a:solidFill>
+                            <a:srgbClr val="FFFFFF"/>
+                          </a:solidFill>
+                          <a:latin typeface="Helvetica"/>
+                          <a:ea typeface="Helvetica"/>
+                          <a:cs typeface="Helvetica"/>
+                          <a:sym typeface="Helvetica"/>
+                        </a:rPr>
+                        <a:t>B</a:t>
+                      </a:r>
+                    </a:p>
+                  </a:txBody>
+                  <a:tcPr marL="0" marR="0" marT="0" marB="0" anchor="ctr" anchorCtr="0" horzOverflow="overflow">
+                    <a:solidFill>
+                      <a:srgbClr val="797979"/>
+                    </a:solidFill>
+                  </a:tcPr>
+                </a:tc>
+                <a:tc>
+                  <a:txBody>
+                    <a:bodyPr/>
+                    <a:lstStyle/>
+                    <a:p>
+                      <a:pPr defTabSz="914400">
+                        <a:defRPr b="0">
+                          <a:solidFill>
+                            <a:srgbClr val="000000"/>
+                          </a:solidFill>
+                        </a:defRPr>
+                      </a:pPr>
+                      <a:r>
+                        <a:rPr b="1" sz="900">
+                          <a:solidFill>
+                            <a:srgbClr val="FFFFFF"/>
+                          </a:solidFill>
+                          <a:latin typeface="Helvetica"/>
+                          <a:ea typeface="Helvetica"/>
+                          <a:cs typeface="Helvetica"/>
+                          <a:sym typeface="Helvetica"/>
+                        </a:rPr>
+                        <a:t>C</a:t>
+                      </a:r>
+                    </a:p>
+                  </a:txBody>
+                  <a:tcPr marL="0" marR="0" marT="0" marB="0" anchor="ctr" anchorCtr="0" horzOverflow="overflow">
+                    <a:solidFill>
+                      <a:srgbClr val="797979"/>
+                    </a:solidFill>
+                  </a:tcPr>
+                </a:tc>
+              </a:tr>
+              <a:tr h="160866">
+                <a:tc>
+                  <a:txBody>
+                    <a:bodyPr/>
+                    <a:lstStyle/>
+                    <a:p>
+                      <a:pPr defTabSz="914400"/>
+                      <a:r>
+                        <a:rPr sz="900">
+                          <a:latin typeface="Helvetica"/>
+                          <a:ea typeface="Helvetica"/>
+                          <a:cs typeface="Helvetica"/>
+                          <a:sym typeface="Helvetica"/>
+                        </a:rPr>
+                        <a:t>1</a:t>
+                      </a:r>
+                    </a:p>
+                  </a:txBody>
+                  <a:tcPr marL="0" marR="0" marT="0" marB="0" anchor="ctr" anchorCtr="0" horzOverflow="overflow"/>
+                </a:tc>
+                <a:tc>
+                  <a:txBody>
+                    <a:bodyPr/>
+                    <a:lstStyle/>
+                    <a:p>
+                      <a:pPr defTabSz="914400"/>
+                      <a:r>
+                        <a:rPr sz="900">
+                          <a:latin typeface="Helvetica"/>
+                          <a:ea typeface="Helvetica"/>
+                          <a:cs typeface="Helvetica"/>
+                          <a:sym typeface="Helvetica"/>
+                        </a:rPr>
+                        <a:t>2</a:t>
+                      </a:r>
+                    </a:p>
+                  </a:txBody>
+                  <a:tcPr marL="0" marR="0" marT="0" marB="0" anchor="ctr" anchorCtr="0" horzOverflow="overflow"/>
+                </a:tc>
+                <a:tc>
+                  <a:txBody>
+                    <a:bodyPr/>
+                    <a:lstStyle/>
+                    <a:p>
+                      <a:pPr defTabSz="914400"/>
+                      <a:r>
+                        <a:rPr sz="900">
+                          <a:latin typeface="Helvetica"/>
+                          <a:ea typeface="Helvetica"/>
+                          <a:cs typeface="Helvetica"/>
+                          <a:sym typeface="Helvetica"/>
+                        </a:rPr>
+                        <a:t>3</a:t>
+                      </a:r>
+                    </a:p>
+                  </a:txBody>
+                  <a:tcPr marL="0" marR="0" marT="0" marB="0" anchor="ctr" anchorCtr="0" horzOverflow="overflow"/>
+                </a:tc>
+              </a:tr>
+              <a:tr h="160866">
+                <a:tc>
+                  <a:txBody>
+                    <a:bodyPr/>
+                    <a:lstStyle/>
+                    <a:p>
+                      <a:pPr defTabSz="914400"/>
+                      <a:r>
+                        <a:rPr sz="900">
+                          <a:latin typeface="Helvetica"/>
+                          <a:ea typeface="Helvetica"/>
+                          <a:cs typeface="Helvetica"/>
+                          <a:sym typeface="Helvetica"/>
+                        </a:rPr>
+                        <a:t>4</a:t>
+                      </a:r>
+                    </a:p>
+                  </a:txBody>
+                  <a:tcPr marL="0" marR="0" marT="0" marB="0" anchor="ctr" anchorCtr="0" horzOverflow="overflow"/>
+                </a:tc>
+                <a:tc>
+                  <a:txBody>
+                    <a:bodyPr/>
+                    <a:lstStyle/>
+                    <a:p>
+                      <a:pPr defTabSz="914400"/>
+                      <a:r>
+                        <a:rPr sz="900">
+                          <a:latin typeface="Helvetica"/>
+                          <a:ea typeface="Helvetica"/>
+                          <a:cs typeface="Helvetica"/>
+                          <a:sym typeface="Helvetica"/>
+                        </a:rPr>
+                        <a:t>5</a:t>
+                      </a:r>
+                    </a:p>
+                  </a:txBody>
+                  <a:tcPr marL="0" marR="0" marT="0" marB="0" anchor="ctr" anchorCtr="0" horzOverflow="overflow"/>
+                </a:tc>
+                <a:tc>
+                  <a:txBody>
+                    <a:bodyPr/>
+                    <a:lstStyle/>
+                    <a:p>
+                      <a:pPr defTabSz="914400"/>
+                      <a:r>
+                        <a:rPr sz="900">
+                          <a:latin typeface="Helvetica"/>
+                          <a:ea typeface="Helvetica"/>
+                          <a:cs typeface="Helvetica"/>
+                          <a:sym typeface="Helvetica"/>
+                        </a:rPr>
+                        <a:t>NA</a:t>
+                      </a:r>
+                    </a:p>
+                  </a:txBody>
+                  <a:tcPr marL="0" marR="0" marT="0" marB="0" anchor="ctr" anchorCtr="0" horzOverflow="overflow"/>
+                </a:tc>
+              </a:tr>
+            </a:tbl>
+          </a:graphicData>
+        </a:graphic>
+      </p:graphicFrame>
+      <p:sp>
+        <p:nvSpPr>
+          <p:cNvPr id="191" name="Line"/>
+          <p:cNvSpPr/>
+          <p:nvPr/>
+        </p:nvSpPr>
+        <p:spPr>
+          <a:xfrm>
+            <a:off x="4628162" y="2737718"/>
+            <a:ext cx="333334" cy="1"/>
+          </a:xfrm>
+          <a:prstGeom prst="line">
+            <a:avLst/>
+          </a:prstGeom>
+          <a:ln w="25400">
+            <a:solidFill>
+              <a:srgbClr val="53585F"/>
+            </a:solidFill>
+            <a:miter lim="400000"/>
+            <a:tailEnd type="stealth"/>
+          </a:ln>
+        </p:spPr>
+        <p:txBody>
+          <a:bodyPr lIns="0" tIns="0" rIns="0" bIns="0"/>
+          <a:lstStyle/>
+          <a:p>
+            <a:pPr>
+              <a:lnSpc>
+                <a:spcPct val="80000"/>
+              </a:lnSpc>
+              <a:spcBef>
+                <a:spcPts val="0"/>
+              </a:spcBef>
+              <a:defRPr b="0" sz="5600">
+                <a:solidFill>
+                  <a:srgbClr val="000000"/>
+                </a:solidFill>
+                <a:effectLst>
+                  <a:outerShdw sx="100000" sy="100000" kx="0" ky="0" algn="b" rotWithShape="0" blurRad="38100" dist="12700" dir="5400000">
+                    <a:srgbClr val="000000">
+                      <a:alpha val="50000"/>
+                    </a:srgbClr>
+                  </a:outerShdw>
+                </a:effectLst>
+                <a:latin typeface="Gill Sans"/>
+                <a:ea typeface="Gill Sans"/>
+                <a:cs typeface="Gill Sans"/>
+                <a:sym typeface="Gill Sans"/>
+              </a:defRPr>
+            </a:pPr>
+          </a:p>
+        </p:txBody>
+      </p:sp>
+      <p:graphicFrame>
+        <p:nvGraphicFramePr>
+          <p:cNvPr id="192" name="Table"/>
+          <p:cNvGraphicFramePr/>
+          <p:nvPr/>
+        </p:nvGraphicFramePr>
+        <p:xfrm>
+          <a:off x="5095880" y="3259057"/>
+          <a:ext cx="1188952" cy="1524001"/>
+        </p:xfrm>
+        <a:graphic xmlns:a="http://schemas.openxmlformats.org/drawingml/2006/main">
+          <a:graphicData uri="http://schemas.openxmlformats.org/drawingml/2006/table">
+            <a:tbl>
+              <a:tblPr firstCol="0" firstRow="1" lastCol="0" lastRow="0" bandCol="0" bandRow="0" rtl="0">
+                <a:tableStyleId>{33BA23B1-9221-436E-865A-0063620EA4FD}</a:tableStyleId>
+              </a:tblPr>
+              <a:tblGrid>
+                <a:gridCol w="222840"/>
+                <a:gridCol w="222840"/>
+                <a:gridCol w="222840"/>
+              </a:tblGrid>
+              <a:tr h="160866">
+                <a:tc>
+                  <a:txBody>
+                    <a:bodyPr/>
+                    <a:lstStyle/>
+                    <a:p>
+                      <a:pPr defTabSz="914400">
+                        <a:defRPr b="0">
+                          <a:solidFill>
+                            <a:srgbClr val="000000"/>
+                          </a:solidFill>
+                        </a:defRPr>
+                      </a:pPr>
+                      <a:r>
+                        <a:rPr b="1" sz="900">
+                          <a:solidFill>
+                            <a:srgbClr val="FFFFFF"/>
+                          </a:solidFill>
+                          <a:latin typeface="Helvetica"/>
+                          <a:ea typeface="Helvetica"/>
+                          <a:cs typeface="Helvetica"/>
+                          <a:sym typeface="Helvetica"/>
+                        </a:rPr>
+                        <a:t>A</a:t>
+                      </a:r>
+                    </a:p>
+                  </a:txBody>
+                  <a:tcPr marL="0" marR="0" marT="0" marB="0" anchor="ctr" anchorCtr="0" horzOverflow="overflow">
+                    <a:solidFill>
+                      <a:srgbClr val="797979"/>
+                    </a:solidFill>
+                  </a:tcPr>
+                </a:tc>
+                <a:tc>
+                  <a:txBody>
+                    <a:bodyPr/>
+                    <a:lstStyle/>
+                    <a:p>
+                      <a:pPr defTabSz="914400">
+                        <a:defRPr b="0">
+                          <a:solidFill>
+                            <a:srgbClr val="000000"/>
+                          </a:solidFill>
+                        </a:defRPr>
+                      </a:pPr>
+                      <a:r>
+                        <a:rPr b="1" sz="900">
+                          <a:solidFill>
+                            <a:srgbClr val="FFFFFF"/>
+                          </a:solidFill>
+                          <a:latin typeface="Helvetica"/>
+                          <a:ea typeface="Helvetica"/>
+                          <a:cs typeface="Helvetica"/>
+                          <a:sym typeface="Helvetica"/>
+                        </a:rPr>
+                        <a:t>B</a:t>
+                      </a:r>
+                    </a:p>
+                  </a:txBody>
+                  <a:tcPr marL="0" marR="0" marT="0" marB="0" anchor="ctr" anchorCtr="0" horzOverflow="overflow">
+                    <a:solidFill>
+                      <a:srgbClr val="797979"/>
+                    </a:solidFill>
+                  </a:tcPr>
+                </a:tc>
+                <a:tc>
+                  <a:txBody>
+                    <a:bodyPr/>
+                    <a:lstStyle/>
+                    <a:p>
+                      <a:pPr defTabSz="914400">
+                        <a:defRPr b="0">
+                          <a:solidFill>
+                            <a:srgbClr val="000000"/>
+                          </a:solidFill>
+                        </a:defRPr>
+                      </a:pPr>
+                      <a:r>
+                        <a:rPr b="1" sz="900">
+                          <a:solidFill>
+                            <a:srgbClr val="FFFFFF"/>
+                          </a:solidFill>
+                          <a:latin typeface="Helvetica"/>
+                          <a:ea typeface="Helvetica"/>
+                          <a:cs typeface="Helvetica"/>
+                          <a:sym typeface="Helvetica"/>
+                        </a:rPr>
+                        <a:t>C</a:t>
+                      </a:r>
+                    </a:p>
+                  </a:txBody>
+                  <a:tcPr marL="0" marR="0" marT="0" marB="0" anchor="ctr" anchorCtr="0" horzOverflow="overflow">
+                    <a:solidFill>
+                      <a:srgbClr val="797979"/>
+                    </a:solidFill>
+                  </a:tcPr>
+                </a:tc>
+              </a:tr>
+              <a:tr h="160866">
+                <a:tc>
+                  <a:txBody>
+                    <a:bodyPr/>
+                    <a:lstStyle/>
+                    <a:p>
+                      <a:pPr defTabSz="914400"/>
+                      <a:r>
+                        <a:rPr sz="900">
+                          <a:latin typeface="Helvetica"/>
+                          <a:ea typeface="Helvetica"/>
+                          <a:cs typeface="Helvetica"/>
+                          <a:sym typeface="Helvetica"/>
+                        </a:rPr>
+                        <a:t>1</a:t>
+                      </a:r>
+                    </a:p>
+                  </a:txBody>
+                  <a:tcPr marL="0" marR="0" marT="0" marB="0" anchor="ctr" anchorCtr="0" horzOverflow="overflow"/>
+                </a:tc>
+                <a:tc>
+                  <a:txBody>
+                    <a:bodyPr/>
+                    <a:lstStyle/>
+                    <a:p>
+                      <a:pPr defTabSz="914400"/>
+                      <a:r>
+                        <a:rPr sz="900">
+                          <a:latin typeface="Helvetica"/>
+                          <a:ea typeface="Helvetica"/>
+                          <a:cs typeface="Helvetica"/>
+                          <a:sym typeface="Helvetica"/>
+                        </a:rPr>
+                        <a:t>2</a:t>
+                      </a:r>
+                    </a:p>
+                  </a:txBody>
+                  <a:tcPr marL="0" marR="0" marT="0" marB="0" anchor="ctr" anchorCtr="0" horzOverflow="overflow"/>
+                </a:tc>
+                <a:tc>
+                  <a:txBody>
+                    <a:bodyPr/>
+                    <a:lstStyle/>
+                    <a:p>
+                      <a:pPr defTabSz="914400"/>
+                      <a:r>
+                        <a:rPr sz="900">
+                          <a:latin typeface="Helvetica"/>
+                          <a:ea typeface="Helvetica"/>
+                          <a:cs typeface="Helvetica"/>
+                          <a:sym typeface="Helvetica"/>
+                        </a:rPr>
+                        <a:t>3</a:t>
+                      </a:r>
+                    </a:p>
+                  </a:txBody>
+                  <a:tcPr marL="0" marR="0" marT="0" marB="0" anchor="ctr" anchorCtr="0" horzOverflow="overflow"/>
+                </a:tc>
+              </a:tr>
+              <a:tr h="160866">
+                <a:tc>
+                  <a:txBody>
+                    <a:bodyPr/>
+                    <a:lstStyle/>
+                    <a:p>
+                      <a:pPr defTabSz="914400"/>
+                      <a:r>
+                        <a:rPr sz="900">
+                          <a:latin typeface="Helvetica"/>
+                          <a:ea typeface="Helvetica"/>
+                          <a:cs typeface="Helvetica"/>
+                          <a:sym typeface="Helvetica"/>
+                        </a:rPr>
+                        <a:t>4</a:t>
+                      </a:r>
+                    </a:p>
+                  </a:txBody>
+                  <a:tcPr marL="0" marR="0" marT="0" marB="0" anchor="ctr" anchorCtr="0" horzOverflow="overflow"/>
+                </a:tc>
+                <a:tc>
+                  <a:txBody>
+                    <a:bodyPr/>
+                    <a:lstStyle/>
+                    <a:p>
+                      <a:pPr defTabSz="914400"/>
+                      <a:r>
+                        <a:rPr sz="900">
+                          <a:latin typeface="Helvetica"/>
+                          <a:ea typeface="Helvetica"/>
+                          <a:cs typeface="Helvetica"/>
+                          <a:sym typeface="Helvetica"/>
+                        </a:rPr>
+                        <a:t>5</a:t>
+                      </a:r>
+                    </a:p>
+                  </a:txBody>
+                  <a:tcPr marL="0" marR="0" marT="0" marB="0" anchor="ctr" anchorCtr="0" horzOverflow="overflow"/>
+                </a:tc>
+                <a:tc>
+                  <a:txBody>
+                    <a:bodyPr/>
+                    <a:lstStyle/>
+                    <a:p>
+                      <a:pPr defTabSz="914400"/>
+                      <a:r>
+                        <a:rPr sz="900">
+                          <a:latin typeface="Helvetica"/>
+                          <a:ea typeface="Helvetica"/>
+                          <a:cs typeface="Helvetica"/>
+                          <a:sym typeface="Helvetica"/>
+                        </a:rPr>
+                        <a:t>NA</a:t>
+                      </a:r>
+                    </a:p>
+                  </a:txBody>
+                  <a:tcPr marL="0" marR="0" marT="0" marB="0" anchor="ctr" anchorCtr="0" horzOverflow="overflow"/>
+                </a:tc>
+              </a:tr>
+            </a:tbl>
+          </a:graphicData>
+        </a:graphic>
+      </p:graphicFrame>
+      <p:sp>
+        <p:nvSpPr>
+          <p:cNvPr id="193" name="Line"/>
+          <p:cNvSpPr/>
+          <p:nvPr/>
+        </p:nvSpPr>
+        <p:spPr>
+          <a:xfrm>
+            <a:off x="4628162" y="3557507"/>
+            <a:ext cx="333334" cy="1"/>
+          </a:xfrm>
+          <a:prstGeom prst="line">
+            <a:avLst/>
+          </a:prstGeom>
+          <a:ln w="25400">
+            <a:solidFill>
+              <a:srgbClr val="53585F"/>
+            </a:solidFill>
+            <a:miter lim="400000"/>
+            <a:tailEnd type="stealth"/>
+          </a:ln>
+        </p:spPr>
+        <p:txBody>
+          <a:bodyPr lIns="0" tIns="0" rIns="0" bIns="0"/>
+          <a:lstStyle/>
+          <a:p>
+            <a:pPr>
+              <a:lnSpc>
+                <a:spcPct val="80000"/>
+              </a:lnSpc>
+              <a:spcBef>
+                <a:spcPts val="0"/>
+              </a:spcBef>
+              <a:defRPr b="0" sz="5600">
+                <a:solidFill>
+                  <a:srgbClr val="000000"/>
+                </a:solidFill>
+                <a:effectLst>
+                  <a:outerShdw sx="100000" sy="100000" kx="0" ky="0" algn="b" rotWithShape="0" blurRad="38100" dist="12700" dir="5400000">
+                    <a:srgbClr val="000000">
+                      <a:alpha val="50000"/>
+                    </a:srgbClr>
+                  </a:outerShdw>
+                </a:effectLst>
+                <a:latin typeface="Gill Sans"/>
+                <a:ea typeface="Gill Sans"/>
+                <a:cs typeface="Gill Sans"/>
+                <a:sym typeface="Gill Sans"/>
+              </a:defRPr>
+            </a:pPr>
+          </a:p>
+        </p:txBody>
+      </p:sp>
+      <p:graphicFrame>
+        <p:nvGraphicFramePr>
+          <p:cNvPr id="194" name="Table"/>
+          <p:cNvGraphicFramePr/>
+          <p:nvPr/>
+        </p:nvGraphicFramePr>
+        <p:xfrm>
+          <a:off x="5095880" y="4078846"/>
+          <a:ext cx="1188952" cy="1524001"/>
+        </p:xfrm>
+        <a:graphic xmlns:a="http://schemas.openxmlformats.org/drawingml/2006/main">
+          <a:graphicData uri="http://schemas.openxmlformats.org/drawingml/2006/table">
+            <a:tbl>
+              <a:tblPr firstCol="0" firstRow="1" lastCol="0" lastRow="0" bandCol="0" bandRow="0" rtl="0">
+                <a:tableStyleId>{33BA23B1-9221-436E-865A-0063620EA4FD}</a:tableStyleId>
+              </a:tblPr>
+              <a:tblGrid>
+                <a:gridCol w="222840"/>
+                <a:gridCol w="222840"/>
+                <a:gridCol w="222840"/>
+              </a:tblGrid>
+              <a:tr h="160866">
+                <a:tc>
+                  <a:txBody>
+                    <a:bodyPr/>
+                    <a:lstStyle/>
+                    <a:p>
+                      <a:pPr defTabSz="914400">
+                        <a:defRPr b="0">
+                          <a:solidFill>
+                            <a:srgbClr val="000000"/>
+                          </a:solidFill>
+                        </a:defRPr>
+                      </a:pPr>
+                      <a:r>
+                        <a:rPr b="1" sz="900">
+                          <a:solidFill>
+                            <a:srgbClr val="FFFFFF"/>
+                          </a:solidFill>
+                          <a:latin typeface="Helvetica"/>
+                          <a:ea typeface="Helvetica"/>
+                          <a:cs typeface="Helvetica"/>
+                          <a:sym typeface="Helvetica"/>
+                        </a:rPr>
+                        <a:t>A</a:t>
+                      </a:r>
+                    </a:p>
+                  </a:txBody>
+                  <a:tcPr marL="0" marR="0" marT="0" marB="0" anchor="ctr" anchorCtr="0" horzOverflow="overflow">
+                    <a:solidFill>
+                      <a:srgbClr val="797979"/>
+                    </a:solidFill>
+                  </a:tcPr>
+                </a:tc>
+                <a:tc>
+                  <a:txBody>
+                    <a:bodyPr/>
+                    <a:lstStyle/>
+                    <a:p>
+                      <a:pPr defTabSz="914400">
+                        <a:defRPr b="0">
+                          <a:solidFill>
+                            <a:srgbClr val="000000"/>
+                          </a:solidFill>
+                        </a:defRPr>
+                      </a:pPr>
+                      <a:r>
+                        <a:rPr b="1" sz="900">
+                          <a:solidFill>
+                            <a:srgbClr val="FFFFFF"/>
+                          </a:solidFill>
+                          <a:latin typeface="Helvetica"/>
+                          <a:ea typeface="Helvetica"/>
+                          <a:cs typeface="Helvetica"/>
+                          <a:sym typeface="Helvetica"/>
+                        </a:rPr>
+                        <a:t>B</a:t>
+                      </a:r>
+                    </a:p>
+                  </a:txBody>
+                  <a:tcPr marL="0" marR="0" marT="0" marB="0" anchor="ctr" anchorCtr="0" horzOverflow="overflow">
+                    <a:solidFill>
+                      <a:srgbClr val="797979"/>
+                    </a:solidFill>
+                  </a:tcPr>
+                </a:tc>
+                <a:tc>
+                  <a:txBody>
+                    <a:bodyPr/>
+                    <a:lstStyle/>
+                    <a:p>
+                      <a:pPr defTabSz="914400">
+                        <a:defRPr b="0">
+                          <a:solidFill>
+                            <a:srgbClr val="000000"/>
+                          </a:solidFill>
+                        </a:defRPr>
+                      </a:pPr>
+                      <a:r>
+                        <a:rPr b="1" sz="900">
+                          <a:solidFill>
+                            <a:srgbClr val="FFFFFF"/>
+                          </a:solidFill>
+                          <a:latin typeface="Helvetica"/>
+                          <a:ea typeface="Helvetica"/>
+                          <a:cs typeface="Helvetica"/>
+                          <a:sym typeface="Helvetica"/>
+                        </a:rPr>
+                        <a:t>C</a:t>
+                      </a:r>
+                    </a:p>
+                  </a:txBody>
+                  <a:tcPr marL="0" marR="0" marT="0" marB="0" anchor="ctr" anchorCtr="0" horzOverflow="overflow">
+                    <a:solidFill>
+                      <a:srgbClr val="797979"/>
+                    </a:solidFill>
+                  </a:tcPr>
+                </a:tc>
+              </a:tr>
+              <a:tr h="160866">
+                <a:tc>
+                  <a:txBody>
+                    <a:bodyPr/>
+                    <a:lstStyle/>
+                    <a:p>
+                      <a:pPr defTabSz="914400"/>
+                      <a:r>
+                        <a:rPr sz="900">
+                          <a:latin typeface="Helvetica"/>
+                          <a:ea typeface="Helvetica"/>
+                          <a:cs typeface="Helvetica"/>
+                          <a:sym typeface="Helvetica"/>
+                        </a:rPr>
+                        <a:t>1</a:t>
+                      </a:r>
+                    </a:p>
+                  </a:txBody>
+                  <a:tcPr marL="0" marR="0" marT="0" marB="0" anchor="ctr" anchorCtr="0" horzOverflow="overflow"/>
+                </a:tc>
+                <a:tc>
+                  <a:txBody>
+                    <a:bodyPr/>
+                    <a:lstStyle/>
+                    <a:p>
+                      <a:pPr defTabSz="914400"/>
+                      <a:r>
+                        <a:rPr sz="900">
+                          <a:latin typeface="Helvetica"/>
+                          <a:ea typeface="Helvetica"/>
+                          <a:cs typeface="Helvetica"/>
+                          <a:sym typeface="Helvetica"/>
+                        </a:rPr>
+                        <a:t>2</a:t>
+                      </a:r>
+                    </a:p>
+                  </a:txBody>
+                  <a:tcPr marL="0" marR="0" marT="0" marB="0" anchor="ctr" anchorCtr="0" horzOverflow="overflow"/>
+                </a:tc>
+                <a:tc>
+                  <a:txBody>
+                    <a:bodyPr/>
+                    <a:lstStyle/>
+                    <a:p>
+                      <a:pPr defTabSz="914400"/>
+                      <a:r>
+                        <a:rPr sz="900">
+                          <a:latin typeface="Helvetica"/>
+                          <a:ea typeface="Helvetica"/>
+                          <a:cs typeface="Helvetica"/>
+                          <a:sym typeface="Helvetica"/>
+                        </a:rPr>
+                        <a:t>3</a:t>
+                      </a:r>
+                    </a:p>
+                  </a:txBody>
+                  <a:tcPr marL="0" marR="0" marT="0" marB="0" anchor="ctr" anchorCtr="0" horzOverflow="overflow"/>
+                </a:tc>
+              </a:tr>
+              <a:tr h="160866">
+                <a:tc>
+                  <a:txBody>
+                    <a:bodyPr/>
+                    <a:lstStyle/>
+                    <a:p>
+                      <a:pPr defTabSz="914400"/>
+                      <a:r>
+                        <a:rPr sz="900">
+                          <a:latin typeface="Helvetica"/>
+                          <a:ea typeface="Helvetica"/>
+                          <a:cs typeface="Helvetica"/>
+                          <a:sym typeface="Helvetica"/>
+                        </a:rPr>
+                        <a:t>4</a:t>
+                      </a:r>
+                    </a:p>
+                  </a:txBody>
+                  <a:tcPr marL="0" marR="0" marT="0" marB="0" anchor="ctr" anchorCtr="0" horzOverflow="overflow"/>
+                </a:tc>
+                <a:tc>
+                  <a:txBody>
+                    <a:bodyPr/>
+                    <a:lstStyle/>
+                    <a:p>
+                      <a:pPr defTabSz="914400"/>
+                      <a:r>
+                        <a:rPr sz="900">
+                          <a:latin typeface="Helvetica"/>
+                          <a:ea typeface="Helvetica"/>
+                          <a:cs typeface="Helvetica"/>
+                          <a:sym typeface="Helvetica"/>
+                        </a:rPr>
+                        <a:t>5</a:t>
+                      </a:r>
+                    </a:p>
+                  </a:txBody>
+                  <a:tcPr marL="0" marR="0" marT="0" marB="0" anchor="ctr" anchorCtr="0" horzOverflow="overflow"/>
+                </a:tc>
+                <a:tc>
+                  <a:txBody>
+                    <a:bodyPr/>
+                    <a:lstStyle/>
+                    <a:p>
+                      <a:pPr defTabSz="914400"/>
+                      <a:r>
+                        <a:rPr sz="900">
+                          <a:latin typeface="Helvetica"/>
+                          <a:ea typeface="Helvetica"/>
+                          <a:cs typeface="Helvetica"/>
+                          <a:sym typeface="Helvetica"/>
+                        </a:rPr>
+                        <a:t>NA</a:t>
+                      </a:r>
+                    </a:p>
+                  </a:txBody>
+                  <a:tcPr marL="0" marR="0" marT="0" marB="0" anchor="ctr" anchorCtr="0" horzOverflow="overflow"/>
+                </a:tc>
+              </a:tr>
+            </a:tbl>
+          </a:graphicData>
+        </a:graphic>
+      </p:graphicFrame>
+      <p:sp>
+        <p:nvSpPr>
+          <p:cNvPr id="195" name="Line"/>
+          <p:cNvSpPr/>
+          <p:nvPr/>
+        </p:nvSpPr>
+        <p:spPr>
+          <a:xfrm>
+            <a:off x="4628162" y="4377296"/>
+            <a:ext cx="333334" cy="1"/>
+          </a:xfrm>
+          <a:prstGeom prst="line">
+            <a:avLst/>
+          </a:prstGeom>
+          <a:ln w="25400">
+            <a:solidFill>
+              <a:srgbClr val="53585F"/>
+            </a:solidFill>
+            <a:miter lim="400000"/>
+            <a:tailEnd type="stealth"/>
+          </a:ln>
+        </p:spPr>
+        <p:txBody>
+          <a:bodyPr lIns="0" tIns="0" rIns="0" bIns="0"/>
+          <a:lstStyle/>
+          <a:p>
+            <a:pPr>
+              <a:lnSpc>
+                <a:spcPct val="80000"/>
+              </a:lnSpc>
+              <a:spcBef>
+                <a:spcPts val="0"/>
+              </a:spcBef>
+              <a:defRPr b="0" sz="5600">
+                <a:solidFill>
+                  <a:srgbClr val="000000"/>
+                </a:solidFill>
+                <a:effectLst>
+                  <a:outerShdw sx="100000" sy="100000" kx="0" ky="0" algn="b" rotWithShape="0" blurRad="38100" dist="12700" dir="5400000">
+                    <a:srgbClr val="000000">
+                      <a:alpha val="50000"/>
+                    </a:srgbClr>
+                  </a:outerShdw>
+                </a:effectLst>
+                <a:latin typeface="Gill Sans"/>
+                <a:ea typeface="Gill Sans"/>
+                <a:cs typeface="Gill Sans"/>
+                <a:sym typeface="Gill Sans"/>
+              </a:defRPr>
+            </a:pPr>
+          </a:p>
+        </p:txBody>
+      </p:sp>
+      <p:graphicFrame>
+        <p:nvGraphicFramePr>
           <p:cNvPr id="196" name="Table"/>
           <p:cNvGraphicFramePr/>
           <p:nvPr/>
         </p:nvGraphicFramePr>
         <p:xfrm>
-          <a:off x="5095880" y="2439268"/>
+          <a:off x="5095880" y="4898635"/>
           <a:ext cx="1188952" cy="1524001"/>
         </p:xfrm>
         <a:graphic xmlns:a="http://schemas.openxmlformats.org/drawingml/2006/main">
@@ -8596,888 +9204,6 @@
         </p:nvSpPr>
         <p:spPr>
           <a:xfrm>
-            <a:off x="4628162" y="2737718"/>
-            <a:ext cx="333334" cy="1"/>
-          </a:xfrm>
-          <a:prstGeom prst="line">
-            <a:avLst/>
-          </a:prstGeom>
-          <a:ln w="25400">
-            <a:solidFill>
-              <a:srgbClr val="53585F"/>
-            </a:solidFill>
-            <a:miter lim="400000"/>
-            <a:tailEnd type="stealth"/>
-          </a:ln>
-        </p:spPr>
-        <p:txBody>
-          <a:bodyPr lIns="0" tIns="0" rIns="0" bIns="0"/>
-          <a:lstStyle/>
-          <a:p>
-            <a:pPr>
-              <a:lnSpc>
-                <a:spcPct val="80000"/>
-              </a:lnSpc>
-              <a:spcBef>
-                <a:spcPts val="0"/>
-              </a:spcBef>
-              <a:defRPr b="0" sz="5600">
-                <a:solidFill>
-                  <a:srgbClr val="000000"/>
-                </a:solidFill>
-                <a:effectLst>
-                  <a:outerShdw sx="100000" sy="100000" kx="0" ky="0" algn="b" rotWithShape="0" blurRad="38100" dist="12700" dir="5400000">
-                    <a:srgbClr val="000000">
-                      <a:alpha val="50000"/>
-                    </a:srgbClr>
-                  </a:outerShdw>
-                </a:effectLst>
-                <a:latin typeface="Gill Sans"/>
-                <a:ea typeface="Gill Sans"/>
-                <a:cs typeface="Gill Sans"/>
-                <a:sym typeface="Gill Sans"/>
-              </a:defRPr>
-            </a:pPr>
-          </a:p>
-        </p:txBody>
-      </p:sp>
-      <p:graphicFrame>
-        <p:nvGraphicFramePr>
-          <p:cNvPr id="198" name="Table"/>
-          <p:cNvGraphicFramePr/>
-          <p:nvPr/>
-        </p:nvGraphicFramePr>
-        <p:xfrm>
-          <a:off x="5095880" y="3259057"/>
-          <a:ext cx="1188952" cy="1524001"/>
-        </p:xfrm>
-        <a:graphic xmlns:a="http://schemas.openxmlformats.org/drawingml/2006/main">
-          <a:graphicData uri="http://schemas.openxmlformats.org/drawingml/2006/table">
-            <a:tbl>
-              <a:tblPr firstCol="0" firstRow="1" lastCol="0" lastRow="0" bandCol="0" bandRow="0" rtl="0">
-                <a:tableStyleId>{33BA23B1-9221-436E-865A-0063620EA4FD}</a:tableStyleId>
-              </a:tblPr>
-              <a:tblGrid>
-                <a:gridCol w="222840"/>
-                <a:gridCol w="222840"/>
-                <a:gridCol w="222840"/>
-              </a:tblGrid>
-              <a:tr h="160866">
-                <a:tc>
-                  <a:txBody>
-                    <a:bodyPr/>
-                    <a:lstStyle/>
-                    <a:p>
-                      <a:pPr defTabSz="914400">
-                        <a:defRPr b="0">
-                          <a:solidFill>
-                            <a:srgbClr val="000000"/>
-                          </a:solidFill>
-                        </a:defRPr>
-                      </a:pPr>
-                      <a:r>
-                        <a:rPr b="1" sz="900">
-                          <a:solidFill>
-                            <a:srgbClr val="FFFFFF"/>
-                          </a:solidFill>
-                          <a:latin typeface="Helvetica"/>
-                          <a:ea typeface="Helvetica"/>
-                          <a:cs typeface="Helvetica"/>
-                          <a:sym typeface="Helvetica"/>
-                        </a:rPr>
-                        <a:t>A</a:t>
-                      </a:r>
-                    </a:p>
-                  </a:txBody>
-                  <a:tcPr marL="0" marR="0" marT="0" marB="0" anchor="ctr" anchorCtr="0" horzOverflow="overflow">
-                    <a:solidFill>
-                      <a:srgbClr val="797979"/>
-                    </a:solidFill>
-                  </a:tcPr>
-                </a:tc>
-                <a:tc>
-                  <a:txBody>
-                    <a:bodyPr/>
-                    <a:lstStyle/>
-                    <a:p>
-                      <a:pPr defTabSz="914400">
-                        <a:defRPr b="0">
-                          <a:solidFill>
-                            <a:srgbClr val="000000"/>
-                          </a:solidFill>
-                        </a:defRPr>
-                      </a:pPr>
-                      <a:r>
-                        <a:rPr b="1" sz="900">
-                          <a:solidFill>
-                            <a:srgbClr val="FFFFFF"/>
-                          </a:solidFill>
-                          <a:latin typeface="Helvetica"/>
-                          <a:ea typeface="Helvetica"/>
-                          <a:cs typeface="Helvetica"/>
-                          <a:sym typeface="Helvetica"/>
-                        </a:rPr>
-                        <a:t>B</a:t>
-                      </a:r>
-                    </a:p>
-                  </a:txBody>
-                  <a:tcPr marL="0" marR="0" marT="0" marB="0" anchor="ctr" anchorCtr="0" horzOverflow="overflow">
-                    <a:solidFill>
-                      <a:srgbClr val="797979"/>
-                    </a:solidFill>
-                  </a:tcPr>
-                </a:tc>
-                <a:tc>
-                  <a:txBody>
-                    <a:bodyPr/>
-                    <a:lstStyle/>
-                    <a:p>
-                      <a:pPr defTabSz="914400">
-                        <a:defRPr b="0">
-                          <a:solidFill>
-                            <a:srgbClr val="000000"/>
-                          </a:solidFill>
-                        </a:defRPr>
-                      </a:pPr>
-                      <a:r>
-                        <a:rPr b="1" sz="900">
-                          <a:solidFill>
-                            <a:srgbClr val="FFFFFF"/>
-                          </a:solidFill>
-                          <a:latin typeface="Helvetica"/>
-                          <a:ea typeface="Helvetica"/>
-                          <a:cs typeface="Helvetica"/>
-                          <a:sym typeface="Helvetica"/>
-                        </a:rPr>
-                        <a:t>C</a:t>
-                      </a:r>
-                    </a:p>
-                  </a:txBody>
-                  <a:tcPr marL="0" marR="0" marT="0" marB="0" anchor="ctr" anchorCtr="0" horzOverflow="overflow">
-                    <a:solidFill>
-                      <a:srgbClr val="797979"/>
-                    </a:solidFill>
-                  </a:tcPr>
-                </a:tc>
-              </a:tr>
-              <a:tr h="160866">
-                <a:tc>
-                  <a:txBody>
-                    <a:bodyPr/>
-                    <a:lstStyle/>
-                    <a:p>
-                      <a:pPr defTabSz="914400"/>
-                      <a:r>
-                        <a:rPr sz="900">
-                          <a:latin typeface="Helvetica"/>
-                          <a:ea typeface="Helvetica"/>
-                          <a:cs typeface="Helvetica"/>
-                          <a:sym typeface="Helvetica"/>
-                        </a:rPr>
-                        <a:t>1</a:t>
-                      </a:r>
-                    </a:p>
-                  </a:txBody>
-                  <a:tcPr marL="0" marR="0" marT="0" marB="0" anchor="ctr" anchorCtr="0" horzOverflow="overflow"/>
-                </a:tc>
-                <a:tc>
-                  <a:txBody>
-                    <a:bodyPr/>
-                    <a:lstStyle/>
-                    <a:p>
-                      <a:pPr defTabSz="914400"/>
-                      <a:r>
-                        <a:rPr sz="900">
-                          <a:latin typeface="Helvetica"/>
-                          <a:ea typeface="Helvetica"/>
-                          <a:cs typeface="Helvetica"/>
-                          <a:sym typeface="Helvetica"/>
-                        </a:rPr>
-                        <a:t>2</a:t>
-                      </a:r>
-                    </a:p>
-                  </a:txBody>
-                  <a:tcPr marL="0" marR="0" marT="0" marB="0" anchor="ctr" anchorCtr="0" horzOverflow="overflow"/>
-                </a:tc>
-                <a:tc>
-                  <a:txBody>
-                    <a:bodyPr/>
-                    <a:lstStyle/>
-                    <a:p>
-                      <a:pPr defTabSz="914400"/>
-                      <a:r>
-                        <a:rPr sz="900">
-                          <a:latin typeface="Helvetica"/>
-                          <a:ea typeface="Helvetica"/>
-                          <a:cs typeface="Helvetica"/>
-                          <a:sym typeface="Helvetica"/>
-                        </a:rPr>
-                        <a:t>3</a:t>
-                      </a:r>
-                    </a:p>
-                  </a:txBody>
-                  <a:tcPr marL="0" marR="0" marT="0" marB="0" anchor="ctr" anchorCtr="0" horzOverflow="overflow"/>
-                </a:tc>
-              </a:tr>
-              <a:tr h="160866">
-                <a:tc>
-                  <a:txBody>
-                    <a:bodyPr/>
-                    <a:lstStyle/>
-                    <a:p>
-                      <a:pPr defTabSz="914400"/>
-                      <a:r>
-                        <a:rPr sz="900">
-                          <a:latin typeface="Helvetica"/>
-                          <a:ea typeface="Helvetica"/>
-                          <a:cs typeface="Helvetica"/>
-                          <a:sym typeface="Helvetica"/>
-                        </a:rPr>
-                        <a:t>4</a:t>
-                      </a:r>
-                    </a:p>
-                  </a:txBody>
-                  <a:tcPr marL="0" marR="0" marT="0" marB="0" anchor="ctr" anchorCtr="0" horzOverflow="overflow"/>
-                </a:tc>
-                <a:tc>
-                  <a:txBody>
-                    <a:bodyPr/>
-                    <a:lstStyle/>
-                    <a:p>
-                      <a:pPr defTabSz="914400"/>
-                      <a:r>
-                        <a:rPr sz="900">
-                          <a:latin typeface="Helvetica"/>
-                          <a:ea typeface="Helvetica"/>
-                          <a:cs typeface="Helvetica"/>
-                          <a:sym typeface="Helvetica"/>
-                        </a:rPr>
-                        <a:t>5</a:t>
-                      </a:r>
-                    </a:p>
-                  </a:txBody>
-                  <a:tcPr marL="0" marR="0" marT="0" marB="0" anchor="ctr" anchorCtr="0" horzOverflow="overflow"/>
-                </a:tc>
-                <a:tc>
-                  <a:txBody>
-                    <a:bodyPr/>
-                    <a:lstStyle/>
-                    <a:p>
-                      <a:pPr defTabSz="914400"/>
-                      <a:r>
-                        <a:rPr sz="900">
-                          <a:latin typeface="Helvetica"/>
-                          <a:ea typeface="Helvetica"/>
-                          <a:cs typeface="Helvetica"/>
-                          <a:sym typeface="Helvetica"/>
-                        </a:rPr>
-                        <a:t>NA</a:t>
-                      </a:r>
-                    </a:p>
-                  </a:txBody>
-                  <a:tcPr marL="0" marR="0" marT="0" marB="0" anchor="ctr" anchorCtr="0" horzOverflow="overflow"/>
-                </a:tc>
-              </a:tr>
-            </a:tbl>
-          </a:graphicData>
-        </a:graphic>
-      </p:graphicFrame>
-      <p:sp>
-        <p:nvSpPr>
-          <p:cNvPr id="199" name="Line"/>
-          <p:cNvSpPr/>
-          <p:nvPr/>
-        </p:nvSpPr>
-        <p:spPr>
-          <a:xfrm>
-            <a:off x="4628162" y="3557507"/>
-            <a:ext cx="333334" cy="1"/>
-          </a:xfrm>
-          <a:prstGeom prst="line">
-            <a:avLst/>
-          </a:prstGeom>
-          <a:ln w="25400">
-            <a:solidFill>
-              <a:srgbClr val="53585F"/>
-            </a:solidFill>
-            <a:miter lim="400000"/>
-            <a:tailEnd type="stealth"/>
-          </a:ln>
-        </p:spPr>
-        <p:txBody>
-          <a:bodyPr lIns="0" tIns="0" rIns="0" bIns="0"/>
-          <a:lstStyle/>
-          <a:p>
-            <a:pPr>
-              <a:lnSpc>
-                <a:spcPct val="80000"/>
-              </a:lnSpc>
-              <a:spcBef>
-                <a:spcPts val="0"/>
-              </a:spcBef>
-              <a:defRPr b="0" sz="5600">
-                <a:solidFill>
-                  <a:srgbClr val="000000"/>
-                </a:solidFill>
-                <a:effectLst>
-                  <a:outerShdw sx="100000" sy="100000" kx="0" ky="0" algn="b" rotWithShape="0" blurRad="38100" dist="12700" dir="5400000">
-                    <a:srgbClr val="000000">
-                      <a:alpha val="50000"/>
-                    </a:srgbClr>
-                  </a:outerShdw>
-                </a:effectLst>
-                <a:latin typeface="Gill Sans"/>
-                <a:ea typeface="Gill Sans"/>
-                <a:cs typeface="Gill Sans"/>
-                <a:sym typeface="Gill Sans"/>
-              </a:defRPr>
-            </a:pPr>
-          </a:p>
-        </p:txBody>
-      </p:sp>
-      <p:graphicFrame>
-        <p:nvGraphicFramePr>
-          <p:cNvPr id="200" name="Table"/>
-          <p:cNvGraphicFramePr/>
-          <p:nvPr/>
-        </p:nvGraphicFramePr>
-        <p:xfrm>
-          <a:off x="5095880" y="4078846"/>
-          <a:ext cx="1188952" cy="1524001"/>
-        </p:xfrm>
-        <a:graphic xmlns:a="http://schemas.openxmlformats.org/drawingml/2006/main">
-          <a:graphicData uri="http://schemas.openxmlformats.org/drawingml/2006/table">
-            <a:tbl>
-              <a:tblPr firstCol="0" firstRow="1" lastCol="0" lastRow="0" bandCol="0" bandRow="0" rtl="0">
-                <a:tableStyleId>{33BA23B1-9221-436E-865A-0063620EA4FD}</a:tableStyleId>
-              </a:tblPr>
-              <a:tblGrid>
-                <a:gridCol w="222840"/>
-                <a:gridCol w="222840"/>
-                <a:gridCol w="222840"/>
-              </a:tblGrid>
-              <a:tr h="160866">
-                <a:tc>
-                  <a:txBody>
-                    <a:bodyPr/>
-                    <a:lstStyle/>
-                    <a:p>
-                      <a:pPr defTabSz="914400">
-                        <a:defRPr b="0">
-                          <a:solidFill>
-                            <a:srgbClr val="000000"/>
-                          </a:solidFill>
-                        </a:defRPr>
-                      </a:pPr>
-                      <a:r>
-                        <a:rPr b="1" sz="900">
-                          <a:solidFill>
-                            <a:srgbClr val="FFFFFF"/>
-                          </a:solidFill>
-                          <a:latin typeface="Helvetica"/>
-                          <a:ea typeface="Helvetica"/>
-                          <a:cs typeface="Helvetica"/>
-                          <a:sym typeface="Helvetica"/>
-                        </a:rPr>
-                        <a:t>A</a:t>
-                      </a:r>
-                    </a:p>
-                  </a:txBody>
-                  <a:tcPr marL="0" marR="0" marT="0" marB="0" anchor="ctr" anchorCtr="0" horzOverflow="overflow">
-                    <a:solidFill>
-                      <a:srgbClr val="797979"/>
-                    </a:solidFill>
-                  </a:tcPr>
-                </a:tc>
-                <a:tc>
-                  <a:txBody>
-                    <a:bodyPr/>
-                    <a:lstStyle/>
-                    <a:p>
-                      <a:pPr defTabSz="914400">
-                        <a:defRPr b="0">
-                          <a:solidFill>
-                            <a:srgbClr val="000000"/>
-                          </a:solidFill>
-                        </a:defRPr>
-                      </a:pPr>
-                      <a:r>
-                        <a:rPr b="1" sz="900">
-                          <a:solidFill>
-                            <a:srgbClr val="FFFFFF"/>
-                          </a:solidFill>
-                          <a:latin typeface="Helvetica"/>
-                          <a:ea typeface="Helvetica"/>
-                          <a:cs typeface="Helvetica"/>
-                          <a:sym typeface="Helvetica"/>
-                        </a:rPr>
-                        <a:t>B</a:t>
-                      </a:r>
-                    </a:p>
-                  </a:txBody>
-                  <a:tcPr marL="0" marR="0" marT="0" marB="0" anchor="ctr" anchorCtr="0" horzOverflow="overflow">
-                    <a:solidFill>
-                      <a:srgbClr val="797979"/>
-                    </a:solidFill>
-                  </a:tcPr>
-                </a:tc>
-                <a:tc>
-                  <a:txBody>
-                    <a:bodyPr/>
-                    <a:lstStyle/>
-                    <a:p>
-                      <a:pPr defTabSz="914400">
-                        <a:defRPr b="0">
-                          <a:solidFill>
-                            <a:srgbClr val="000000"/>
-                          </a:solidFill>
-                        </a:defRPr>
-                      </a:pPr>
-                      <a:r>
-                        <a:rPr b="1" sz="900">
-                          <a:solidFill>
-                            <a:srgbClr val="FFFFFF"/>
-                          </a:solidFill>
-                          <a:latin typeface="Helvetica"/>
-                          <a:ea typeface="Helvetica"/>
-                          <a:cs typeface="Helvetica"/>
-                          <a:sym typeface="Helvetica"/>
-                        </a:rPr>
-                        <a:t>C</a:t>
-                      </a:r>
-                    </a:p>
-                  </a:txBody>
-                  <a:tcPr marL="0" marR="0" marT="0" marB="0" anchor="ctr" anchorCtr="0" horzOverflow="overflow">
-                    <a:solidFill>
-                      <a:srgbClr val="797979"/>
-                    </a:solidFill>
-                  </a:tcPr>
-                </a:tc>
-              </a:tr>
-              <a:tr h="160866">
-                <a:tc>
-                  <a:txBody>
-                    <a:bodyPr/>
-                    <a:lstStyle/>
-                    <a:p>
-                      <a:pPr defTabSz="914400"/>
-                      <a:r>
-                        <a:rPr sz="900">
-                          <a:latin typeface="Helvetica"/>
-                          <a:ea typeface="Helvetica"/>
-                          <a:cs typeface="Helvetica"/>
-                          <a:sym typeface="Helvetica"/>
-                        </a:rPr>
-                        <a:t>1</a:t>
-                      </a:r>
-                    </a:p>
-                  </a:txBody>
-                  <a:tcPr marL="0" marR="0" marT="0" marB="0" anchor="ctr" anchorCtr="0" horzOverflow="overflow"/>
-                </a:tc>
-                <a:tc>
-                  <a:txBody>
-                    <a:bodyPr/>
-                    <a:lstStyle/>
-                    <a:p>
-                      <a:pPr defTabSz="914400"/>
-                      <a:r>
-                        <a:rPr sz="900">
-                          <a:latin typeface="Helvetica"/>
-                          <a:ea typeface="Helvetica"/>
-                          <a:cs typeface="Helvetica"/>
-                          <a:sym typeface="Helvetica"/>
-                        </a:rPr>
-                        <a:t>2</a:t>
-                      </a:r>
-                    </a:p>
-                  </a:txBody>
-                  <a:tcPr marL="0" marR="0" marT="0" marB="0" anchor="ctr" anchorCtr="0" horzOverflow="overflow"/>
-                </a:tc>
-                <a:tc>
-                  <a:txBody>
-                    <a:bodyPr/>
-                    <a:lstStyle/>
-                    <a:p>
-                      <a:pPr defTabSz="914400"/>
-                      <a:r>
-                        <a:rPr sz="900">
-                          <a:latin typeface="Helvetica"/>
-                          <a:ea typeface="Helvetica"/>
-                          <a:cs typeface="Helvetica"/>
-                          <a:sym typeface="Helvetica"/>
-                        </a:rPr>
-                        <a:t>3</a:t>
-                      </a:r>
-                    </a:p>
-                  </a:txBody>
-                  <a:tcPr marL="0" marR="0" marT="0" marB="0" anchor="ctr" anchorCtr="0" horzOverflow="overflow"/>
-                </a:tc>
-              </a:tr>
-              <a:tr h="160866">
-                <a:tc>
-                  <a:txBody>
-                    <a:bodyPr/>
-                    <a:lstStyle/>
-                    <a:p>
-                      <a:pPr defTabSz="914400"/>
-                      <a:r>
-                        <a:rPr sz="900">
-                          <a:latin typeface="Helvetica"/>
-                          <a:ea typeface="Helvetica"/>
-                          <a:cs typeface="Helvetica"/>
-                          <a:sym typeface="Helvetica"/>
-                        </a:rPr>
-                        <a:t>4</a:t>
-                      </a:r>
-                    </a:p>
-                  </a:txBody>
-                  <a:tcPr marL="0" marR="0" marT="0" marB="0" anchor="ctr" anchorCtr="0" horzOverflow="overflow"/>
-                </a:tc>
-                <a:tc>
-                  <a:txBody>
-                    <a:bodyPr/>
-                    <a:lstStyle/>
-                    <a:p>
-                      <a:pPr defTabSz="914400"/>
-                      <a:r>
-                        <a:rPr sz="900">
-                          <a:latin typeface="Helvetica"/>
-                          <a:ea typeface="Helvetica"/>
-                          <a:cs typeface="Helvetica"/>
-                          <a:sym typeface="Helvetica"/>
-                        </a:rPr>
-                        <a:t>5</a:t>
-                      </a:r>
-                    </a:p>
-                  </a:txBody>
-                  <a:tcPr marL="0" marR="0" marT="0" marB="0" anchor="ctr" anchorCtr="0" horzOverflow="overflow"/>
-                </a:tc>
-                <a:tc>
-                  <a:txBody>
-                    <a:bodyPr/>
-                    <a:lstStyle/>
-                    <a:p>
-                      <a:pPr defTabSz="914400"/>
-                      <a:r>
-                        <a:rPr sz="900">
-                          <a:latin typeface="Helvetica"/>
-                          <a:ea typeface="Helvetica"/>
-                          <a:cs typeface="Helvetica"/>
-                          <a:sym typeface="Helvetica"/>
-                        </a:rPr>
-                        <a:t>NA</a:t>
-                      </a:r>
-                    </a:p>
-                  </a:txBody>
-                  <a:tcPr marL="0" marR="0" marT="0" marB="0" anchor="ctr" anchorCtr="0" horzOverflow="overflow"/>
-                </a:tc>
-              </a:tr>
-            </a:tbl>
-          </a:graphicData>
-        </a:graphic>
-      </p:graphicFrame>
-      <p:sp>
-        <p:nvSpPr>
-          <p:cNvPr id="201" name="Line"/>
-          <p:cNvSpPr/>
-          <p:nvPr/>
-        </p:nvSpPr>
-        <p:spPr>
-          <a:xfrm>
-            <a:off x="4628162" y="4377296"/>
-            <a:ext cx="333334" cy="1"/>
-          </a:xfrm>
-          <a:prstGeom prst="line">
-            <a:avLst/>
-          </a:prstGeom>
-          <a:ln w="25400">
-            <a:solidFill>
-              <a:srgbClr val="53585F"/>
-            </a:solidFill>
-            <a:miter lim="400000"/>
-            <a:tailEnd type="stealth"/>
-          </a:ln>
-        </p:spPr>
-        <p:txBody>
-          <a:bodyPr lIns="0" tIns="0" rIns="0" bIns="0"/>
-          <a:lstStyle/>
-          <a:p>
-            <a:pPr>
-              <a:lnSpc>
-                <a:spcPct val="80000"/>
-              </a:lnSpc>
-              <a:spcBef>
-                <a:spcPts val="0"/>
-              </a:spcBef>
-              <a:defRPr b="0" sz="5600">
-                <a:solidFill>
-                  <a:srgbClr val="000000"/>
-                </a:solidFill>
-                <a:effectLst>
-                  <a:outerShdw sx="100000" sy="100000" kx="0" ky="0" algn="b" rotWithShape="0" blurRad="38100" dist="12700" dir="5400000">
-                    <a:srgbClr val="000000">
-                      <a:alpha val="50000"/>
-                    </a:srgbClr>
-                  </a:outerShdw>
-                </a:effectLst>
-                <a:latin typeface="Gill Sans"/>
-                <a:ea typeface="Gill Sans"/>
-                <a:cs typeface="Gill Sans"/>
-                <a:sym typeface="Gill Sans"/>
-              </a:defRPr>
-            </a:pPr>
-          </a:p>
-        </p:txBody>
-      </p:sp>
-      <p:graphicFrame>
-        <p:nvGraphicFramePr>
-          <p:cNvPr id="202" name="Table"/>
-          <p:cNvGraphicFramePr/>
-          <p:nvPr/>
-        </p:nvGraphicFramePr>
-        <p:xfrm>
-          <a:off x="5095880" y="4898635"/>
-          <a:ext cx="1188952" cy="1524001"/>
-        </p:xfrm>
-        <a:graphic xmlns:a="http://schemas.openxmlformats.org/drawingml/2006/main">
-          <a:graphicData uri="http://schemas.openxmlformats.org/drawingml/2006/table">
-            <a:tbl>
-              <a:tblPr firstCol="0" firstRow="1" lastCol="0" lastRow="0" bandCol="0" bandRow="0" rtl="0">
-                <a:tableStyleId>{33BA23B1-9221-436E-865A-0063620EA4FD}</a:tableStyleId>
-              </a:tblPr>
-              <a:tblGrid>
-                <a:gridCol w="222840"/>
-                <a:gridCol w="222840"/>
-                <a:gridCol w="222840"/>
-              </a:tblGrid>
-              <a:tr h="160866">
-                <a:tc>
-                  <a:txBody>
-                    <a:bodyPr/>
-                    <a:lstStyle/>
-                    <a:p>
-                      <a:pPr defTabSz="914400">
-                        <a:defRPr b="0">
-                          <a:solidFill>
-                            <a:srgbClr val="000000"/>
-                          </a:solidFill>
-                        </a:defRPr>
-                      </a:pPr>
-                      <a:r>
-                        <a:rPr b="1" sz="900">
-                          <a:solidFill>
-                            <a:srgbClr val="FFFFFF"/>
-                          </a:solidFill>
-                          <a:latin typeface="Helvetica"/>
-                          <a:ea typeface="Helvetica"/>
-                          <a:cs typeface="Helvetica"/>
-                          <a:sym typeface="Helvetica"/>
-                        </a:rPr>
-                        <a:t>A</a:t>
-                      </a:r>
-                    </a:p>
-                  </a:txBody>
-                  <a:tcPr marL="0" marR="0" marT="0" marB="0" anchor="ctr" anchorCtr="0" horzOverflow="overflow">
-                    <a:solidFill>
-                      <a:srgbClr val="797979"/>
-                    </a:solidFill>
-                  </a:tcPr>
-                </a:tc>
-                <a:tc>
-                  <a:txBody>
-                    <a:bodyPr/>
-                    <a:lstStyle/>
-                    <a:p>
-                      <a:pPr defTabSz="914400">
-                        <a:defRPr b="0">
-                          <a:solidFill>
-                            <a:srgbClr val="000000"/>
-                          </a:solidFill>
-                        </a:defRPr>
-                      </a:pPr>
-                      <a:r>
-                        <a:rPr b="1" sz="900">
-                          <a:solidFill>
-                            <a:srgbClr val="FFFFFF"/>
-                          </a:solidFill>
-                          <a:latin typeface="Helvetica"/>
-                          <a:ea typeface="Helvetica"/>
-                          <a:cs typeface="Helvetica"/>
-                          <a:sym typeface="Helvetica"/>
-                        </a:rPr>
-                        <a:t>B</a:t>
-                      </a:r>
-                    </a:p>
-                  </a:txBody>
-                  <a:tcPr marL="0" marR="0" marT="0" marB="0" anchor="ctr" anchorCtr="0" horzOverflow="overflow">
-                    <a:solidFill>
-                      <a:srgbClr val="797979"/>
-                    </a:solidFill>
-                  </a:tcPr>
-                </a:tc>
-                <a:tc>
-                  <a:txBody>
-                    <a:bodyPr/>
-                    <a:lstStyle/>
-                    <a:p>
-                      <a:pPr defTabSz="914400">
-                        <a:defRPr b="0">
-                          <a:solidFill>
-                            <a:srgbClr val="000000"/>
-                          </a:solidFill>
-                        </a:defRPr>
-                      </a:pPr>
-                      <a:r>
-                        <a:rPr b="1" sz="900">
-                          <a:solidFill>
-                            <a:srgbClr val="FFFFFF"/>
-                          </a:solidFill>
-                          <a:latin typeface="Helvetica"/>
-                          <a:ea typeface="Helvetica"/>
-                          <a:cs typeface="Helvetica"/>
-                          <a:sym typeface="Helvetica"/>
-                        </a:rPr>
-                        <a:t>C</a:t>
-                      </a:r>
-                    </a:p>
-                  </a:txBody>
-                  <a:tcPr marL="0" marR="0" marT="0" marB="0" anchor="ctr" anchorCtr="0" horzOverflow="overflow">
-                    <a:solidFill>
-                      <a:srgbClr val="797979"/>
-                    </a:solidFill>
-                  </a:tcPr>
-                </a:tc>
-              </a:tr>
-              <a:tr h="160866">
-                <a:tc>
-                  <a:txBody>
-                    <a:bodyPr/>
-                    <a:lstStyle/>
-                    <a:p>
-                      <a:pPr defTabSz="914400"/>
-                      <a:r>
-                        <a:rPr sz="900">
-                          <a:latin typeface="Helvetica"/>
-                          <a:ea typeface="Helvetica"/>
-                          <a:cs typeface="Helvetica"/>
-                          <a:sym typeface="Helvetica"/>
-                        </a:rPr>
-                        <a:t>1</a:t>
-                      </a:r>
-                    </a:p>
-                  </a:txBody>
-                  <a:tcPr marL="0" marR="0" marT="0" marB="0" anchor="ctr" anchorCtr="0" horzOverflow="overflow"/>
-                </a:tc>
-                <a:tc>
-                  <a:txBody>
-                    <a:bodyPr/>
-                    <a:lstStyle/>
-                    <a:p>
-                      <a:pPr defTabSz="914400"/>
-                      <a:r>
-                        <a:rPr sz="900">
-                          <a:latin typeface="Helvetica"/>
-                          <a:ea typeface="Helvetica"/>
-                          <a:cs typeface="Helvetica"/>
-                          <a:sym typeface="Helvetica"/>
-                        </a:rPr>
-                        <a:t>2</a:t>
-                      </a:r>
-                    </a:p>
-                  </a:txBody>
-                  <a:tcPr marL="0" marR="0" marT="0" marB="0" anchor="ctr" anchorCtr="0" horzOverflow="overflow"/>
-                </a:tc>
-                <a:tc>
-                  <a:txBody>
-                    <a:bodyPr/>
-                    <a:lstStyle/>
-                    <a:p>
-                      <a:pPr defTabSz="914400"/>
-                      <a:r>
-                        <a:rPr sz="900">
-                          <a:latin typeface="Helvetica"/>
-                          <a:ea typeface="Helvetica"/>
-                          <a:cs typeface="Helvetica"/>
-                          <a:sym typeface="Helvetica"/>
-                        </a:rPr>
-                        <a:t>3</a:t>
-                      </a:r>
-                    </a:p>
-                  </a:txBody>
-                  <a:tcPr marL="0" marR="0" marT="0" marB="0" anchor="ctr" anchorCtr="0" horzOverflow="overflow"/>
-                </a:tc>
-              </a:tr>
-              <a:tr h="160866">
-                <a:tc>
-                  <a:txBody>
-                    <a:bodyPr/>
-                    <a:lstStyle/>
-                    <a:p>
-                      <a:pPr defTabSz="914400"/>
-                      <a:r>
-                        <a:rPr sz="900">
-                          <a:latin typeface="Helvetica"/>
-                          <a:ea typeface="Helvetica"/>
-                          <a:cs typeface="Helvetica"/>
-                          <a:sym typeface="Helvetica"/>
-                        </a:rPr>
-                        <a:t>4</a:t>
-                      </a:r>
-                    </a:p>
-                  </a:txBody>
-                  <a:tcPr marL="0" marR="0" marT="0" marB="0" anchor="ctr" anchorCtr="0" horzOverflow="overflow"/>
-                </a:tc>
-                <a:tc>
-                  <a:txBody>
-                    <a:bodyPr/>
-                    <a:lstStyle/>
-                    <a:p>
-                      <a:pPr defTabSz="914400"/>
-                      <a:r>
-                        <a:rPr sz="900">
-                          <a:latin typeface="Helvetica"/>
-                          <a:ea typeface="Helvetica"/>
-                          <a:cs typeface="Helvetica"/>
-                          <a:sym typeface="Helvetica"/>
-                        </a:rPr>
-                        <a:t>5</a:t>
-                      </a:r>
-                    </a:p>
-                  </a:txBody>
-                  <a:tcPr marL="0" marR="0" marT="0" marB="0" anchor="ctr" anchorCtr="0" horzOverflow="overflow"/>
-                </a:tc>
-                <a:tc>
-                  <a:txBody>
-                    <a:bodyPr/>
-                    <a:lstStyle/>
-                    <a:p>
-                      <a:pPr defTabSz="914400"/>
-                      <a:r>
-                        <a:rPr sz="900">
-                          <a:latin typeface="Helvetica"/>
-                          <a:ea typeface="Helvetica"/>
-                          <a:cs typeface="Helvetica"/>
-                          <a:sym typeface="Helvetica"/>
-                        </a:rPr>
-                        <a:t>NA</a:t>
-                      </a:r>
-                    </a:p>
-                  </a:txBody>
-                  <a:tcPr marL="0" marR="0" marT="0" marB="0" anchor="ctr" anchorCtr="0" horzOverflow="overflow"/>
-                </a:tc>
-              </a:tr>
-            </a:tbl>
-          </a:graphicData>
-        </a:graphic>
-      </p:graphicFrame>
-      <p:sp>
-        <p:nvSpPr>
-          <p:cNvPr id="203" name="Line"/>
-          <p:cNvSpPr/>
-          <p:nvPr/>
-        </p:nvSpPr>
-        <p:spPr>
-          <a:xfrm>
             <a:off x="4628162" y="5197085"/>
             <a:ext cx="333334" cy="1"/>
           </a:xfrm>
@@ -9525,7 +9251,7 @@
       </p:sp>
       <p:grpSp>
         <p:nvGrpSpPr>
-          <p:cNvPr id="208" name="Group"/>
+          <p:cNvPr id="202" name="Group"/>
           <p:cNvGrpSpPr/>
           <p:nvPr/>
         </p:nvGrpSpPr>
@@ -9539,7 +9265,7 @@
         </p:grpSpPr>
         <p:grpSp>
           <p:nvGrpSpPr>
-            <p:cNvPr id="206" name="Group"/>
+            <p:cNvPr id="200" name="Group"/>
             <p:cNvGrpSpPr/>
             <p:nvPr/>
           </p:nvGrpSpPr>
@@ -9553,14 +9279,14 @@
           </p:grpSpPr>
           <p:pic>
             <p:nvPicPr>
-              <p:cNvPr id="204" name="Image" descr="Image"/>
+              <p:cNvPr id="198" name="Image" descr="Image"/>
               <p:cNvPicPr>
                 <a:picLocks noChangeAspect="1"/>
               </p:cNvPicPr>
               <p:nvPr/>
             </p:nvPicPr>
             <p:blipFill>
-              <a:blip r:embed="rId6">
+              <a:blip r:embed="rId2">
                 <a:extLst/>
               </a:blip>
               <a:stretch>
@@ -9590,7 +9316,7 @@
           </p:pic>
           <p:sp>
             <p:nvSpPr>
-              <p:cNvPr id="205" name="Triangle"/>
+              <p:cNvPr id="199" name="Triangle"/>
               <p:cNvSpPr/>
               <p:nvPr/>
             </p:nvSpPr>
@@ -9667,7 +9393,7 @@
         </p:grpSp>
         <p:sp>
           <p:nvSpPr>
-            <p:cNvPr id="207" name="a,b,c…"/>
+            <p:cNvPr id="201" name="a,b,c…"/>
             <p:cNvSpPr txBox="1"/>
             <p:nvPr/>
           </p:nvSpPr>
@@ -9767,7 +9493,7 @@
       </p:grpSp>
       <p:sp>
         <p:nvSpPr>
-          <p:cNvPr id="209" name="Example file…"/>
+          <p:cNvPr id="203" name="Example file…"/>
           <p:cNvSpPr txBox="1"/>
           <p:nvPr/>
         </p:nvSpPr>
@@ -9979,7 +9705,7 @@
       </p:sp>
       <p:sp>
         <p:nvSpPr>
-          <p:cNvPr id="210" name="Read a file into a single string…"/>
+          <p:cNvPr id="204" name="Read a file into a single string…"/>
           <p:cNvSpPr txBox="1"/>
           <p:nvPr/>
         </p:nvSpPr>
@@ -10120,7 +9846,7 @@
       </p:sp>
       <p:sp>
         <p:nvSpPr>
-          <p:cNvPr id="211" name="Line"/>
+          <p:cNvPr id="205" name="Line"/>
           <p:cNvSpPr/>
           <p:nvPr/>
         </p:nvSpPr>
@@ -10161,7 +9887,7 @@
       </p:sp>
       <p:sp>
         <p:nvSpPr>
-          <p:cNvPr id="212" name="Read a file into a raw vector…"/>
+          <p:cNvPr id="206" name="Read a file into a raw vector…"/>
           <p:cNvSpPr txBox="1"/>
           <p:nvPr/>
         </p:nvSpPr>
@@ -10313,7 +10039,7 @@
       </p:sp>
       <p:sp>
         <p:nvSpPr>
-          <p:cNvPr id="213" name="Read Non-Tabular Data"/>
+          <p:cNvPr id="207" name="Read Non-Tabular Data"/>
           <p:cNvSpPr txBox="1"/>
           <p:nvPr/>
         </p:nvSpPr>
@@ -10365,7 +10091,7 @@
       </p:sp>
       <p:sp>
         <p:nvSpPr>
-          <p:cNvPr id="214" name="Read Apache style log files…"/>
+          <p:cNvPr id="208" name="Read Apache style log files…"/>
           <p:cNvSpPr txBox="1"/>
           <p:nvPr/>
         </p:nvSpPr>
@@ -10453,7 +10179,7 @@
       </p:sp>
       <p:sp>
         <p:nvSpPr>
-          <p:cNvPr id="215" name="## Parsed with column specification:…"/>
+          <p:cNvPr id="209" name="## Parsed with column specification:…"/>
           <p:cNvSpPr txBox="1"/>
           <p:nvPr/>
         </p:nvSpPr>
@@ -10603,7 +10329,7 @@
       </p:sp>
       <p:sp>
         <p:nvSpPr>
-          <p:cNvPr id="216" name="1. Use problems() to diagnose problems.…"/>
+          <p:cNvPr id="210" name="1. Use problems() to diagnose problems.…"/>
           <p:cNvSpPr txBox="1"/>
           <p:nvPr/>
         </p:nvSpPr>
@@ -11233,7 +10959,7 @@
       </p:sp>
       <p:sp>
         <p:nvSpPr>
-          <p:cNvPr id="217" name="readr functions guess…"/>
+          <p:cNvPr id="211" name="readr functions guess…"/>
           <p:cNvSpPr txBox="1"/>
           <p:nvPr/>
         </p:nvSpPr>
@@ -11351,7 +11077,7 @@
       </p:sp>
       <p:sp>
         <p:nvSpPr>
-          <p:cNvPr id="218" name="earn is a double (numeric)"/>
+          <p:cNvPr id="212" name="earn is a double (numeric)"/>
           <p:cNvSpPr/>
           <p:nvPr/>
         </p:nvSpPr>
@@ -11472,7 +11198,7 @@
       </p:sp>
       <p:sp>
         <p:nvSpPr>
-          <p:cNvPr id="219" name="sex is a character"/>
+          <p:cNvPr id="213" name="sex is a character"/>
           <p:cNvSpPr/>
           <p:nvPr/>
         </p:nvSpPr>
@@ -11590,7 +11316,7 @@
       </p:sp>
       <p:sp>
         <p:nvSpPr>
-          <p:cNvPr id="220" name="age is an integer"/>
+          <p:cNvPr id="214" name="age is an integer"/>
           <p:cNvSpPr/>
           <p:nvPr/>
         </p:nvSpPr>
@@ -11711,7 +11437,7 @@
       </p:sp>
       <p:sp>
         <p:nvSpPr>
-          <p:cNvPr id="221" name="RStudio® is a trademark of RStudio, Inc.  •  CC BY SA  RStudio •  info@rstudio.com  •  844-448-1212 • rstudio.com •  Learn more at tidyverse.org  •  readr  1.1.0 •  tibble  1.2.12 •  tidyr  0.6.0 •  Updated: 2017-01"/>
+          <p:cNvPr id="215" name="RStudio® is a trademark of RStudio, Inc.  •  CC BY SA  RStudio •  info@rstudio.com  •  844-448-1212 • rstudio.com •  Learn more at tidyverse.org  •  readr  1.1.0 •  tibble  1.2.12 •  tidyr  0.6.0 •  Updated: 2017-01"/>
           <p:cNvSpPr txBox="1"/>
           <p:nvPr/>
         </p:nvSpPr>
@@ -11756,7 +11482,7 @@
             </a:r>
             <a:r>
               <a:rPr>
-                <a:hlinkClick r:id="rId7" invalidUrl="" action="" tgtFrame="" tooltip="" history="1" highlightClick="0" endSnd="0"/>
+                <a:hlinkClick r:id="rId3" invalidUrl="" action="" tgtFrame="" tooltip="" history="1" highlightClick="0" endSnd="0"/>
               </a:rPr>
               <a:t>CC BY SA</a:t>
             </a:r>
@@ -11765,7 +11491,7 @@
             </a:r>
             <a:r>
               <a:rPr>
-                <a:hlinkClick r:id="rId8" invalidUrl="" action="" tgtFrame="" tooltip="" history="1" highlightClick="0" endSnd="0"/>
+                <a:hlinkClick r:id="rId4" invalidUrl="" action="" tgtFrame="" tooltip="" history="1" highlightClick="0" endSnd="0"/>
               </a:rPr>
               <a:t>info@rstudio.com</a:t>
             </a:r>
@@ -11774,7 +11500,7 @@
             </a:r>
             <a:r>
               <a:rPr>
-                <a:hlinkClick r:id="rId9" invalidUrl="" action="" tgtFrame="" tooltip="" history="1" highlightClick="0" endSnd="0"/>
+                <a:hlinkClick r:id="rId5" invalidUrl="" action="" tgtFrame="" tooltip="" history="1" highlightClick="0" endSnd="0"/>
               </a:rPr>
               <a:t>rstudio.com</a:t>
             </a:r>
@@ -11783,7 +11509,7 @@
             </a:r>
             <a:r>
               <a:rPr u="sng">
-                <a:hlinkClick r:id="rId10" invalidUrl="" action="" tgtFrame="" tooltip="" history="1" highlightClick="0" endSnd="0"/>
+                <a:hlinkClick r:id="rId6" invalidUrl="" action="" tgtFrame="" tooltip="" history="1" highlightClick="0" endSnd="0"/>
               </a:rPr>
               <a:t>tidyverse.org</a:t>
             </a:r>
@@ -11797,6 +11523,280 @@
           </a:p>
         </p:txBody>
       </p:sp>
+      <p:grpSp>
+        <p:nvGrpSpPr>
+          <p:cNvPr id="219" name="Group"/>
+          <p:cNvGrpSpPr/>
+          <p:nvPr/>
+        </p:nvGrpSpPr>
+        <p:grpSpPr>
+          <a:xfrm>
+            <a:off x="333196" y="1268279"/>
+            <a:ext cx="3067130" cy="1752601"/>
+            <a:chOff x="0" y="0"/>
+            <a:chExt cx="3067128" cy="1752600"/>
+          </a:xfrm>
+        </p:grpSpPr>
+        <p:sp>
+          <p:nvSpPr>
+            <p:cNvPr id="216" name="R’s tidyverse is built around tidy data stored in  tibbles, which are enhanced data frames.…"/>
+            <p:cNvSpPr txBox="1"/>
+            <p:nvPr/>
+          </p:nvSpPr>
+          <p:spPr>
+            <a:xfrm>
+              <a:off x="0" y="0"/>
+              <a:ext cx="3067129" cy="1752600"/>
+            </a:xfrm>
+            <a:prstGeom prst="rect">
+              <a:avLst/>
+            </a:prstGeom>
+            <a:noFill/>
+            <a:ln w="12700" cap="flat">
+              <a:noFill/>
+              <a:miter lim="400000"/>
+            </a:ln>
+            <a:effectLst/>
+            <a:extLst>
+              <a:ext uri="{C572A759-6A51-4108-AA02-DFA0A04FC94B}">
+                <ma14:wrappingTextBoxFlag xmlns:ma14="http://schemas.microsoft.com/office/mac/drawingml/2011/main" val="1"/>
+              </a:ext>
+            </a:extLst>
+          </p:spPr>
+          <p:txBody>
+            <a:bodyPr wrap="square" lIns="50800" tIns="50800" rIns="50800" bIns="50800" numCol="1" anchor="t">
+              <a:spAutoFit/>
+            </a:bodyPr>
+            <a:lstStyle/>
+            <a:p>
+              <a:pPr>
+                <a:spcBef>
+                  <a:spcPts val="500"/>
+                </a:spcBef>
+                <a:buClr>
+                  <a:srgbClr val="F39019"/>
+                </a:buClr>
+                <a:defRPr b="0">
+                  <a:solidFill>
+                    <a:srgbClr val="000000"/>
+                  </a:solidFill>
+                </a:defRPr>
+              </a:pPr>
+              <a:r>
+                <a:t>R’s</a:t>
+              </a:r>
+              <a:r>
+                <a:rPr b="1"/>
+                <a:t> </a:t>
+              </a:r>
+              <a:r>
+                <a:rPr b="1"/>
+                <a:t>tidyverse</a:t>
+              </a:r>
+              <a:r>
+                <a:t> is built around </a:t>
+              </a:r>
+              <a:r>
+                <a:rPr b="1"/>
+                <a:t>tidy data</a:t>
+              </a:r>
+              <a:r>
+                <a:t> stored in  </a:t>
+              </a:r>
+              <a:r>
+                <a:rPr b="1"/>
+                <a:t>tibbles</a:t>
+              </a:r>
+              <a:r>
+                <a:t>, which are enhanced data frames. </a:t>
+              </a:r>
+            </a:p>
+            <a:p>
+              <a:pPr marL="114300">
+                <a:spcBef>
+                  <a:spcPts val="500"/>
+                </a:spcBef>
+                <a:buClr>
+                  <a:srgbClr val="FF7E79"/>
+                </a:buClr>
+                <a:defRPr b="0">
+                  <a:solidFill>
+                    <a:srgbClr val="000000"/>
+                  </a:solidFill>
+                </a:defRPr>
+              </a:pPr>
+              <a:r>
+                <a:t>The front side of this sheet shows how to read text files into R with </a:t>
+              </a:r>
+              <a:r>
+                <a:rPr b="1"/>
+                <a:t>readr</a:t>
+              </a:r>
+              <a:r>
+                <a:t>.</a:t>
+              </a:r>
+            </a:p>
+            <a:p>
+              <a:pPr marL="114300">
+                <a:spcBef>
+                  <a:spcPts val="300"/>
+                </a:spcBef>
+                <a:buClr>
+                  <a:srgbClr val="FF7E79"/>
+                </a:buClr>
+                <a:defRPr b="0">
+                  <a:solidFill>
+                    <a:srgbClr val="000000"/>
+                  </a:solidFill>
+                </a:defRPr>
+              </a:pPr>
+              <a:r>
+                <a:t>The reverse side shows how to create tibbles with </a:t>
+              </a:r>
+              <a:r>
+                <a:rPr b="1"/>
+                <a:t>tibble</a:t>
+              </a:r>
+              <a:r>
+                <a:t> and to layout tidy data with </a:t>
+              </a:r>
+              <a:r>
+                <a:rPr b="1"/>
+                <a:t>tidyr</a:t>
+              </a:r>
+              <a:r>
+                <a:t>. </a:t>
+              </a:r>
+            </a:p>
+          </p:txBody>
+        </p:sp>
+        <p:pic>
+          <p:nvPicPr>
+            <p:cNvPr id="217" name="Image" descr="Image"/>
+            <p:cNvPicPr>
+              <a:picLocks noChangeAspect="1"/>
+            </p:cNvPicPr>
+            <p:nvPr/>
+          </p:nvPicPr>
+          <p:blipFill>
+            <a:blip r:embed="rId7">
+              <a:extLst/>
+            </a:blip>
+            <a:stretch>
+              <a:fillRect/>
+            </a:stretch>
+          </p:blipFill>
+          <p:spPr>
+            <a:xfrm>
+              <a:off x="123747" y="472536"/>
+              <a:ext cx="533401" cy="599716"/>
+            </a:xfrm>
+            <a:prstGeom prst="rect">
+              <a:avLst/>
+            </a:prstGeom>
+            <a:ln w="12700" cap="flat">
+              <a:noFill/>
+              <a:miter lim="400000"/>
+            </a:ln>
+            <a:effectLst/>
+          </p:spPr>
+        </p:pic>
+        <p:pic>
+          <p:nvPicPr>
+            <p:cNvPr id="218" name="tidyr.png" descr="tidyr.png"/>
+            <p:cNvPicPr>
+              <a:picLocks noChangeAspect="1"/>
+            </p:cNvPicPr>
+            <p:nvPr/>
+          </p:nvPicPr>
+          <p:blipFill>
+            <a:blip r:embed="rId8">
+              <a:extLst/>
+            </a:blip>
+            <a:stretch>
+              <a:fillRect/>
+            </a:stretch>
+          </p:blipFill>
+          <p:spPr>
+            <a:xfrm>
+              <a:off x="149147" y="1085563"/>
+              <a:ext cx="476928" cy="552744"/>
+            </a:xfrm>
+            <a:prstGeom prst="rect">
+              <a:avLst/>
+            </a:prstGeom>
+            <a:ln w="12700" cap="flat">
+              <a:noFill/>
+              <a:miter lim="400000"/>
+            </a:ln>
+            <a:effectLst>
+              <a:outerShdw sx="100000" sy="100000" kx="0" ky="0" algn="b" rotWithShape="0" blurRad="12700" dist="12700" dir="5400000">
+                <a:srgbClr val="000000">
+                  <a:alpha val="50000"/>
+                </a:srgbClr>
+              </a:outerShdw>
+            </a:effectLst>
+          </p:spPr>
+        </p:pic>
+      </p:grpSp>
+      <p:pic>
+        <p:nvPicPr>
+          <p:cNvPr id="220" name="readr.png" descr="readr.png"/>
+          <p:cNvPicPr>
+            <a:picLocks noChangeAspect="1"/>
+          </p:cNvPicPr>
+          <p:nvPr/>
+        </p:nvPicPr>
+        <p:blipFill>
+          <a:blip r:embed="rId9">
+            <a:extLst/>
+          </a:blip>
+          <a:stretch>
+            <a:fillRect/>
+          </a:stretch>
+        </p:blipFill>
+        <p:spPr>
+          <a:xfrm>
+            <a:off x="12294644" y="198849"/>
+            <a:ext cx="1378971" cy="1598182"/>
+          </a:xfrm>
+          <a:prstGeom prst="rect">
+            <a:avLst/>
+          </a:prstGeom>
+          <a:ln w="12700">
+            <a:miter lim="400000"/>
+          </a:ln>
+        </p:spPr>
+      </p:pic>
+      <p:pic>
+        <p:nvPicPr>
+          <p:cNvPr id="221" name="Image" descr="Image"/>
+          <p:cNvPicPr>
+            <a:picLocks noChangeAspect="1"/>
+          </p:cNvPicPr>
+          <p:nvPr/>
+        </p:nvPicPr>
+        <p:blipFill>
+          <a:blip r:embed="rId10">
+            <a:extLst/>
+          </a:blip>
+          <a:stretch>
+            <a:fillRect/>
+          </a:stretch>
+        </p:blipFill>
+        <p:spPr>
+          <a:xfrm>
+            <a:off x="238823" y="9978474"/>
+            <a:ext cx="1754521" cy="616478"/>
+          </a:xfrm>
+          <a:prstGeom prst="rect">
+            <a:avLst/>
+          </a:prstGeom>
+          <a:ln w="12700">
+            <a:miter lim="400000"/>
+          </a:ln>
+        </p:spPr>
+      </p:pic>
     </p:spTree>
   </p:cSld>
   <p:clrMapOvr>
@@ -28835,38 +28835,9 @@
           </a:p>
         </p:txBody>
       </p:sp>
-      <p:pic>
-        <p:nvPicPr>
-          <p:cNvPr id="351" name="tidyr.png" descr="tidyr.png"/>
-          <p:cNvPicPr>
-            <a:picLocks noChangeAspect="1"/>
-          </p:cNvPicPr>
-          <p:nvPr/>
-        </p:nvPicPr>
-        <p:blipFill>
-          <a:blip r:embed="rId2">
-            <a:extLst/>
-          </a:blip>
-          <a:stretch>
-            <a:fillRect/>
-          </a:stretch>
-        </p:blipFill>
-        <p:spPr>
-          <a:xfrm>
-            <a:off x="12291979" y="195760"/>
-            <a:ext cx="1384301" cy="1604360"/>
-          </a:xfrm>
-          <a:prstGeom prst="rect">
-            <a:avLst/>
-          </a:prstGeom>
-          <a:ln w="12700">
-            <a:miter lim="400000"/>
-          </a:ln>
-        </p:spPr>
-      </p:pic>
       <p:sp>
         <p:nvSpPr>
-          <p:cNvPr id="352" name="RStudio® is a trademark of RStudio, Inc.  •  CC BY SA  RStudio •  info@rstudio.com  •  844-448-1212 • rstudio.com •  Learn more at tidyverse.org  •  readr  1.1.0 •  tibble  1.2.12 •  tidyr  0.6.0 •  Updated: 2017-01"/>
+          <p:cNvPr id="351" name="RStudio® is a trademark of RStudio, Inc.  •  CC BY SA  RStudio •  info@rstudio.com  •  844-448-1212 • rstudio.com •  Learn more at tidyverse.org  •  readr  1.1.0 •  tibble  1.2.12 •  tidyr  0.6.0 •  Updated: 2017-01"/>
           <p:cNvSpPr txBox="1"/>
           <p:nvPr/>
         </p:nvSpPr>
@@ -28911,34 +28882,34 @@
             </a:r>
             <a:r>
               <a:rPr>
+                <a:hlinkClick r:id="rId2" invalidUrl="" action="" tgtFrame="" tooltip="" history="1" highlightClick="0" endSnd="0"/>
+              </a:rPr>
+              <a:t>CC BY SA</a:t>
+            </a:r>
+            <a:r>
+              <a:t>  RStudio •  </a:t>
+            </a:r>
+            <a:r>
+              <a:rPr>
                 <a:hlinkClick r:id="rId3" invalidUrl="" action="" tgtFrame="" tooltip="" history="1" highlightClick="0" endSnd="0"/>
               </a:rPr>
-              <a:t>CC BY SA</a:t>
-            </a:r>
-            <a:r>
-              <a:t>  RStudio •  </a:t>
+              <a:t>info@rstudio.com</a:t>
+            </a:r>
+            <a:r>
+              <a:t>  •  844-448-1212 • </a:t>
             </a:r>
             <a:r>
               <a:rPr>
                 <a:hlinkClick r:id="rId4" invalidUrl="" action="" tgtFrame="" tooltip="" history="1" highlightClick="0" endSnd="0"/>
               </a:rPr>
-              <a:t>info@rstudio.com</a:t>
-            </a:r>
-            <a:r>
-              <a:t>  •  844-448-1212 • </a:t>
-            </a:r>
-            <a:r>
-              <a:rPr>
+              <a:t>rstudio.com</a:t>
+            </a:r>
+            <a:r>
+              <a:t> •  Learn more at </a:t>
+            </a:r>
+            <a:r>
+              <a:rPr u="sng">
                 <a:hlinkClick r:id="rId5" invalidUrl="" action="" tgtFrame="" tooltip="" history="1" highlightClick="0" endSnd="0"/>
-              </a:rPr>
-              <a:t>rstudio.com</a:t>
-            </a:r>
-            <a:r>
-              <a:t> •  Learn more at </a:t>
-            </a:r>
-            <a:r>
-              <a:rPr u="sng">
-                <a:hlinkClick r:id="rId6" invalidUrl="" action="" tgtFrame="" tooltip="" history="1" highlightClick="0" endSnd="0"/>
               </a:rPr>
               <a:t>tidyverse.org</a:t>
             </a:r>
@@ -28952,38 +28923,9 @@
           </a:p>
         </p:txBody>
       </p:sp>
-      <p:pic>
-        <p:nvPicPr>
-          <p:cNvPr id="353" name="Image" descr="Image"/>
-          <p:cNvPicPr>
-            <a:picLocks noChangeAspect="1"/>
-          </p:cNvPicPr>
-          <p:nvPr/>
-        </p:nvPicPr>
-        <p:blipFill>
-          <a:blip r:embed="rId7">
-            <a:extLst/>
-          </a:blip>
-          <a:stretch>
-            <a:fillRect/>
-          </a:stretch>
-        </p:blipFill>
-        <p:spPr>
-          <a:xfrm>
-            <a:off x="238823" y="9978474"/>
-            <a:ext cx="1754521" cy="616478"/>
-          </a:xfrm>
-          <a:prstGeom prst="rect">
-            <a:avLst/>
-          </a:prstGeom>
-          <a:ln w="12700">
-            <a:miter lim="400000"/>
-          </a:ln>
-        </p:spPr>
-      </p:pic>
       <p:sp>
         <p:nvSpPr>
-          <p:cNvPr id="354" name="Line"/>
+          <p:cNvPr id="352" name="Line"/>
           <p:cNvSpPr/>
           <p:nvPr/>
         </p:nvSpPr>
@@ -29024,7 +28966,7 @@
       </p:sp>
       <p:sp>
         <p:nvSpPr>
-          <p:cNvPr id="355" name="Line"/>
+          <p:cNvPr id="353" name="Line"/>
           <p:cNvSpPr/>
           <p:nvPr/>
         </p:nvSpPr>
@@ -29065,7 +29007,7 @@
       </p:sp>
       <p:sp>
         <p:nvSpPr>
-          <p:cNvPr id="356" name="Tibbles - an enhanced data frame"/>
+          <p:cNvPr id="354" name="Tibbles - an enhanced data frame"/>
           <p:cNvSpPr txBox="1"/>
           <p:nvPr/>
         </p:nvSpPr>
@@ -29121,7 +29063,7 @@
       </p:sp>
       <p:sp>
         <p:nvSpPr>
-          <p:cNvPr id="357" name="Split Cells"/>
+          <p:cNvPr id="355" name="Split Cells"/>
           <p:cNvSpPr txBox="1"/>
           <p:nvPr/>
         </p:nvSpPr>
@@ -29173,7 +29115,7 @@
       </p:sp>
       <p:sp>
         <p:nvSpPr>
-          <p:cNvPr id="358" name="Line"/>
+          <p:cNvPr id="356" name="Line"/>
           <p:cNvSpPr/>
           <p:nvPr/>
         </p:nvSpPr>
@@ -29212,38 +29154,9 @@
           </a:p>
         </p:txBody>
       </p:sp>
-      <p:pic>
-        <p:nvPicPr>
-          <p:cNvPr id="359" name="tibble.png" descr="tibble.png"/>
-          <p:cNvPicPr>
-            <a:picLocks noChangeAspect="1"/>
-          </p:cNvPicPr>
-          <p:nvPr/>
-        </p:nvPicPr>
-        <p:blipFill>
-          <a:blip r:embed="rId8">
-            <a:extLst/>
-          </a:blip>
-          <a:stretch>
-            <a:fillRect/>
-          </a:stretch>
-        </p:blipFill>
-        <p:spPr>
-          <a:xfrm>
-            <a:off x="2704385" y="822803"/>
-            <a:ext cx="704373" cy="816345"/>
-          </a:xfrm>
-          <a:prstGeom prst="rect">
-            <a:avLst/>
-          </a:prstGeom>
-          <a:ln w="12700">
-            <a:miter lim="400000"/>
-          </a:ln>
-        </p:spPr>
-      </p:pic>
       <p:sp>
         <p:nvSpPr>
-          <p:cNvPr id="360" name="Control the default appearance with options:…"/>
+          <p:cNvPr id="357" name="Control the default appearance with options:…"/>
           <p:cNvSpPr txBox="1"/>
           <p:nvPr/>
         </p:nvSpPr>
@@ -29396,7 +29309,7 @@
       </p:sp>
       <p:sp>
         <p:nvSpPr>
-          <p:cNvPr id="361" name="data frame display"/>
+          <p:cNvPr id="358" name="data frame display"/>
           <p:cNvSpPr txBox="1"/>
           <p:nvPr/>
         </p:nvSpPr>
@@ -29449,7 +29362,7 @@
       </p:sp>
       <p:sp>
         <p:nvSpPr>
-          <p:cNvPr id="362" name="tibble display"/>
+          <p:cNvPr id="359" name="tibble display"/>
           <p:cNvSpPr txBox="1"/>
           <p:nvPr/>
         </p:nvSpPr>
@@ -29505,7 +29418,7 @@
       </p:sp>
       <p:grpSp>
         <p:nvGrpSpPr>
-          <p:cNvPr id="367" name="Group"/>
+          <p:cNvPr id="364" name="Group"/>
           <p:cNvGrpSpPr/>
           <p:nvPr/>
         </p:nvGrpSpPr>
@@ -29519,7 +29432,7 @@
         </p:grpSpPr>
         <p:sp>
           <p:nvSpPr>
-            <p:cNvPr id="363" name="Rounded Rectangle"/>
+            <p:cNvPr id="360" name="Rounded Rectangle"/>
             <p:cNvSpPr/>
             <p:nvPr/>
           </p:nvSpPr>
@@ -29569,7 +29482,7 @@
         </p:sp>
         <p:sp>
           <p:nvSpPr>
-            <p:cNvPr id="364" name="tibble(…)…"/>
+            <p:cNvPr id="361" name="tibble(…)…"/>
             <p:cNvSpPr txBox="1"/>
             <p:nvPr/>
           </p:nvSpPr>
@@ -29852,7 +29765,7 @@
         </p:sp>
         <p:sp>
           <p:nvSpPr>
-            <p:cNvPr id="365" name="A tibble: 3 × 2…"/>
+            <p:cNvPr id="362" name="A tibble: 3 × 2…"/>
             <p:cNvSpPr/>
             <p:nvPr/>
           </p:nvSpPr>
@@ -30046,7 +29959,7 @@
         </p:sp>
         <p:sp>
           <p:nvSpPr>
-            <p:cNvPr id="366" name="Both…"/>
+            <p:cNvPr id="363" name="Both…"/>
             <p:cNvSpPr/>
             <p:nvPr/>
           </p:nvSpPr>
@@ -30206,7 +30119,7 @@
       </p:grpSp>
       <p:graphicFrame>
         <p:nvGraphicFramePr>
-          <p:cNvPr id="368" name="Table"/>
+          <p:cNvPr id="365" name="Table"/>
           <p:cNvGraphicFramePr/>
           <p:nvPr/>
         </p:nvGraphicFramePr>
@@ -32467,7 +32380,7 @@
       </p:graphicFrame>
       <p:sp>
         <p:nvSpPr>
-          <p:cNvPr id="369" name="Shape"/>
+          <p:cNvPr id="366" name="Shape"/>
           <p:cNvSpPr/>
           <p:nvPr/>
         </p:nvSpPr>
@@ -32554,7 +32467,7 @@
       </p:sp>
       <p:graphicFrame>
         <p:nvGraphicFramePr>
-          <p:cNvPr id="370" name="Table"/>
+          <p:cNvPr id="367" name="Table"/>
           <p:cNvGraphicFramePr/>
           <p:nvPr/>
         </p:nvGraphicFramePr>
@@ -32868,7 +32781,7 @@
       </p:graphicFrame>
       <p:sp>
         <p:nvSpPr>
-          <p:cNvPr id="371" name="Shape"/>
+          <p:cNvPr id="368" name="Shape"/>
           <p:cNvSpPr/>
           <p:nvPr/>
         </p:nvSpPr>
@@ -32955,7 +32868,7 @@
       </p:sp>
       <p:graphicFrame>
         <p:nvGraphicFramePr>
-          <p:cNvPr id="372" name="Table"/>
+          <p:cNvPr id="369" name="Table"/>
           <p:cNvGraphicFramePr/>
           <p:nvPr/>
         </p:nvGraphicFramePr>
@@ -33249,7 +33162,7 @@
       </p:graphicFrame>
       <p:sp>
         <p:nvSpPr>
-          <p:cNvPr id="373" name="# A tibble: 234 × 6…"/>
+          <p:cNvPr id="370" name="# A tibble: 234 × 6…"/>
           <p:cNvSpPr/>
           <p:nvPr/>
         </p:nvSpPr>
@@ -33699,7 +33612,7 @@
       </p:sp>
       <p:sp>
         <p:nvSpPr>
-          <p:cNvPr id="374" name="156 1999   6   auto(l4)…"/>
+          <p:cNvPr id="371" name="156 1999   6   auto(l4)…"/>
           <p:cNvSpPr/>
           <p:nvPr/>
         </p:nvSpPr>
@@ -34041,7 +33954,7 @@
       </p:sp>
       <p:sp>
         <p:nvSpPr>
-          <p:cNvPr id="375" name="A large table to display"/>
+          <p:cNvPr id="372" name="A large table to display"/>
           <p:cNvSpPr txBox="1"/>
           <p:nvPr/>
         </p:nvSpPr>
@@ -34097,7 +34010,7 @@
       </p:sp>
       <p:sp>
         <p:nvSpPr>
-          <p:cNvPr id="376" name="as_tibble(x, …) Convert data frame to tibble.…"/>
+          <p:cNvPr id="373" name="as_tibble(x, …) Convert data frame to tibble.…"/>
           <p:cNvSpPr txBox="1"/>
           <p:nvPr/>
         </p:nvSpPr>
@@ -34308,7 +34221,7 @@
       </p:sp>
       <p:sp>
         <p:nvSpPr>
-          <p:cNvPr id="377" name="CONSTRUCT A TIBBLE IN TWO WAYS"/>
+          <p:cNvPr id="374" name="CONSTRUCT A TIBBLE IN TWO WAYS"/>
           <p:cNvSpPr txBox="1"/>
           <p:nvPr/>
         </p:nvSpPr>
@@ -34344,7 +34257,7 @@
       </p:sp>
       <p:sp>
         <p:nvSpPr>
-          <p:cNvPr id="378" name="Line"/>
+          <p:cNvPr id="375" name="Line"/>
           <p:cNvSpPr/>
           <p:nvPr/>
         </p:nvSpPr>
@@ -34387,7 +34300,7 @@
       </p:sp>
       <p:sp>
         <p:nvSpPr>
-          <p:cNvPr id="379" name="Line"/>
+          <p:cNvPr id="376" name="Line"/>
           <p:cNvSpPr/>
           <p:nvPr/>
         </p:nvSpPr>
@@ -34428,7 +34341,7 @@
       </p:sp>
       <p:sp>
         <p:nvSpPr>
-          <p:cNvPr id="380" name="Expand Tables - quickly create tables with combinations of values"/>
+          <p:cNvPr id="377" name="Expand Tables - quickly create tables with combinations of values"/>
           <p:cNvSpPr txBox="1"/>
           <p:nvPr/>
         </p:nvSpPr>
@@ -34484,7 +34397,7 @@
       </p:sp>
       <p:sp>
         <p:nvSpPr>
-          <p:cNvPr id="381" name="Line"/>
+          <p:cNvPr id="378" name="Line"/>
           <p:cNvSpPr/>
           <p:nvPr/>
         </p:nvSpPr>
@@ -34525,7 +34438,7 @@
       </p:sp>
       <p:sp>
         <p:nvSpPr>
-          <p:cNvPr id="382" name="Tidy Data with tidyr"/>
+          <p:cNvPr id="379" name="Tidy Data with tidyr"/>
           <p:cNvSpPr txBox="1"/>
           <p:nvPr/>
         </p:nvSpPr>
@@ -34577,7 +34490,7 @@
       </p:sp>
       <p:sp>
         <p:nvSpPr>
-          <p:cNvPr id="383" name="Line"/>
+          <p:cNvPr id="380" name="Line"/>
           <p:cNvSpPr/>
           <p:nvPr/>
         </p:nvSpPr>
@@ -34616,6 +34529,93 @@
           </a:p>
         </p:txBody>
       </p:sp>
+      <p:pic>
+        <p:nvPicPr>
+          <p:cNvPr id="381" name="tidyr.png" descr="tidyr.png"/>
+          <p:cNvPicPr>
+            <a:picLocks noChangeAspect="1"/>
+          </p:cNvPicPr>
+          <p:nvPr/>
+        </p:nvPicPr>
+        <p:blipFill>
+          <a:blip r:embed="rId6">
+            <a:extLst/>
+          </a:blip>
+          <a:stretch>
+            <a:fillRect/>
+          </a:stretch>
+        </p:blipFill>
+        <p:spPr>
+          <a:xfrm>
+            <a:off x="12291979" y="195760"/>
+            <a:ext cx="1384301" cy="1604360"/>
+          </a:xfrm>
+          <a:prstGeom prst="rect">
+            <a:avLst/>
+          </a:prstGeom>
+          <a:ln w="12700">
+            <a:miter lim="400000"/>
+          </a:ln>
+        </p:spPr>
+      </p:pic>
+      <p:pic>
+        <p:nvPicPr>
+          <p:cNvPr id="382" name="Image" descr="Image"/>
+          <p:cNvPicPr>
+            <a:picLocks noChangeAspect="1"/>
+          </p:cNvPicPr>
+          <p:nvPr/>
+        </p:nvPicPr>
+        <p:blipFill>
+          <a:blip r:embed="rId7">
+            <a:extLst/>
+          </a:blip>
+          <a:stretch>
+            <a:fillRect/>
+          </a:stretch>
+        </p:blipFill>
+        <p:spPr>
+          <a:xfrm>
+            <a:off x="238823" y="9978474"/>
+            <a:ext cx="1754521" cy="616478"/>
+          </a:xfrm>
+          <a:prstGeom prst="rect">
+            <a:avLst/>
+          </a:prstGeom>
+          <a:ln w="12700">
+            <a:miter lim="400000"/>
+          </a:ln>
+        </p:spPr>
+      </p:pic>
+      <p:pic>
+        <p:nvPicPr>
+          <p:cNvPr id="383" name="tibble.png" descr="tibble.png"/>
+          <p:cNvPicPr>
+            <a:picLocks noChangeAspect="1"/>
+          </p:cNvPicPr>
+          <p:nvPr/>
+        </p:nvPicPr>
+        <p:blipFill>
+          <a:blip r:embed="rId8">
+            <a:extLst/>
+          </a:blip>
+          <a:stretch>
+            <a:fillRect/>
+          </a:stretch>
+        </p:blipFill>
+        <p:spPr>
+          <a:xfrm>
+            <a:off x="2704385" y="822803"/>
+            <a:ext cx="704373" cy="816345"/>
+          </a:xfrm>
+          <a:prstGeom prst="rect">
+            <a:avLst/>
+          </a:prstGeom>
+          <a:ln w="12700">
+            <a:miter lim="400000"/>
+          </a:ln>
+        </p:spPr>
+      </p:pic>
     </p:spTree>
   </p:cSld>
   <p:clrMapOvr>

</xml_diff>

<commit_message>
Fixes #89. Thanks @jxu.
</commit_message>
<xml_diff>
--- a/powerpoints/data-import.pptx
+++ b/powerpoints/data-import.pptx
@@ -20829,14 +20829,14 @@
       </p:grpSp>
       <p:sp>
         <p:nvSpPr>
-          <p:cNvPr id="285" name="separate(table3, rate,…"/>
+          <p:cNvPr id="285" name="separate(table3, rate, sep = &quot;/&quot;,…"/>
           <p:cNvSpPr txBox="1"/>
           <p:nvPr/>
         </p:nvSpPr>
         <p:spPr>
           <a:xfrm>
-            <a:off x="11034555" y="4055905"/>
-            <a:ext cx="2009810" cy="650107"/>
+            <a:off x="11025424" y="4066453"/>
+            <a:ext cx="2129671" cy="650107"/>
           </a:xfrm>
           <a:prstGeom prst="rect">
             <a:avLst/>
@@ -20856,14 +20856,14 @@
           </a:bodyPr>
           <a:lstStyle/>
           <a:p>
-            <a:pPr marL="114300" indent="-114300">
+            <a:pPr marL="110871" indent="-110871" algn="ctr" defTabSz="566674">
               <a:lnSpc>
                 <a:spcPct val="90000"/>
               </a:lnSpc>
               <a:spcBef>
                 <a:spcPts val="0"/>
               </a:spcBef>
-              <a:defRPr b="0" i="1" sz="1300">
+              <a:defRPr b="0" i="1" sz="1261">
                 <a:solidFill>
                   <a:schemeClr val="accent1">
                     <a:hueOff val="47394"/>
@@ -20874,18 +20874,18 @@
               </a:defRPr>
             </a:pPr>
             <a:r>
-              <a:t>separate(table3, rate, </a:t>
+              <a:t>separate(table3, rate, sep = "/", </a:t>
             </a:r>
           </a:p>
           <a:p>
-            <a:pPr marL="114300" indent="-114300">
+            <a:pPr marL="110871" indent="-110871" algn="ctr" defTabSz="566674">
               <a:lnSpc>
                 <a:spcPct val="90000"/>
               </a:lnSpc>
               <a:spcBef>
                 <a:spcPts val="0"/>
               </a:spcBef>
-              <a:defRPr b="0" i="1" sz="1300">
+              <a:defRPr b="0" i="1" sz="1261">
                 <a:solidFill>
                   <a:schemeClr val="accent1">
                     <a:hueOff val="47394"/>

</xml_diff>

<commit_message>
sentence case tidyr and data import
</commit_message>
<xml_diff>
--- a/powerpoints/data-import.pptx
+++ b/powerpoints/data-import.pptx
@@ -311,6 +311,11 @@
       </a:defRPr>
     </a:lvl9pPr>
   </p:defaultTextStyle>
+  <p:extLst>
+    <p:ext uri="{EFAFB233-063F-42B5-8137-9DF3F51BA10A}">
+      <p15:sldGuideLst xmlns:p15="http://schemas.microsoft.com/office/powerpoint/2012/main"/>
+    </p:ext>
+  </p:extLst>
 </p:presentation>
 </file>
 
@@ -2435,7 +2440,7 @@
           </a:ln>
           <a:extLst>
             <a:ext uri="{C572A759-6A51-4108-AA02-DFA0A04FC94B}">
-              <ma14:wrappingTextBoxFlag xmlns:ma14="http://schemas.microsoft.com/office/mac/drawingml/2011/main" xmlns:a14="http://schemas.microsoft.com/office/drawing/2010/main" xmlns:m="http://schemas.openxmlformats.org/officeDocument/2006/math" xmlns="" val="1"/>
+              <ma14:wrappingTextBoxFlag xmlns="" xmlns:m="http://schemas.openxmlformats.org/officeDocument/2006/math" xmlns:a14="http://schemas.microsoft.com/office/drawing/2010/main" xmlns:ma14="http://schemas.microsoft.com/office/mac/drawingml/2011/main" val="1"/>
             </a:ext>
           </a:extLst>
         </p:spPr>
@@ -2474,7 +2479,7 @@
           </a:ln>
           <a:extLst>
             <a:ext uri="{C572A759-6A51-4108-AA02-DFA0A04FC94B}">
-              <ma14:wrappingTextBoxFlag xmlns:ma14="http://schemas.microsoft.com/office/mac/drawingml/2011/main" xmlns:a14="http://schemas.microsoft.com/office/drawing/2010/main" xmlns:m="http://schemas.openxmlformats.org/officeDocument/2006/math" xmlns="" val="1"/>
+              <ma14:wrappingTextBoxFlag xmlns="" xmlns:m="http://schemas.openxmlformats.org/officeDocument/2006/math" xmlns:a14="http://schemas.microsoft.com/office/drawing/2010/main" xmlns:ma14="http://schemas.microsoft.com/office/mac/drawingml/2011/main" val="1"/>
             </a:ext>
           </a:extLst>
         </p:spPr>
@@ -3626,7 +3631,7 @@
               <a:effectLst/>
               <a:extLst>
                 <a:ext uri="{C572A759-6A51-4108-AA02-DFA0A04FC94B}">
-                  <ma14:wrappingTextBoxFlag xmlns:ma14="http://schemas.microsoft.com/office/mac/drawingml/2011/main" xmlns:a14="http://schemas.microsoft.com/office/drawing/2010/main" xmlns:m="http://schemas.openxmlformats.org/officeDocument/2006/math" xmlns="" val="1"/>
+                  <ma14:wrappingTextBoxFlag xmlns="" xmlns:m="http://schemas.openxmlformats.org/officeDocument/2006/math" xmlns:a14="http://schemas.microsoft.com/office/drawing/2010/main" xmlns:ma14="http://schemas.microsoft.com/office/mac/drawingml/2011/main" val="1"/>
                 </a:ext>
               </a:extLst>
             </p:spPr>
@@ -4174,7 +4179,7 @@
           </a:ln>
           <a:extLst>
             <a:ext uri="{C572A759-6A51-4108-AA02-DFA0A04FC94B}">
-              <ma14:wrappingTextBoxFlag xmlns:ma14="http://schemas.microsoft.com/office/mac/drawingml/2011/main" xmlns:a14="http://schemas.microsoft.com/office/drawing/2010/main" xmlns:m="http://schemas.openxmlformats.org/officeDocument/2006/math" xmlns="" val="1"/>
+              <ma14:wrappingTextBoxFlag xmlns="" xmlns:m="http://schemas.openxmlformats.org/officeDocument/2006/math" xmlns:a14="http://schemas.microsoft.com/office/drawing/2010/main" xmlns:ma14="http://schemas.microsoft.com/office/mac/drawingml/2011/main" val="1"/>
             </a:ext>
           </a:extLst>
         </p:spPr>
@@ -4431,7 +4436,7 @@
               <a:effectLst/>
               <a:extLst>
                 <a:ext uri="{C572A759-6A51-4108-AA02-DFA0A04FC94B}">
-                  <ma14:wrappingTextBoxFlag xmlns:ma14="http://schemas.microsoft.com/office/mac/drawingml/2011/main" xmlns:a14="http://schemas.microsoft.com/office/drawing/2010/main" xmlns:m="http://schemas.openxmlformats.org/officeDocument/2006/math" xmlns="" val="1"/>
+                  <ma14:wrappingTextBoxFlag xmlns="" xmlns:m="http://schemas.openxmlformats.org/officeDocument/2006/math" xmlns:a14="http://schemas.microsoft.com/office/drawing/2010/main" xmlns:ma14="http://schemas.microsoft.com/office/mac/drawingml/2011/main" val="1"/>
                 </a:ext>
               </a:extLst>
             </p:spPr>
@@ -5901,10 +5906,23 @@
           <a:lstStyle/>
           <a:p>
             <a:r>
-              <a:t>Data Import : : </a:t>
-            </a:r>
-            <a:r>
-              <a:rPr sz="3300" b="1">
+              <a:rPr dirty="0"/>
+              <a:t>Data Import</a:t>
+            </a:r>
+            <a:r>
+              <a:rPr lang="en-US" dirty="0"/>
+              <a:t> with the </a:t>
+            </a:r>
+            <a:r>
+              <a:rPr lang="en-US" dirty="0" err="1"/>
+              <a:t>tidyverse</a:t>
+            </a:r>
+            <a:r>
+              <a:rPr dirty="0"/>
+              <a:t> : : </a:t>
+            </a:r>
+            <a:r>
+              <a:rPr sz="3300" b="1" dirty="0">
                 <a:latin typeface="SourceSansPro-SemiBold"/>
                 <a:ea typeface="SourceSansPro-SemiBold"/>
                 <a:cs typeface="SourceSansPro-SemiBold"/>
@@ -5913,6 +5931,7 @@
               <a:t>CHEAT SHEET</a:t>
             </a:r>
             <a:r>
+              <a:rPr dirty="0"/>
               <a:t> </a:t>
             </a:r>
           </a:p>
@@ -5983,7 +6002,7 @@
           </a:ln>
           <a:extLst>
             <a:ext uri="{C572A759-6A51-4108-AA02-DFA0A04FC94B}">
-              <ma14:wrappingTextBoxFlag xmlns:ma14="http://schemas.microsoft.com/office/mac/drawingml/2011/main" xmlns:a14="http://schemas.microsoft.com/office/drawing/2010/main" xmlns:m="http://schemas.openxmlformats.org/officeDocument/2006/math" xmlns="" val="1"/>
+              <ma14:wrappingTextBoxFlag xmlns="" xmlns:m="http://schemas.openxmlformats.org/officeDocument/2006/math" xmlns:a14="http://schemas.microsoft.com/office/drawing/2010/main" xmlns:ma14="http://schemas.microsoft.com/office/mac/drawingml/2011/main" val="1"/>
             </a:ext>
           </a:extLst>
         </p:spPr>
@@ -6165,7 +6184,7 @@
           </a:ln>
           <a:extLst>
             <a:ext uri="{C572A759-6A51-4108-AA02-DFA0A04FC94B}">
-              <ma14:wrappingTextBoxFlag xmlns:ma14="http://schemas.microsoft.com/office/mac/drawingml/2011/main" xmlns:a14="http://schemas.microsoft.com/office/drawing/2010/main" xmlns:m="http://schemas.openxmlformats.org/officeDocument/2006/math" xmlns="" val="1"/>
+              <ma14:wrappingTextBoxFlag xmlns="" xmlns:m="http://schemas.openxmlformats.org/officeDocument/2006/math" xmlns:a14="http://schemas.microsoft.com/office/drawing/2010/main" xmlns:ma14="http://schemas.microsoft.com/office/mac/drawingml/2011/main" val="1"/>
             </a:ext>
           </a:extLst>
         </p:spPr>
@@ -6423,7 +6442,7 @@
           </a:ln>
           <a:extLst>
             <a:ext uri="{C572A759-6A51-4108-AA02-DFA0A04FC94B}">
-              <ma14:wrappingTextBoxFlag xmlns:ma14="http://schemas.microsoft.com/office/mac/drawingml/2011/main" xmlns:a14="http://schemas.microsoft.com/office/drawing/2010/main" xmlns:m="http://schemas.openxmlformats.org/officeDocument/2006/math" xmlns="" val="1"/>
+              <ma14:wrappingTextBoxFlag xmlns="" xmlns:m="http://schemas.openxmlformats.org/officeDocument/2006/math" xmlns:a14="http://schemas.microsoft.com/office/drawing/2010/main" xmlns:ma14="http://schemas.microsoft.com/office/mac/drawingml/2011/main" val="1"/>
             </a:ext>
           </a:extLst>
         </p:spPr>
@@ -6476,7 +6495,7 @@
           </a:ln>
           <a:extLst>
             <a:ext uri="{C572A759-6A51-4108-AA02-DFA0A04FC94B}">
-              <ma14:wrappingTextBoxFlag xmlns:ma14="http://schemas.microsoft.com/office/mac/drawingml/2011/main" xmlns:a14="http://schemas.microsoft.com/office/drawing/2010/main" xmlns:m="http://schemas.openxmlformats.org/officeDocument/2006/math" xmlns="" val="1"/>
+              <ma14:wrappingTextBoxFlag xmlns="" xmlns:m="http://schemas.openxmlformats.org/officeDocument/2006/math" xmlns:a14="http://schemas.microsoft.com/office/drawing/2010/main" xmlns:ma14="http://schemas.microsoft.com/office/mac/drawingml/2011/main" val="1"/>
             </a:ext>
           </a:extLst>
         </p:spPr>
@@ -6512,7 +6531,7 @@
           </a:ln>
           <a:extLst>
             <a:ext uri="{C572A759-6A51-4108-AA02-DFA0A04FC94B}">
-              <ma14:wrappingTextBoxFlag xmlns:ma14="http://schemas.microsoft.com/office/mac/drawingml/2011/main" xmlns:a14="http://schemas.microsoft.com/office/drawing/2010/main" xmlns:m="http://schemas.openxmlformats.org/officeDocument/2006/math" xmlns="" val="1"/>
+              <ma14:wrappingTextBoxFlag xmlns="" xmlns:m="http://schemas.openxmlformats.org/officeDocument/2006/math" xmlns:a14="http://schemas.microsoft.com/office/drawing/2010/main" xmlns:ma14="http://schemas.microsoft.com/office/mac/drawingml/2011/main" val="1"/>
             </a:ext>
           </a:extLst>
         </p:spPr>
@@ -6576,7 +6595,7 @@
           <a:effectLst/>
           <a:extLst>
             <a:ext uri="{C572A759-6A51-4108-AA02-DFA0A04FC94B}">
-              <ma14:wrappingTextBoxFlag xmlns:ma14="http://schemas.microsoft.com/office/mac/drawingml/2011/main" xmlns:a14="http://schemas.microsoft.com/office/drawing/2010/main" xmlns:m="http://schemas.openxmlformats.org/officeDocument/2006/math" xmlns="" val="1"/>
+              <ma14:wrappingTextBoxFlag xmlns="" xmlns:m="http://schemas.openxmlformats.org/officeDocument/2006/math" xmlns:a14="http://schemas.microsoft.com/office/drawing/2010/main" xmlns:ma14="http://schemas.microsoft.com/office/mac/drawingml/2011/main" val="1"/>
             </a:ext>
           </a:extLst>
         </p:spPr>
@@ -6825,7 +6844,7 @@
           <a:effectLst/>
           <a:extLst>
             <a:ext uri="{C572A759-6A51-4108-AA02-DFA0A04FC94B}">
-              <ma14:wrappingTextBoxFlag xmlns:ma14="http://schemas.microsoft.com/office/mac/drawingml/2011/main" xmlns:a14="http://schemas.microsoft.com/office/drawing/2010/main" xmlns:m="http://schemas.openxmlformats.org/officeDocument/2006/math" xmlns="" val="1"/>
+              <ma14:wrappingTextBoxFlag xmlns="" xmlns:m="http://schemas.openxmlformats.org/officeDocument/2006/math" xmlns:a14="http://schemas.microsoft.com/office/drawing/2010/main" xmlns:ma14="http://schemas.microsoft.com/office/mac/drawingml/2011/main" val="1"/>
             </a:ext>
           </a:extLst>
         </p:spPr>
@@ -6953,7 +6972,7 @@
           <a:effectLst/>
           <a:extLst>
             <a:ext uri="{C572A759-6A51-4108-AA02-DFA0A04FC94B}">
-              <ma14:wrappingTextBoxFlag xmlns:ma14="http://schemas.microsoft.com/office/mac/drawingml/2011/main" xmlns:a14="http://schemas.microsoft.com/office/drawing/2010/main" xmlns:m="http://schemas.openxmlformats.org/officeDocument/2006/math" xmlns="" val="1"/>
+              <ma14:wrappingTextBoxFlag xmlns="" xmlns:m="http://schemas.openxmlformats.org/officeDocument/2006/math" xmlns:a14="http://schemas.microsoft.com/office/drawing/2010/main" xmlns:ma14="http://schemas.microsoft.com/office/mac/drawingml/2011/main" val="1"/>
             </a:ext>
           </a:extLst>
         </p:spPr>
@@ -7106,7 +7125,7 @@
           <a:effectLst/>
           <a:extLst>
             <a:ext uri="{C572A759-6A51-4108-AA02-DFA0A04FC94B}">
-              <ma14:wrappingTextBoxFlag xmlns:ma14="http://schemas.microsoft.com/office/mac/drawingml/2011/main" xmlns:a14="http://schemas.microsoft.com/office/drawing/2010/main" xmlns:m="http://schemas.openxmlformats.org/officeDocument/2006/math" xmlns="" val="1"/>
+              <ma14:wrappingTextBoxFlag xmlns="" xmlns:m="http://schemas.openxmlformats.org/officeDocument/2006/math" xmlns:a14="http://schemas.microsoft.com/office/drawing/2010/main" xmlns:ma14="http://schemas.microsoft.com/office/mac/drawingml/2011/main" val="1"/>
             </a:ext>
           </a:extLst>
         </p:spPr>
@@ -7171,7 +7190,7 @@
           </a:ln>
           <a:extLst>
             <a:ext uri="{C572A759-6A51-4108-AA02-DFA0A04FC94B}">
-              <ma14:wrappingTextBoxFlag xmlns:ma14="http://schemas.microsoft.com/office/mac/drawingml/2011/main" xmlns:a14="http://schemas.microsoft.com/office/drawing/2010/main" xmlns:m="http://schemas.openxmlformats.org/officeDocument/2006/math" xmlns="" val="1"/>
+              <ma14:wrappingTextBoxFlag xmlns="" xmlns:m="http://schemas.openxmlformats.org/officeDocument/2006/math" xmlns:a14="http://schemas.microsoft.com/office/drawing/2010/main" xmlns:ma14="http://schemas.microsoft.com/office/mac/drawingml/2011/main" val="1"/>
             </a:ext>
           </a:extLst>
         </p:spPr>
@@ -7436,7 +7455,7 @@
           </a:ln>
           <a:extLst>
             <a:ext uri="{C572A759-6A51-4108-AA02-DFA0A04FC94B}">
-              <ma14:wrappingTextBoxFlag xmlns:ma14="http://schemas.microsoft.com/office/mac/drawingml/2011/main" xmlns:a14="http://schemas.microsoft.com/office/drawing/2010/main" xmlns:m="http://schemas.openxmlformats.org/officeDocument/2006/math" xmlns="" val="1"/>
+              <ma14:wrappingTextBoxFlag xmlns="" xmlns:m="http://schemas.openxmlformats.org/officeDocument/2006/math" xmlns:a14="http://schemas.microsoft.com/office/drawing/2010/main" xmlns:ma14="http://schemas.microsoft.com/office/mac/drawingml/2011/main" val="1"/>
             </a:ext>
           </a:extLst>
         </p:spPr>
@@ -7472,7 +7491,7 @@
           </a:ln>
           <a:extLst>
             <a:ext uri="{C572A759-6A51-4108-AA02-DFA0A04FC94B}">
-              <ma14:wrappingTextBoxFlag xmlns:ma14="http://schemas.microsoft.com/office/mac/drawingml/2011/main" xmlns:a14="http://schemas.microsoft.com/office/drawing/2010/main" xmlns:m="http://schemas.openxmlformats.org/officeDocument/2006/math" xmlns="" val="1"/>
+              <ma14:wrappingTextBoxFlag xmlns="" xmlns:m="http://schemas.openxmlformats.org/officeDocument/2006/math" xmlns:a14="http://schemas.microsoft.com/office/drawing/2010/main" xmlns:ma14="http://schemas.microsoft.com/office/mac/drawingml/2011/main" val="1"/>
             </a:ext>
           </a:extLst>
         </p:spPr>
@@ -7571,7 +7590,7 @@
           </a:ln>
           <a:extLst>
             <a:ext uri="{C572A759-6A51-4108-AA02-DFA0A04FC94B}">
-              <ma14:wrappingTextBoxFlag xmlns:ma14="http://schemas.microsoft.com/office/mac/drawingml/2011/main" xmlns:a14="http://schemas.microsoft.com/office/drawing/2010/main" xmlns:m="http://schemas.openxmlformats.org/officeDocument/2006/math" xmlns="" val="1"/>
+              <ma14:wrappingTextBoxFlag xmlns="" xmlns:m="http://schemas.openxmlformats.org/officeDocument/2006/math" xmlns:a14="http://schemas.microsoft.com/office/drawing/2010/main" xmlns:ma14="http://schemas.microsoft.com/office/mac/drawingml/2011/main" val="1"/>
             </a:ext>
           </a:extLst>
         </p:spPr>
@@ -8013,7 +8032,7 @@
           </a:ln>
           <a:extLst>
             <a:ext uri="{C572A759-6A51-4108-AA02-DFA0A04FC94B}">
-              <ma14:wrappingTextBoxFlag xmlns:ma14="http://schemas.microsoft.com/office/mac/drawingml/2011/main" xmlns:a14="http://schemas.microsoft.com/office/drawing/2010/main" xmlns:m="http://schemas.openxmlformats.org/officeDocument/2006/math" xmlns="" val="1"/>
+              <ma14:wrappingTextBoxFlag xmlns="" xmlns:m="http://schemas.openxmlformats.org/officeDocument/2006/math" xmlns:a14="http://schemas.microsoft.com/office/drawing/2010/main" xmlns:ma14="http://schemas.microsoft.com/office/mac/drawingml/2011/main" val="1"/>
             </a:ext>
           </a:extLst>
         </p:spPr>
@@ -9376,7 +9395,7 @@
           </a:ln>
           <a:extLst>
             <a:ext uri="{C572A759-6A51-4108-AA02-DFA0A04FC94B}">
-              <ma14:wrappingTextBoxFlag xmlns:ma14="http://schemas.microsoft.com/office/mac/drawingml/2011/main" xmlns:a14="http://schemas.microsoft.com/office/drawing/2010/main" xmlns:m="http://schemas.openxmlformats.org/officeDocument/2006/math" xmlns="" val="1"/>
+              <ma14:wrappingTextBoxFlag xmlns="" xmlns:m="http://schemas.openxmlformats.org/officeDocument/2006/math" xmlns:a14="http://schemas.microsoft.com/office/drawing/2010/main" xmlns:ma14="http://schemas.microsoft.com/office/mac/drawingml/2011/main" val="1"/>
             </a:ext>
           </a:extLst>
         </p:spPr>
@@ -9601,7 +9620,7 @@
           </a:ln>
           <a:extLst>
             <a:ext uri="{C572A759-6A51-4108-AA02-DFA0A04FC94B}">
-              <ma14:wrappingTextBoxFlag xmlns:ma14="http://schemas.microsoft.com/office/mac/drawingml/2011/main" xmlns:a14="http://schemas.microsoft.com/office/drawing/2010/main" xmlns:m="http://schemas.openxmlformats.org/officeDocument/2006/math" xmlns="" val="1"/>
+              <ma14:wrappingTextBoxFlag xmlns="" xmlns:m="http://schemas.openxmlformats.org/officeDocument/2006/math" xmlns:a14="http://schemas.microsoft.com/office/drawing/2010/main" xmlns:ma14="http://schemas.microsoft.com/office/mac/drawingml/2011/main" val="1"/>
             </a:ext>
           </a:extLst>
         </p:spPr>
@@ -9845,7 +9864,7 @@
           </a:ln>
           <a:extLst>
             <a:ext uri="{C572A759-6A51-4108-AA02-DFA0A04FC94B}">
-              <ma14:wrappingTextBoxFlag xmlns:ma14="http://schemas.microsoft.com/office/mac/drawingml/2011/main" xmlns:a14="http://schemas.microsoft.com/office/drawing/2010/main" xmlns:m="http://schemas.openxmlformats.org/officeDocument/2006/math" xmlns="" val="1"/>
+              <ma14:wrappingTextBoxFlag xmlns="" xmlns:m="http://schemas.openxmlformats.org/officeDocument/2006/math" xmlns:a14="http://schemas.microsoft.com/office/drawing/2010/main" xmlns:ma14="http://schemas.microsoft.com/office/mac/drawingml/2011/main" val="1"/>
             </a:ext>
           </a:extLst>
         </p:spPr>
@@ -9952,7 +9971,7 @@
           </a:ln>
           <a:extLst>
             <a:ext uri="{C572A759-6A51-4108-AA02-DFA0A04FC94B}">
-              <ma14:wrappingTextBoxFlag xmlns:ma14="http://schemas.microsoft.com/office/mac/drawingml/2011/main" xmlns:a14="http://schemas.microsoft.com/office/drawing/2010/main" xmlns:m="http://schemas.openxmlformats.org/officeDocument/2006/math" xmlns="" val="1"/>
+              <ma14:wrappingTextBoxFlag xmlns="" xmlns:m="http://schemas.openxmlformats.org/officeDocument/2006/math" xmlns:a14="http://schemas.microsoft.com/office/drawing/2010/main" xmlns:ma14="http://schemas.microsoft.com/office/mac/drawingml/2011/main" val="1"/>
             </a:ext>
           </a:extLst>
         </p:spPr>
@@ -10032,7 +10051,7 @@
           </a:ln>
           <a:extLst>
             <a:ext uri="{C572A759-6A51-4108-AA02-DFA0A04FC94B}">
-              <ma14:wrappingTextBoxFlag xmlns:ma14="http://schemas.microsoft.com/office/mac/drawingml/2011/main" xmlns:a14="http://schemas.microsoft.com/office/drawing/2010/main" xmlns:m="http://schemas.openxmlformats.org/officeDocument/2006/math" xmlns="" val="1"/>
+              <ma14:wrappingTextBoxFlag xmlns="" xmlns:m="http://schemas.openxmlformats.org/officeDocument/2006/math" xmlns:a14="http://schemas.microsoft.com/office/drawing/2010/main" xmlns:ma14="http://schemas.microsoft.com/office/mac/drawingml/2011/main" val="1"/>
             </a:ext>
           </a:extLst>
         </p:spPr>
@@ -10388,7 +10407,7 @@
           </a:ln>
           <a:extLst>
             <a:ext uri="{C572A759-6A51-4108-AA02-DFA0A04FC94B}">
-              <ma14:wrappingTextBoxFlag xmlns:ma14="http://schemas.microsoft.com/office/mac/drawingml/2011/main" xmlns:a14="http://schemas.microsoft.com/office/drawing/2010/main" xmlns:m="http://schemas.openxmlformats.org/officeDocument/2006/math" xmlns="" val="1"/>
+              <ma14:wrappingTextBoxFlag xmlns="" xmlns:m="http://schemas.openxmlformats.org/officeDocument/2006/math" xmlns:a14="http://schemas.microsoft.com/office/drawing/2010/main" xmlns:ma14="http://schemas.microsoft.com/office/mac/drawingml/2011/main" val="1"/>
             </a:ext>
           </a:extLst>
         </p:spPr>
@@ -10444,7 +10463,7 @@
           </a:ln>
           <a:extLst>
             <a:ext uri="{C572A759-6A51-4108-AA02-DFA0A04FC94B}">
-              <ma14:wrappingTextBoxFlag xmlns:ma14="http://schemas.microsoft.com/office/mac/drawingml/2011/main" xmlns:a14="http://schemas.microsoft.com/office/drawing/2010/main" xmlns:m="http://schemas.openxmlformats.org/officeDocument/2006/math" xmlns="" val="1"/>
+              <ma14:wrappingTextBoxFlag xmlns="" xmlns:m="http://schemas.openxmlformats.org/officeDocument/2006/math" xmlns:a14="http://schemas.microsoft.com/office/drawing/2010/main" xmlns:ma14="http://schemas.microsoft.com/office/mac/drawingml/2011/main" val="1"/>
             </a:ext>
           </a:extLst>
         </p:spPr>
@@ -10851,7 +10870,7 @@
               <a:effectLst/>
               <a:extLst>
                 <a:ext uri="{C572A759-6A51-4108-AA02-DFA0A04FC94B}">
-                  <ma14:wrappingTextBoxFlag xmlns:ma14="http://schemas.microsoft.com/office/mac/drawingml/2011/main" xmlns:a14="http://schemas.microsoft.com/office/drawing/2010/main" xmlns:m="http://schemas.openxmlformats.org/officeDocument/2006/math" xmlns="" val="1"/>
+                  <ma14:wrappingTextBoxFlag xmlns="" xmlns:m="http://schemas.openxmlformats.org/officeDocument/2006/math" xmlns:a14="http://schemas.microsoft.com/office/drawing/2010/main" xmlns:ma14="http://schemas.microsoft.com/office/mac/drawingml/2011/main" val="1"/>
                 </a:ext>
               </a:extLst>
             </p:spPr>
@@ -11347,7 +11366,7 @@
           </a:ln>
           <a:extLst>
             <a:ext uri="{C572A759-6A51-4108-AA02-DFA0A04FC94B}">
-              <ma14:wrappingTextBoxFlag xmlns:ma14="http://schemas.microsoft.com/office/mac/drawingml/2011/main" xmlns:a14="http://schemas.microsoft.com/office/drawing/2010/main" xmlns:m="http://schemas.openxmlformats.org/officeDocument/2006/math" xmlns="" val="1"/>
+              <ma14:wrappingTextBoxFlag xmlns="" xmlns:m="http://schemas.openxmlformats.org/officeDocument/2006/math" xmlns:a14="http://schemas.microsoft.com/office/drawing/2010/main" xmlns:ma14="http://schemas.microsoft.com/office/mac/drawingml/2011/main" val="1"/>
             </a:ext>
           </a:extLst>
         </p:spPr>
@@ -11556,7 +11575,7 @@
           </a:ln>
           <a:extLst>
             <a:ext uri="{C572A759-6A51-4108-AA02-DFA0A04FC94B}">
-              <ma14:wrappingTextBoxFlag xmlns:ma14="http://schemas.microsoft.com/office/mac/drawingml/2011/main" xmlns:a14="http://schemas.microsoft.com/office/drawing/2010/main" xmlns:m="http://schemas.openxmlformats.org/officeDocument/2006/math" xmlns="" val="1"/>
+              <ma14:wrappingTextBoxFlag xmlns="" xmlns:m="http://schemas.openxmlformats.org/officeDocument/2006/math" xmlns:a14="http://schemas.microsoft.com/office/drawing/2010/main" xmlns:ma14="http://schemas.microsoft.com/office/mac/drawingml/2011/main" val="1"/>
             </a:ext>
           </a:extLst>
         </p:spPr>
@@ -11868,7 +11887,7 @@
           </a:ln>
           <a:extLst>
             <a:ext uri="{C572A759-6A51-4108-AA02-DFA0A04FC94B}">
-              <ma14:wrappingTextBoxFlag xmlns:ma14="http://schemas.microsoft.com/office/mac/drawingml/2011/main" xmlns:a14="http://schemas.microsoft.com/office/drawing/2010/main" xmlns:m="http://schemas.openxmlformats.org/officeDocument/2006/math" xmlns="" val="1"/>
+              <ma14:wrappingTextBoxFlag xmlns="" xmlns:m="http://schemas.openxmlformats.org/officeDocument/2006/math" xmlns:a14="http://schemas.microsoft.com/office/drawing/2010/main" xmlns:ma14="http://schemas.microsoft.com/office/mac/drawingml/2011/main" val="1"/>
             </a:ext>
           </a:extLst>
         </p:spPr>
@@ -12210,7 +12229,7 @@
               <a:effectLst/>
               <a:extLst>
                 <a:ext uri="{C572A759-6A51-4108-AA02-DFA0A04FC94B}">
-                  <ma14:wrappingTextBoxFlag xmlns:ma14="http://schemas.microsoft.com/office/mac/drawingml/2011/main" xmlns:a14="http://schemas.microsoft.com/office/drawing/2010/main" xmlns:m="http://schemas.openxmlformats.org/officeDocument/2006/math" xmlns="" val="1"/>
+                  <ma14:wrappingTextBoxFlag xmlns="" xmlns:m="http://schemas.openxmlformats.org/officeDocument/2006/math" xmlns:a14="http://schemas.microsoft.com/office/drawing/2010/main" xmlns:ma14="http://schemas.microsoft.com/office/mac/drawingml/2011/main" val="1"/>
                 </a:ext>
               </a:extLst>
             </p:spPr>
@@ -12869,7 +12888,7 @@
               <a:effectLst/>
               <a:extLst>
                 <a:ext uri="{C572A759-6A51-4108-AA02-DFA0A04FC94B}">
-                  <ma14:wrappingTextBoxFlag xmlns:ma14="http://schemas.microsoft.com/office/mac/drawingml/2011/main" xmlns:a14="http://schemas.microsoft.com/office/drawing/2010/main" xmlns:m="http://schemas.openxmlformats.org/officeDocument/2006/math" xmlns="" val="1"/>
+                  <ma14:wrappingTextBoxFlag xmlns="" xmlns:m="http://schemas.openxmlformats.org/officeDocument/2006/math" xmlns:a14="http://schemas.microsoft.com/office/drawing/2010/main" xmlns:ma14="http://schemas.microsoft.com/office/mac/drawingml/2011/main" val="1"/>
                 </a:ext>
               </a:extLst>
             </p:spPr>
@@ -14152,7 +14171,7 @@
           </a:ln>
           <a:extLst>
             <a:ext uri="{C572A759-6A51-4108-AA02-DFA0A04FC94B}">
-              <ma14:wrappingTextBoxFlag xmlns:ma14="http://schemas.microsoft.com/office/mac/drawingml/2011/main" xmlns:a14="http://schemas.microsoft.com/office/drawing/2010/main" xmlns:m="http://schemas.openxmlformats.org/officeDocument/2006/math" xmlns="" val="1"/>
+              <ma14:wrappingTextBoxFlag xmlns="" xmlns:m="http://schemas.openxmlformats.org/officeDocument/2006/math" xmlns:a14="http://schemas.microsoft.com/office/drawing/2010/main" xmlns:ma14="http://schemas.microsoft.com/office/mac/drawingml/2011/main" val="1"/>
             </a:ext>
           </a:extLst>
         </p:spPr>
@@ -14262,7 +14281,7 @@
           </a:ln>
           <a:extLst>
             <a:ext uri="{C572A759-6A51-4108-AA02-DFA0A04FC94B}">
-              <ma14:wrappingTextBoxFlag xmlns:ma14="http://schemas.microsoft.com/office/mac/drawingml/2011/main" xmlns:a14="http://schemas.microsoft.com/office/drawing/2010/main" xmlns:m="http://schemas.openxmlformats.org/officeDocument/2006/math" xmlns="" val="1"/>
+              <ma14:wrappingTextBoxFlag xmlns="" xmlns:m="http://schemas.openxmlformats.org/officeDocument/2006/math" xmlns:a14="http://schemas.microsoft.com/office/drawing/2010/main" xmlns:ma14="http://schemas.microsoft.com/office/mac/drawingml/2011/main" val="1"/>
             </a:ext>
           </a:extLst>
         </p:spPr>
@@ -14463,7 +14482,7 @@
           </a:ln>
           <a:extLst>
             <a:ext uri="{C572A759-6A51-4108-AA02-DFA0A04FC94B}">
-              <ma14:wrappingTextBoxFlag xmlns:ma14="http://schemas.microsoft.com/office/mac/drawingml/2011/main" xmlns:a14="http://schemas.microsoft.com/office/drawing/2010/main" xmlns:m="http://schemas.openxmlformats.org/officeDocument/2006/math" xmlns="" val="1"/>
+              <ma14:wrappingTextBoxFlag xmlns="" xmlns:m="http://schemas.openxmlformats.org/officeDocument/2006/math" xmlns:a14="http://schemas.microsoft.com/office/drawing/2010/main" xmlns:ma14="http://schemas.microsoft.com/office/mac/drawingml/2011/main" val="1"/>
             </a:ext>
           </a:extLst>
         </p:spPr>
@@ -15760,7 +15779,7 @@
           </a:ln>
           <a:extLst>
             <a:ext uri="{C572A759-6A51-4108-AA02-DFA0A04FC94B}">
-              <ma14:wrappingTextBoxFlag xmlns:ma14="http://schemas.microsoft.com/office/mac/drawingml/2011/main" xmlns:a14="http://schemas.microsoft.com/office/drawing/2010/main" xmlns:m="http://schemas.openxmlformats.org/officeDocument/2006/math" xmlns="" val="1"/>
+              <ma14:wrappingTextBoxFlag xmlns="" xmlns:m="http://schemas.openxmlformats.org/officeDocument/2006/math" xmlns:a14="http://schemas.microsoft.com/office/drawing/2010/main" xmlns:ma14="http://schemas.microsoft.com/office/mac/drawingml/2011/main" val="1"/>
             </a:ext>
           </a:extLst>
         </p:spPr>
@@ -15812,7 +15831,7 @@
           </a:ln>
           <a:extLst>
             <a:ext uri="{C572A759-6A51-4108-AA02-DFA0A04FC94B}">
-              <ma14:wrappingTextBoxFlag xmlns:ma14="http://schemas.microsoft.com/office/mac/drawingml/2011/main" xmlns:a14="http://schemas.microsoft.com/office/drawing/2010/main" xmlns:m="http://schemas.openxmlformats.org/officeDocument/2006/math" xmlns="" val="1"/>
+              <ma14:wrappingTextBoxFlag xmlns="" xmlns:m="http://schemas.openxmlformats.org/officeDocument/2006/math" xmlns:a14="http://schemas.microsoft.com/office/drawing/2010/main" xmlns:ma14="http://schemas.microsoft.com/office/mac/drawingml/2011/main" val="1"/>
             </a:ext>
           </a:extLst>
         </p:spPr>
@@ -15864,7 +15883,7 @@
           </a:ln>
           <a:extLst>
             <a:ext uri="{C572A759-6A51-4108-AA02-DFA0A04FC94B}">
-              <ma14:wrappingTextBoxFlag xmlns:ma14="http://schemas.microsoft.com/office/mac/drawingml/2011/main" xmlns:a14="http://schemas.microsoft.com/office/drawing/2010/main" xmlns:m="http://schemas.openxmlformats.org/officeDocument/2006/math" xmlns="" val="1"/>
+              <ma14:wrappingTextBoxFlag xmlns="" xmlns:m="http://schemas.openxmlformats.org/officeDocument/2006/math" xmlns:a14="http://schemas.microsoft.com/office/drawing/2010/main" xmlns:ma14="http://schemas.microsoft.com/office/mac/drawingml/2011/main" val="1"/>
             </a:ext>
           </a:extLst>
         </p:spPr>
@@ -15952,7 +15971,7 @@
           </a:ln>
           <a:extLst>
             <a:ext uri="{C572A759-6A51-4108-AA02-DFA0A04FC94B}">
-              <ma14:wrappingTextBoxFlag xmlns:ma14="http://schemas.microsoft.com/office/mac/drawingml/2011/main" xmlns:a14="http://schemas.microsoft.com/office/drawing/2010/main" xmlns:m="http://schemas.openxmlformats.org/officeDocument/2006/math" xmlns="" val="1"/>
+              <ma14:wrappingTextBoxFlag xmlns="" xmlns:m="http://schemas.openxmlformats.org/officeDocument/2006/math" xmlns:a14="http://schemas.microsoft.com/office/drawing/2010/main" xmlns:ma14="http://schemas.microsoft.com/office/mac/drawingml/2011/main" val="1"/>
             </a:ext>
           </a:extLst>
         </p:spPr>
@@ -16084,7 +16103,7 @@
           </a:ln>
           <a:extLst>
             <a:ext uri="{C572A759-6A51-4108-AA02-DFA0A04FC94B}">
-              <ma14:wrappingTextBoxFlag xmlns:ma14="http://schemas.microsoft.com/office/mac/drawingml/2011/main" xmlns:a14="http://schemas.microsoft.com/office/drawing/2010/main" xmlns:m="http://schemas.openxmlformats.org/officeDocument/2006/math" xmlns="" val="1"/>
+              <ma14:wrappingTextBoxFlag xmlns="" xmlns:m="http://schemas.openxmlformats.org/officeDocument/2006/math" xmlns:a14="http://schemas.microsoft.com/office/drawing/2010/main" xmlns:ma14="http://schemas.microsoft.com/office/mac/drawingml/2011/main" val="1"/>
             </a:ext>
           </a:extLst>
         </p:spPr>
@@ -16174,7 +16193,7 @@
           </a:ln>
           <a:extLst>
             <a:ext uri="{C572A759-6A51-4108-AA02-DFA0A04FC94B}">
-              <ma14:wrappingTextBoxFlag xmlns:ma14="http://schemas.microsoft.com/office/mac/drawingml/2011/main" xmlns:a14="http://schemas.microsoft.com/office/drawing/2010/main" xmlns:m="http://schemas.openxmlformats.org/officeDocument/2006/math" xmlns="" val="1"/>
+              <ma14:wrappingTextBoxFlag xmlns="" xmlns:m="http://schemas.openxmlformats.org/officeDocument/2006/math" xmlns:a14="http://schemas.microsoft.com/office/drawing/2010/main" xmlns:ma14="http://schemas.microsoft.com/office/mac/drawingml/2011/main" val="1"/>
             </a:ext>
           </a:extLst>
         </p:spPr>
@@ -16318,7 +16337,7 @@
           </a:ln>
           <a:extLst>
             <a:ext uri="{C572A759-6A51-4108-AA02-DFA0A04FC94B}">
-              <ma14:wrappingTextBoxFlag xmlns:ma14="http://schemas.microsoft.com/office/mac/drawingml/2011/main" xmlns:a14="http://schemas.microsoft.com/office/drawing/2010/main" xmlns:m="http://schemas.openxmlformats.org/officeDocument/2006/math" xmlns="" val="1"/>
+              <ma14:wrappingTextBoxFlag xmlns="" xmlns:m="http://schemas.openxmlformats.org/officeDocument/2006/math" xmlns:a14="http://schemas.microsoft.com/office/drawing/2010/main" xmlns:ma14="http://schemas.microsoft.com/office/mac/drawingml/2011/main" val="1"/>
             </a:ext>
           </a:extLst>
         </p:spPr>
@@ -16360,7 +16379,7 @@
           </a:ln>
           <a:extLst>
             <a:ext uri="{C572A759-6A51-4108-AA02-DFA0A04FC94B}">
-              <ma14:wrappingTextBoxFlag xmlns:ma14="http://schemas.microsoft.com/office/mac/drawingml/2011/main" xmlns:a14="http://schemas.microsoft.com/office/drawing/2010/main" xmlns:m="http://schemas.openxmlformats.org/officeDocument/2006/math" xmlns="" val="1"/>
+              <ma14:wrappingTextBoxFlag xmlns="" xmlns:m="http://schemas.openxmlformats.org/officeDocument/2006/math" xmlns:a14="http://schemas.microsoft.com/office/drawing/2010/main" xmlns:ma14="http://schemas.microsoft.com/office/mac/drawingml/2011/main" val="1"/>
             </a:ext>
           </a:extLst>
         </p:spPr>
@@ -16523,7 +16542,7 @@
           </a:ln>
           <a:extLst>
             <a:ext uri="{C572A759-6A51-4108-AA02-DFA0A04FC94B}">
-              <ma14:wrappingTextBoxFlag xmlns:ma14="http://schemas.microsoft.com/office/mac/drawingml/2011/main" xmlns:a14="http://schemas.microsoft.com/office/drawing/2010/main" xmlns:m="http://schemas.openxmlformats.org/officeDocument/2006/math" xmlns="" val="1"/>
+              <ma14:wrappingTextBoxFlag xmlns="" xmlns:m="http://schemas.openxmlformats.org/officeDocument/2006/math" xmlns:a14="http://schemas.microsoft.com/office/drawing/2010/main" xmlns:ma14="http://schemas.microsoft.com/office/mac/drawingml/2011/main" val="1"/>
             </a:ext>
           </a:extLst>
         </p:spPr>
@@ -16565,7 +16584,7 @@
           </a:ln>
           <a:extLst>
             <a:ext uri="{C572A759-6A51-4108-AA02-DFA0A04FC94B}">
-              <ma14:wrappingTextBoxFlag xmlns:ma14="http://schemas.microsoft.com/office/mac/drawingml/2011/main" xmlns:a14="http://schemas.microsoft.com/office/drawing/2010/main" xmlns:m="http://schemas.openxmlformats.org/officeDocument/2006/math" xmlns="" val="1"/>
+              <ma14:wrappingTextBoxFlag xmlns="" xmlns:m="http://schemas.openxmlformats.org/officeDocument/2006/math" xmlns:a14="http://schemas.microsoft.com/office/drawing/2010/main" xmlns:ma14="http://schemas.microsoft.com/office/mac/drawingml/2011/main" val="1"/>
             </a:ext>
           </a:extLst>
         </p:spPr>
@@ -16680,7 +16699,7 @@
           </a:ln>
           <a:extLst>
             <a:ext uri="{C572A759-6A51-4108-AA02-DFA0A04FC94B}">
-              <ma14:wrappingTextBoxFlag xmlns:ma14="http://schemas.microsoft.com/office/mac/drawingml/2011/main" xmlns:a14="http://schemas.microsoft.com/office/drawing/2010/main" xmlns:m="http://schemas.openxmlformats.org/officeDocument/2006/math" xmlns="" val="1"/>
+              <ma14:wrappingTextBoxFlag xmlns="" xmlns:m="http://schemas.openxmlformats.org/officeDocument/2006/math" xmlns:a14="http://schemas.microsoft.com/office/drawing/2010/main" xmlns:ma14="http://schemas.microsoft.com/office/mac/drawingml/2011/main" val="1"/>
             </a:ext>
           </a:extLst>
         </p:spPr>
@@ -16784,7 +16803,7 @@
           </a:ln>
           <a:extLst>
             <a:ext uri="{C572A759-6A51-4108-AA02-DFA0A04FC94B}">
-              <ma14:wrappingTextBoxFlag xmlns:ma14="http://schemas.microsoft.com/office/mac/drawingml/2011/main" xmlns:a14="http://schemas.microsoft.com/office/drawing/2010/main" xmlns:m="http://schemas.openxmlformats.org/officeDocument/2006/math" xmlns="" val="1"/>
+              <ma14:wrappingTextBoxFlag xmlns="" xmlns:m="http://schemas.openxmlformats.org/officeDocument/2006/math" xmlns:a14="http://schemas.microsoft.com/office/drawing/2010/main" xmlns:ma14="http://schemas.microsoft.com/office/mac/drawingml/2011/main" val="1"/>
             </a:ext>
           </a:extLst>
         </p:spPr>
@@ -16826,7 +16845,7 @@
           </a:ln>
           <a:extLst>
             <a:ext uri="{C572A759-6A51-4108-AA02-DFA0A04FC94B}">
-              <ma14:wrappingTextBoxFlag xmlns:ma14="http://schemas.microsoft.com/office/mac/drawingml/2011/main" xmlns:a14="http://schemas.microsoft.com/office/drawing/2010/main" xmlns:m="http://schemas.openxmlformats.org/officeDocument/2006/math" xmlns="" val="1"/>
+              <ma14:wrappingTextBoxFlag xmlns="" xmlns:m="http://schemas.openxmlformats.org/officeDocument/2006/math" xmlns:a14="http://schemas.microsoft.com/office/drawing/2010/main" xmlns:ma14="http://schemas.microsoft.com/office/mac/drawingml/2011/main" val="1"/>
             </a:ext>
           </a:extLst>
         </p:spPr>
@@ -17108,7 +17127,7 @@
           </a:ln>
           <a:extLst>
             <a:ext uri="{C572A759-6A51-4108-AA02-DFA0A04FC94B}">
-              <ma14:wrappingTextBoxFlag xmlns:ma14="http://schemas.microsoft.com/office/mac/drawingml/2011/main" xmlns:a14="http://schemas.microsoft.com/office/drawing/2010/main" xmlns:m="http://schemas.openxmlformats.org/officeDocument/2006/math" xmlns="" val="1"/>
+              <ma14:wrappingTextBoxFlag xmlns="" xmlns:m="http://schemas.openxmlformats.org/officeDocument/2006/math" xmlns:a14="http://schemas.microsoft.com/office/drawing/2010/main" xmlns:ma14="http://schemas.microsoft.com/office/mac/drawingml/2011/main" val="1"/>
             </a:ext>
           </a:extLst>
         </p:spPr>
@@ -17246,7 +17265,7 @@
           </a:ln>
           <a:extLst>
             <a:ext uri="{C572A759-6A51-4108-AA02-DFA0A04FC94B}">
-              <ma14:wrappingTextBoxFlag xmlns:ma14="http://schemas.microsoft.com/office/mac/drawingml/2011/main" xmlns:a14="http://schemas.microsoft.com/office/drawing/2010/main" xmlns:m="http://schemas.openxmlformats.org/officeDocument/2006/math" xmlns="" val="1"/>
+              <ma14:wrappingTextBoxFlag xmlns="" xmlns:m="http://schemas.openxmlformats.org/officeDocument/2006/math" xmlns:a14="http://schemas.microsoft.com/office/drawing/2010/main" xmlns:ma14="http://schemas.microsoft.com/office/mac/drawingml/2011/main" val="1"/>
             </a:ext>
           </a:extLst>
         </p:spPr>
@@ -17336,7 +17355,7 @@
           </a:ln>
           <a:extLst>
             <a:ext uri="{C572A759-6A51-4108-AA02-DFA0A04FC94B}">
-              <ma14:wrappingTextBoxFlag xmlns:ma14="http://schemas.microsoft.com/office/mac/drawingml/2011/main" xmlns:a14="http://schemas.microsoft.com/office/drawing/2010/main" xmlns:m="http://schemas.openxmlformats.org/officeDocument/2006/math" xmlns="" val="1"/>
+              <ma14:wrappingTextBoxFlag xmlns="" xmlns:m="http://schemas.openxmlformats.org/officeDocument/2006/math" xmlns:a14="http://schemas.microsoft.com/office/drawing/2010/main" xmlns:ma14="http://schemas.microsoft.com/office/mac/drawingml/2011/main" val="1"/>
             </a:ext>
           </a:extLst>
         </p:spPr>
@@ -17378,7 +17397,7 @@
           </a:ln>
           <a:extLst>
             <a:ext uri="{C572A759-6A51-4108-AA02-DFA0A04FC94B}">
-              <ma14:wrappingTextBoxFlag xmlns:ma14="http://schemas.microsoft.com/office/mac/drawingml/2011/main" xmlns:a14="http://schemas.microsoft.com/office/drawing/2010/main" xmlns:m="http://schemas.openxmlformats.org/officeDocument/2006/math" xmlns="" val="1"/>
+              <ma14:wrappingTextBoxFlag xmlns="" xmlns:m="http://schemas.openxmlformats.org/officeDocument/2006/math" xmlns:a14="http://schemas.microsoft.com/office/drawing/2010/main" xmlns:ma14="http://schemas.microsoft.com/office/mac/drawingml/2011/main" val="1"/>
             </a:ext>
           </a:extLst>
         </p:spPr>
@@ -17741,7 +17760,7 @@
           </a:ln>
           <a:extLst>
             <a:ext uri="{C572A759-6A51-4108-AA02-DFA0A04FC94B}">
-              <ma14:wrappingTextBoxFlag xmlns:ma14="http://schemas.microsoft.com/office/mac/drawingml/2011/main" xmlns:a14="http://schemas.microsoft.com/office/drawing/2010/main" xmlns:m="http://schemas.openxmlformats.org/officeDocument/2006/math" xmlns="" val="1"/>
+              <ma14:wrappingTextBoxFlag xmlns="" xmlns:m="http://schemas.openxmlformats.org/officeDocument/2006/math" xmlns:a14="http://schemas.microsoft.com/office/drawing/2010/main" xmlns:ma14="http://schemas.microsoft.com/office/mac/drawingml/2011/main" val="1"/>
             </a:ext>
           </a:extLst>
         </p:spPr>
@@ -19335,7 +19354,7 @@
           </a:ln>
           <a:extLst>
             <a:ext uri="{C572A759-6A51-4108-AA02-DFA0A04FC94B}">
-              <ma14:wrappingTextBoxFlag xmlns:ma14="http://schemas.microsoft.com/office/mac/drawingml/2011/main" xmlns:a14="http://schemas.microsoft.com/office/drawing/2010/main" xmlns:m="http://schemas.openxmlformats.org/officeDocument/2006/math" xmlns="" val="1"/>
+              <ma14:wrappingTextBoxFlag xmlns="" xmlns:m="http://schemas.openxmlformats.org/officeDocument/2006/math" xmlns:a14="http://schemas.microsoft.com/office/drawing/2010/main" xmlns:ma14="http://schemas.microsoft.com/office/mac/drawingml/2011/main" val="1"/>
             </a:ext>
           </a:extLst>
         </p:spPr>
@@ -21925,7 +21944,7 @@
           </a:ln>
           <a:extLst>
             <a:ext uri="{C572A759-6A51-4108-AA02-DFA0A04FC94B}">
-              <ma14:wrappingTextBoxFlag xmlns:ma14="http://schemas.microsoft.com/office/mac/drawingml/2011/main" xmlns:a14="http://schemas.microsoft.com/office/drawing/2010/main" xmlns:m="http://schemas.openxmlformats.org/officeDocument/2006/math" xmlns="" val="1"/>
+              <ma14:wrappingTextBoxFlag xmlns="" xmlns:m="http://schemas.openxmlformats.org/officeDocument/2006/math" xmlns:a14="http://schemas.microsoft.com/office/drawing/2010/main" xmlns:ma14="http://schemas.microsoft.com/office/mac/drawingml/2011/main" val="1"/>
             </a:ext>
           </a:extLst>
         </p:spPr>
@@ -22145,7 +22164,7 @@
           </a:ln>
           <a:extLst>
             <a:ext uri="{C572A759-6A51-4108-AA02-DFA0A04FC94B}">
-              <ma14:wrappingTextBoxFlag xmlns:ma14="http://schemas.microsoft.com/office/mac/drawingml/2011/main" xmlns:a14="http://schemas.microsoft.com/office/drawing/2010/main" xmlns:m="http://schemas.openxmlformats.org/officeDocument/2006/math" xmlns="" val="1"/>
+              <ma14:wrappingTextBoxFlag xmlns="" xmlns:m="http://schemas.openxmlformats.org/officeDocument/2006/math" xmlns:a14="http://schemas.microsoft.com/office/drawing/2010/main" xmlns:ma14="http://schemas.microsoft.com/office/mac/drawingml/2011/main" val="1"/>
             </a:ext>
           </a:extLst>
         </p:spPr>
@@ -23283,7 +23302,7 @@
           </a:ln>
           <a:extLst>
             <a:ext uri="{C572A759-6A51-4108-AA02-DFA0A04FC94B}">
-              <ma14:wrappingTextBoxFlag xmlns:ma14="http://schemas.microsoft.com/office/mac/drawingml/2011/main" xmlns:a14="http://schemas.microsoft.com/office/drawing/2010/main" xmlns:m="http://schemas.openxmlformats.org/officeDocument/2006/math" xmlns="" val="1"/>
+              <ma14:wrappingTextBoxFlag xmlns="" xmlns:m="http://schemas.openxmlformats.org/officeDocument/2006/math" xmlns:a14="http://schemas.microsoft.com/office/drawing/2010/main" xmlns:ma14="http://schemas.microsoft.com/office/mac/drawingml/2011/main" val="1"/>
             </a:ext>
           </a:extLst>
         </p:spPr>
@@ -23371,7 +23390,7 @@
           </a:ln>
           <a:extLst>
             <a:ext uri="{C572A759-6A51-4108-AA02-DFA0A04FC94B}">
-              <ma14:wrappingTextBoxFlag xmlns:ma14="http://schemas.microsoft.com/office/mac/drawingml/2011/main" xmlns:a14="http://schemas.microsoft.com/office/drawing/2010/main" xmlns:m="http://schemas.openxmlformats.org/officeDocument/2006/math" xmlns="" val="1"/>
+              <ma14:wrappingTextBoxFlag xmlns="" xmlns:m="http://schemas.openxmlformats.org/officeDocument/2006/math" xmlns:a14="http://schemas.microsoft.com/office/drawing/2010/main" xmlns:ma14="http://schemas.microsoft.com/office/mac/drawingml/2011/main" val="1"/>
             </a:ext>
           </a:extLst>
         </p:spPr>
@@ -23447,7 +23466,7 @@
           </a:ln>
           <a:extLst>
             <a:ext uri="{C572A759-6A51-4108-AA02-DFA0A04FC94B}">
-              <ma14:wrappingTextBoxFlag xmlns:ma14="http://schemas.microsoft.com/office/mac/drawingml/2011/main" xmlns:a14="http://schemas.microsoft.com/office/drawing/2010/main" xmlns:m="http://schemas.openxmlformats.org/officeDocument/2006/math" xmlns="" val="1"/>
+              <ma14:wrappingTextBoxFlag xmlns="" xmlns:m="http://schemas.openxmlformats.org/officeDocument/2006/math" xmlns:a14="http://schemas.microsoft.com/office/drawing/2010/main" xmlns:ma14="http://schemas.microsoft.com/office/mac/drawingml/2011/main" val="1"/>
             </a:ext>
           </a:extLst>
         </p:spPr>
@@ -25739,7 +25758,7 @@
           </a:ln>
           <a:extLst>
             <a:ext uri="{C572A759-6A51-4108-AA02-DFA0A04FC94B}">
-              <ma14:wrappingTextBoxFlag xmlns:ma14="http://schemas.microsoft.com/office/mac/drawingml/2011/main" xmlns:a14="http://schemas.microsoft.com/office/drawing/2010/main" xmlns:m="http://schemas.openxmlformats.org/officeDocument/2006/math" xmlns="" val="1"/>
+              <ma14:wrappingTextBoxFlag xmlns="" xmlns:m="http://schemas.openxmlformats.org/officeDocument/2006/math" xmlns:a14="http://schemas.microsoft.com/office/drawing/2010/main" xmlns:ma14="http://schemas.microsoft.com/office/mac/drawingml/2011/main" val="1"/>
             </a:ext>
           </a:extLst>
         </p:spPr>
@@ -25821,7 +25840,7 @@
           </a:ln>
           <a:extLst>
             <a:ext uri="{C572A759-6A51-4108-AA02-DFA0A04FC94B}">
-              <ma14:wrappingTextBoxFlag xmlns:ma14="http://schemas.microsoft.com/office/mac/drawingml/2011/main" xmlns:a14="http://schemas.microsoft.com/office/drawing/2010/main" xmlns:m="http://schemas.openxmlformats.org/officeDocument/2006/math" xmlns="" val="1"/>
+              <ma14:wrappingTextBoxFlag xmlns="" xmlns:m="http://schemas.openxmlformats.org/officeDocument/2006/math" xmlns:a14="http://schemas.microsoft.com/office/drawing/2010/main" xmlns:ma14="http://schemas.microsoft.com/office/mac/drawingml/2011/main" val="1"/>
             </a:ext>
           </a:extLst>
         </p:spPr>
@@ -25857,7 +25876,7 @@
           </a:ln>
           <a:extLst>
             <a:ext uri="{C572A759-6A51-4108-AA02-DFA0A04FC94B}">
-              <ma14:wrappingTextBoxFlag xmlns:ma14="http://schemas.microsoft.com/office/mac/drawingml/2011/main" xmlns:a14="http://schemas.microsoft.com/office/drawing/2010/main" xmlns:m="http://schemas.openxmlformats.org/officeDocument/2006/math" xmlns="" val="1"/>
+              <ma14:wrappingTextBoxFlag xmlns="" xmlns:m="http://schemas.openxmlformats.org/officeDocument/2006/math" xmlns:a14="http://schemas.microsoft.com/office/drawing/2010/main" xmlns:ma14="http://schemas.microsoft.com/office/mac/drawingml/2011/main" val="1"/>
             </a:ext>
           </a:extLst>
         </p:spPr>
@@ -25893,7 +25912,7 @@
           </a:ln>
           <a:extLst>
             <a:ext uri="{C572A759-6A51-4108-AA02-DFA0A04FC94B}">
-              <ma14:wrappingTextBoxFlag xmlns:ma14="http://schemas.microsoft.com/office/mac/drawingml/2011/main" xmlns:a14="http://schemas.microsoft.com/office/drawing/2010/main" xmlns:m="http://schemas.openxmlformats.org/officeDocument/2006/math" xmlns="" val="1"/>
+              <ma14:wrappingTextBoxFlag xmlns="" xmlns:m="http://schemas.openxmlformats.org/officeDocument/2006/math" xmlns:a14="http://schemas.microsoft.com/office/drawing/2010/main" xmlns:ma14="http://schemas.microsoft.com/office/mac/drawingml/2011/main" val="1"/>
             </a:ext>
           </a:extLst>
         </p:spPr>
@@ -26112,7 +26131,7 @@
           </a:ln>
           <a:extLst>
             <a:ext uri="{C572A759-6A51-4108-AA02-DFA0A04FC94B}">
-              <ma14:wrappingTextBoxFlag xmlns:ma14="http://schemas.microsoft.com/office/mac/drawingml/2011/main" xmlns:a14="http://schemas.microsoft.com/office/drawing/2010/main" xmlns:m="http://schemas.openxmlformats.org/officeDocument/2006/math" xmlns="" val="1"/>
+              <ma14:wrappingTextBoxFlag xmlns="" xmlns:m="http://schemas.openxmlformats.org/officeDocument/2006/math" xmlns:a14="http://schemas.microsoft.com/office/drawing/2010/main" xmlns:ma14="http://schemas.microsoft.com/office/mac/drawingml/2011/main" val="1"/>
             </a:ext>
           </a:extLst>
         </p:spPr>

</xml_diff>

<commit_message>
fix yellow line in data import
</commit_message>
<xml_diff>
--- a/powerpoints/data-import.pptx
+++ b/powerpoints/data-import.pptx
@@ -2440,7 +2440,7 @@
           </a:ln>
           <a:extLst>
             <a:ext uri="{C572A759-6A51-4108-AA02-DFA0A04FC94B}">
-              <ma14:wrappingTextBoxFlag xmlns="" xmlns:m="http://schemas.openxmlformats.org/officeDocument/2006/math" xmlns:a14="http://schemas.microsoft.com/office/drawing/2010/main" xmlns:ma14="http://schemas.microsoft.com/office/mac/drawingml/2011/main" val="1"/>
+              <ma14:wrappingTextBoxFlag xmlns:ma14="http://schemas.microsoft.com/office/mac/drawingml/2011/main" xmlns:a14="http://schemas.microsoft.com/office/drawing/2010/main" xmlns:m="http://schemas.openxmlformats.org/officeDocument/2006/math" xmlns="" val="1"/>
             </a:ext>
           </a:extLst>
         </p:spPr>
@@ -2479,7 +2479,7 @@
           </a:ln>
           <a:extLst>
             <a:ext uri="{C572A759-6A51-4108-AA02-DFA0A04FC94B}">
-              <ma14:wrappingTextBoxFlag xmlns="" xmlns:m="http://schemas.openxmlformats.org/officeDocument/2006/math" xmlns:a14="http://schemas.microsoft.com/office/drawing/2010/main" xmlns:ma14="http://schemas.microsoft.com/office/mac/drawingml/2011/main" val="1"/>
+              <ma14:wrappingTextBoxFlag xmlns:ma14="http://schemas.microsoft.com/office/mac/drawingml/2011/main" xmlns:a14="http://schemas.microsoft.com/office/drawing/2010/main" xmlns:m="http://schemas.openxmlformats.org/officeDocument/2006/math" xmlns="" val="1"/>
             </a:ext>
           </a:extLst>
         </p:spPr>
@@ -3631,7 +3631,7 @@
               <a:effectLst/>
               <a:extLst>
                 <a:ext uri="{C572A759-6A51-4108-AA02-DFA0A04FC94B}">
-                  <ma14:wrappingTextBoxFlag xmlns="" xmlns:m="http://schemas.openxmlformats.org/officeDocument/2006/math" xmlns:a14="http://schemas.microsoft.com/office/drawing/2010/main" xmlns:ma14="http://schemas.microsoft.com/office/mac/drawingml/2011/main" val="1"/>
+                  <ma14:wrappingTextBoxFlag xmlns:ma14="http://schemas.microsoft.com/office/mac/drawingml/2011/main" xmlns:a14="http://schemas.microsoft.com/office/drawing/2010/main" xmlns:m="http://schemas.openxmlformats.org/officeDocument/2006/math" xmlns="" val="1"/>
                 </a:ext>
               </a:extLst>
             </p:spPr>
@@ -4179,7 +4179,7 @@
           </a:ln>
           <a:extLst>
             <a:ext uri="{C572A759-6A51-4108-AA02-DFA0A04FC94B}">
-              <ma14:wrappingTextBoxFlag xmlns="" xmlns:m="http://schemas.openxmlformats.org/officeDocument/2006/math" xmlns:a14="http://schemas.microsoft.com/office/drawing/2010/main" xmlns:ma14="http://schemas.microsoft.com/office/mac/drawingml/2011/main" val="1"/>
+              <ma14:wrappingTextBoxFlag xmlns:ma14="http://schemas.microsoft.com/office/mac/drawingml/2011/main" xmlns:a14="http://schemas.microsoft.com/office/drawing/2010/main" xmlns:m="http://schemas.openxmlformats.org/officeDocument/2006/math" xmlns="" val="1"/>
             </a:ext>
           </a:extLst>
         </p:spPr>
@@ -4436,7 +4436,7 @@
               <a:effectLst/>
               <a:extLst>
                 <a:ext uri="{C572A759-6A51-4108-AA02-DFA0A04FC94B}">
-                  <ma14:wrappingTextBoxFlag xmlns="" xmlns:m="http://schemas.openxmlformats.org/officeDocument/2006/math" xmlns:a14="http://schemas.microsoft.com/office/drawing/2010/main" xmlns:ma14="http://schemas.microsoft.com/office/mac/drawingml/2011/main" val="1"/>
+                  <ma14:wrappingTextBoxFlag xmlns:ma14="http://schemas.microsoft.com/office/mac/drawingml/2011/main" xmlns:a14="http://schemas.microsoft.com/office/drawing/2010/main" xmlns:m="http://schemas.openxmlformats.org/officeDocument/2006/math" xmlns="" val="1"/>
                 </a:ext>
               </a:extLst>
             </p:spPr>
@@ -5838,52 +5838,6 @@
       </p:grpSp>
       <p:sp>
         <p:nvSpPr>
-          <p:cNvPr id="177" name="Line"/>
-          <p:cNvSpPr/>
-          <p:nvPr/>
-        </p:nvSpPr>
-        <p:spPr>
-          <a:xfrm>
-            <a:off x="344039" y="1217208"/>
-            <a:ext cx="3037294" cy="1"/>
-          </a:xfrm>
-          <a:prstGeom prst="line">
-            <a:avLst/>
-          </a:prstGeom>
-          <a:ln w="3175">
-            <a:solidFill>
-              <a:srgbClr val="FFF2C5"/>
-            </a:solidFill>
-            <a:miter lim="400000"/>
-          </a:ln>
-        </p:spPr>
-        <p:txBody>
-          <a:bodyPr lIns="54570" tIns="54570" rIns="54570" bIns="54570" anchor="ctr"/>
-          <a:lstStyle/>
-          <a:p>
-            <a:pPr>
-              <a:lnSpc>
-                <a:spcPct val="80000"/>
-              </a:lnSpc>
-              <a:spcBef>
-                <a:spcPts val="600"/>
-              </a:spcBef>
-              <a:defRPr>
-                <a:solidFill>
-                  <a:srgbClr val="000000"/>
-                </a:solidFill>
-                <a:latin typeface="Source Sans Pro Regular"/>
-                <a:ea typeface="Source Sans Pro Regular"/>
-                <a:cs typeface="Source Sans Pro Regular"/>
-                <a:sym typeface="Source Sans Pro Regular"/>
-              </a:defRPr>
-            </a:pPr>
-            <a:endParaRPr/>
-          </a:p>
-        </p:txBody>
-      </p:sp>
-      <p:sp>
-        <p:nvSpPr>
           <p:cNvPr id="178" name="Data Import : : CHEAT SHEET"/>
           <p:cNvSpPr txBox="1">
             <a:spLocks noGrp="1"/>
@@ -6002,7 +5956,7 @@
           </a:ln>
           <a:extLst>
             <a:ext uri="{C572A759-6A51-4108-AA02-DFA0A04FC94B}">
-              <ma14:wrappingTextBoxFlag xmlns="" xmlns:m="http://schemas.openxmlformats.org/officeDocument/2006/math" xmlns:a14="http://schemas.microsoft.com/office/drawing/2010/main" xmlns:ma14="http://schemas.microsoft.com/office/mac/drawingml/2011/main" val="1"/>
+              <ma14:wrappingTextBoxFlag xmlns:ma14="http://schemas.microsoft.com/office/mac/drawingml/2011/main" xmlns:a14="http://schemas.microsoft.com/office/drawing/2010/main" xmlns:m="http://schemas.openxmlformats.org/officeDocument/2006/math" xmlns="" val="1"/>
             </a:ext>
           </a:extLst>
         </p:spPr>
@@ -6184,7 +6138,7 @@
           </a:ln>
           <a:extLst>
             <a:ext uri="{C572A759-6A51-4108-AA02-DFA0A04FC94B}">
-              <ma14:wrappingTextBoxFlag xmlns="" xmlns:m="http://schemas.openxmlformats.org/officeDocument/2006/math" xmlns:a14="http://schemas.microsoft.com/office/drawing/2010/main" xmlns:ma14="http://schemas.microsoft.com/office/mac/drawingml/2011/main" val="1"/>
+              <ma14:wrappingTextBoxFlag xmlns:ma14="http://schemas.microsoft.com/office/mac/drawingml/2011/main" xmlns:a14="http://schemas.microsoft.com/office/drawing/2010/main" xmlns:m="http://schemas.openxmlformats.org/officeDocument/2006/math" xmlns="" val="1"/>
             </a:ext>
           </a:extLst>
         </p:spPr>
@@ -6442,7 +6396,7 @@
           </a:ln>
           <a:extLst>
             <a:ext uri="{C572A759-6A51-4108-AA02-DFA0A04FC94B}">
-              <ma14:wrappingTextBoxFlag xmlns="" xmlns:m="http://schemas.openxmlformats.org/officeDocument/2006/math" xmlns:a14="http://schemas.microsoft.com/office/drawing/2010/main" xmlns:ma14="http://schemas.microsoft.com/office/mac/drawingml/2011/main" val="1"/>
+              <ma14:wrappingTextBoxFlag xmlns:ma14="http://schemas.microsoft.com/office/mac/drawingml/2011/main" xmlns:a14="http://schemas.microsoft.com/office/drawing/2010/main" xmlns:m="http://schemas.openxmlformats.org/officeDocument/2006/math" xmlns="" val="1"/>
             </a:ext>
           </a:extLst>
         </p:spPr>
@@ -6495,7 +6449,7 @@
           </a:ln>
           <a:extLst>
             <a:ext uri="{C572A759-6A51-4108-AA02-DFA0A04FC94B}">
-              <ma14:wrappingTextBoxFlag xmlns="" xmlns:m="http://schemas.openxmlformats.org/officeDocument/2006/math" xmlns:a14="http://schemas.microsoft.com/office/drawing/2010/main" xmlns:ma14="http://schemas.microsoft.com/office/mac/drawingml/2011/main" val="1"/>
+              <ma14:wrappingTextBoxFlag xmlns:ma14="http://schemas.microsoft.com/office/mac/drawingml/2011/main" xmlns:a14="http://schemas.microsoft.com/office/drawing/2010/main" xmlns:m="http://schemas.openxmlformats.org/officeDocument/2006/math" xmlns="" val="1"/>
             </a:ext>
           </a:extLst>
         </p:spPr>
@@ -6531,7 +6485,7 @@
           </a:ln>
           <a:extLst>
             <a:ext uri="{C572A759-6A51-4108-AA02-DFA0A04FC94B}">
-              <ma14:wrappingTextBoxFlag xmlns="" xmlns:m="http://schemas.openxmlformats.org/officeDocument/2006/math" xmlns:a14="http://schemas.microsoft.com/office/drawing/2010/main" xmlns:ma14="http://schemas.microsoft.com/office/mac/drawingml/2011/main" val="1"/>
+              <ma14:wrappingTextBoxFlag xmlns:ma14="http://schemas.microsoft.com/office/mac/drawingml/2011/main" xmlns:a14="http://schemas.microsoft.com/office/drawing/2010/main" xmlns:m="http://schemas.openxmlformats.org/officeDocument/2006/math" xmlns="" val="1"/>
             </a:ext>
           </a:extLst>
         </p:spPr>
@@ -6595,7 +6549,7 @@
           <a:effectLst/>
           <a:extLst>
             <a:ext uri="{C572A759-6A51-4108-AA02-DFA0A04FC94B}">
-              <ma14:wrappingTextBoxFlag xmlns="" xmlns:m="http://schemas.openxmlformats.org/officeDocument/2006/math" xmlns:a14="http://schemas.microsoft.com/office/drawing/2010/main" xmlns:ma14="http://schemas.microsoft.com/office/mac/drawingml/2011/main" val="1"/>
+              <ma14:wrappingTextBoxFlag xmlns:ma14="http://schemas.microsoft.com/office/mac/drawingml/2011/main" xmlns:a14="http://schemas.microsoft.com/office/drawing/2010/main" xmlns:m="http://schemas.openxmlformats.org/officeDocument/2006/math" xmlns="" val="1"/>
             </a:ext>
           </a:extLst>
         </p:spPr>
@@ -6844,7 +6798,7 @@
           <a:effectLst/>
           <a:extLst>
             <a:ext uri="{C572A759-6A51-4108-AA02-DFA0A04FC94B}">
-              <ma14:wrappingTextBoxFlag xmlns="" xmlns:m="http://schemas.openxmlformats.org/officeDocument/2006/math" xmlns:a14="http://schemas.microsoft.com/office/drawing/2010/main" xmlns:ma14="http://schemas.microsoft.com/office/mac/drawingml/2011/main" val="1"/>
+              <ma14:wrappingTextBoxFlag xmlns:ma14="http://schemas.microsoft.com/office/mac/drawingml/2011/main" xmlns:a14="http://schemas.microsoft.com/office/drawing/2010/main" xmlns:m="http://schemas.openxmlformats.org/officeDocument/2006/math" xmlns="" val="1"/>
             </a:ext>
           </a:extLst>
         </p:spPr>
@@ -6972,7 +6926,7 @@
           <a:effectLst/>
           <a:extLst>
             <a:ext uri="{C572A759-6A51-4108-AA02-DFA0A04FC94B}">
-              <ma14:wrappingTextBoxFlag xmlns="" xmlns:m="http://schemas.openxmlformats.org/officeDocument/2006/math" xmlns:a14="http://schemas.microsoft.com/office/drawing/2010/main" xmlns:ma14="http://schemas.microsoft.com/office/mac/drawingml/2011/main" val="1"/>
+              <ma14:wrappingTextBoxFlag xmlns:ma14="http://schemas.microsoft.com/office/mac/drawingml/2011/main" xmlns:a14="http://schemas.microsoft.com/office/drawing/2010/main" xmlns:m="http://schemas.openxmlformats.org/officeDocument/2006/math" xmlns="" val="1"/>
             </a:ext>
           </a:extLst>
         </p:spPr>
@@ -7125,7 +7079,7 @@
           <a:effectLst/>
           <a:extLst>
             <a:ext uri="{C572A759-6A51-4108-AA02-DFA0A04FC94B}">
-              <ma14:wrappingTextBoxFlag xmlns="" xmlns:m="http://schemas.openxmlformats.org/officeDocument/2006/math" xmlns:a14="http://schemas.microsoft.com/office/drawing/2010/main" xmlns:ma14="http://schemas.microsoft.com/office/mac/drawingml/2011/main" val="1"/>
+              <ma14:wrappingTextBoxFlag xmlns:ma14="http://schemas.microsoft.com/office/mac/drawingml/2011/main" xmlns:a14="http://schemas.microsoft.com/office/drawing/2010/main" xmlns:m="http://schemas.openxmlformats.org/officeDocument/2006/math" xmlns="" val="1"/>
             </a:ext>
           </a:extLst>
         </p:spPr>
@@ -7190,7 +7144,7 @@
           </a:ln>
           <a:extLst>
             <a:ext uri="{C572A759-6A51-4108-AA02-DFA0A04FC94B}">
-              <ma14:wrappingTextBoxFlag xmlns="" xmlns:m="http://schemas.openxmlformats.org/officeDocument/2006/math" xmlns:a14="http://schemas.microsoft.com/office/drawing/2010/main" xmlns:ma14="http://schemas.microsoft.com/office/mac/drawingml/2011/main" val="1"/>
+              <ma14:wrappingTextBoxFlag xmlns:ma14="http://schemas.microsoft.com/office/mac/drawingml/2011/main" xmlns:a14="http://schemas.microsoft.com/office/drawing/2010/main" xmlns:m="http://schemas.openxmlformats.org/officeDocument/2006/math" xmlns="" val="1"/>
             </a:ext>
           </a:extLst>
         </p:spPr>
@@ -7455,7 +7409,7 @@
           </a:ln>
           <a:extLst>
             <a:ext uri="{C572A759-6A51-4108-AA02-DFA0A04FC94B}">
-              <ma14:wrappingTextBoxFlag xmlns="" xmlns:m="http://schemas.openxmlformats.org/officeDocument/2006/math" xmlns:a14="http://schemas.microsoft.com/office/drawing/2010/main" xmlns:ma14="http://schemas.microsoft.com/office/mac/drawingml/2011/main" val="1"/>
+              <ma14:wrappingTextBoxFlag xmlns:ma14="http://schemas.microsoft.com/office/mac/drawingml/2011/main" xmlns:a14="http://schemas.microsoft.com/office/drawing/2010/main" xmlns:m="http://schemas.openxmlformats.org/officeDocument/2006/math" xmlns="" val="1"/>
             </a:ext>
           </a:extLst>
         </p:spPr>
@@ -7491,7 +7445,7 @@
           </a:ln>
           <a:extLst>
             <a:ext uri="{C572A759-6A51-4108-AA02-DFA0A04FC94B}">
-              <ma14:wrappingTextBoxFlag xmlns="" xmlns:m="http://schemas.openxmlformats.org/officeDocument/2006/math" xmlns:a14="http://schemas.microsoft.com/office/drawing/2010/main" xmlns:ma14="http://schemas.microsoft.com/office/mac/drawingml/2011/main" val="1"/>
+              <ma14:wrappingTextBoxFlag xmlns:ma14="http://schemas.microsoft.com/office/mac/drawingml/2011/main" xmlns:a14="http://schemas.microsoft.com/office/drawing/2010/main" xmlns:m="http://schemas.openxmlformats.org/officeDocument/2006/math" xmlns="" val="1"/>
             </a:ext>
           </a:extLst>
         </p:spPr>
@@ -7590,7 +7544,7 @@
           </a:ln>
           <a:extLst>
             <a:ext uri="{C572A759-6A51-4108-AA02-DFA0A04FC94B}">
-              <ma14:wrappingTextBoxFlag xmlns="" xmlns:m="http://schemas.openxmlformats.org/officeDocument/2006/math" xmlns:a14="http://schemas.microsoft.com/office/drawing/2010/main" xmlns:ma14="http://schemas.microsoft.com/office/mac/drawingml/2011/main" val="1"/>
+              <ma14:wrappingTextBoxFlag xmlns:ma14="http://schemas.microsoft.com/office/mac/drawingml/2011/main" xmlns:a14="http://schemas.microsoft.com/office/drawing/2010/main" xmlns:m="http://schemas.openxmlformats.org/officeDocument/2006/math" xmlns="" val="1"/>
             </a:ext>
           </a:extLst>
         </p:spPr>
@@ -8032,7 +7986,7 @@
           </a:ln>
           <a:extLst>
             <a:ext uri="{C572A759-6A51-4108-AA02-DFA0A04FC94B}">
-              <ma14:wrappingTextBoxFlag xmlns="" xmlns:m="http://schemas.openxmlformats.org/officeDocument/2006/math" xmlns:a14="http://schemas.microsoft.com/office/drawing/2010/main" xmlns:ma14="http://schemas.microsoft.com/office/mac/drawingml/2011/main" val="1"/>
+              <ma14:wrappingTextBoxFlag xmlns:ma14="http://schemas.microsoft.com/office/mac/drawingml/2011/main" xmlns:a14="http://schemas.microsoft.com/office/drawing/2010/main" xmlns:m="http://schemas.openxmlformats.org/officeDocument/2006/math" xmlns="" val="1"/>
             </a:ext>
           </a:extLst>
         </p:spPr>
@@ -9395,7 +9349,7 @@
           </a:ln>
           <a:extLst>
             <a:ext uri="{C572A759-6A51-4108-AA02-DFA0A04FC94B}">
-              <ma14:wrappingTextBoxFlag xmlns="" xmlns:m="http://schemas.openxmlformats.org/officeDocument/2006/math" xmlns:a14="http://schemas.microsoft.com/office/drawing/2010/main" xmlns:ma14="http://schemas.microsoft.com/office/mac/drawingml/2011/main" val="1"/>
+              <ma14:wrappingTextBoxFlag xmlns:ma14="http://schemas.microsoft.com/office/mac/drawingml/2011/main" xmlns:a14="http://schemas.microsoft.com/office/drawing/2010/main" xmlns:m="http://schemas.openxmlformats.org/officeDocument/2006/math" xmlns="" val="1"/>
             </a:ext>
           </a:extLst>
         </p:spPr>
@@ -9620,7 +9574,7 @@
           </a:ln>
           <a:extLst>
             <a:ext uri="{C572A759-6A51-4108-AA02-DFA0A04FC94B}">
-              <ma14:wrappingTextBoxFlag xmlns="" xmlns:m="http://schemas.openxmlformats.org/officeDocument/2006/math" xmlns:a14="http://schemas.microsoft.com/office/drawing/2010/main" xmlns:ma14="http://schemas.microsoft.com/office/mac/drawingml/2011/main" val="1"/>
+              <ma14:wrappingTextBoxFlag xmlns:ma14="http://schemas.microsoft.com/office/mac/drawingml/2011/main" xmlns:a14="http://schemas.microsoft.com/office/drawing/2010/main" xmlns:m="http://schemas.openxmlformats.org/officeDocument/2006/math" xmlns="" val="1"/>
             </a:ext>
           </a:extLst>
         </p:spPr>
@@ -9864,7 +9818,7 @@
           </a:ln>
           <a:extLst>
             <a:ext uri="{C572A759-6A51-4108-AA02-DFA0A04FC94B}">
-              <ma14:wrappingTextBoxFlag xmlns="" xmlns:m="http://schemas.openxmlformats.org/officeDocument/2006/math" xmlns:a14="http://schemas.microsoft.com/office/drawing/2010/main" xmlns:ma14="http://schemas.microsoft.com/office/mac/drawingml/2011/main" val="1"/>
+              <ma14:wrappingTextBoxFlag xmlns:ma14="http://schemas.microsoft.com/office/mac/drawingml/2011/main" xmlns:a14="http://schemas.microsoft.com/office/drawing/2010/main" xmlns:m="http://schemas.openxmlformats.org/officeDocument/2006/math" xmlns="" val="1"/>
             </a:ext>
           </a:extLst>
         </p:spPr>
@@ -9971,7 +9925,7 @@
           </a:ln>
           <a:extLst>
             <a:ext uri="{C572A759-6A51-4108-AA02-DFA0A04FC94B}">
-              <ma14:wrappingTextBoxFlag xmlns="" xmlns:m="http://schemas.openxmlformats.org/officeDocument/2006/math" xmlns:a14="http://schemas.microsoft.com/office/drawing/2010/main" xmlns:ma14="http://schemas.microsoft.com/office/mac/drawingml/2011/main" val="1"/>
+              <ma14:wrappingTextBoxFlag xmlns:ma14="http://schemas.microsoft.com/office/mac/drawingml/2011/main" xmlns:a14="http://schemas.microsoft.com/office/drawing/2010/main" xmlns:m="http://schemas.openxmlformats.org/officeDocument/2006/math" xmlns="" val="1"/>
             </a:ext>
           </a:extLst>
         </p:spPr>
@@ -10051,7 +10005,7 @@
           </a:ln>
           <a:extLst>
             <a:ext uri="{C572A759-6A51-4108-AA02-DFA0A04FC94B}">
-              <ma14:wrappingTextBoxFlag xmlns="" xmlns:m="http://schemas.openxmlformats.org/officeDocument/2006/math" xmlns:a14="http://schemas.microsoft.com/office/drawing/2010/main" xmlns:ma14="http://schemas.microsoft.com/office/mac/drawingml/2011/main" val="1"/>
+              <ma14:wrappingTextBoxFlag xmlns:ma14="http://schemas.microsoft.com/office/mac/drawingml/2011/main" xmlns:a14="http://schemas.microsoft.com/office/drawing/2010/main" xmlns:m="http://schemas.openxmlformats.org/officeDocument/2006/math" xmlns="" val="1"/>
             </a:ext>
           </a:extLst>
         </p:spPr>
@@ -10407,7 +10361,7 @@
           </a:ln>
           <a:extLst>
             <a:ext uri="{C572A759-6A51-4108-AA02-DFA0A04FC94B}">
-              <ma14:wrappingTextBoxFlag xmlns="" xmlns:m="http://schemas.openxmlformats.org/officeDocument/2006/math" xmlns:a14="http://schemas.microsoft.com/office/drawing/2010/main" xmlns:ma14="http://schemas.microsoft.com/office/mac/drawingml/2011/main" val="1"/>
+              <ma14:wrappingTextBoxFlag xmlns:ma14="http://schemas.microsoft.com/office/mac/drawingml/2011/main" xmlns:a14="http://schemas.microsoft.com/office/drawing/2010/main" xmlns:m="http://schemas.openxmlformats.org/officeDocument/2006/math" xmlns="" val="1"/>
             </a:ext>
           </a:extLst>
         </p:spPr>
@@ -10463,7 +10417,7 @@
           </a:ln>
           <a:extLst>
             <a:ext uri="{C572A759-6A51-4108-AA02-DFA0A04FC94B}">
-              <ma14:wrappingTextBoxFlag xmlns="" xmlns:m="http://schemas.openxmlformats.org/officeDocument/2006/math" xmlns:a14="http://schemas.microsoft.com/office/drawing/2010/main" xmlns:ma14="http://schemas.microsoft.com/office/mac/drawingml/2011/main" val="1"/>
+              <ma14:wrappingTextBoxFlag xmlns:ma14="http://schemas.microsoft.com/office/mac/drawingml/2011/main" xmlns:a14="http://schemas.microsoft.com/office/drawing/2010/main" xmlns:m="http://schemas.openxmlformats.org/officeDocument/2006/math" xmlns="" val="1"/>
             </a:ext>
           </a:extLst>
         </p:spPr>
@@ -10870,7 +10824,7 @@
               <a:effectLst/>
               <a:extLst>
                 <a:ext uri="{C572A759-6A51-4108-AA02-DFA0A04FC94B}">
-                  <ma14:wrappingTextBoxFlag xmlns="" xmlns:m="http://schemas.openxmlformats.org/officeDocument/2006/math" xmlns:a14="http://schemas.microsoft.com/office/drawing/2010/main" xmlns:ma14="http://schemas.microsoft.com/office/mac/drawingml/2011/main" val="1"/>
+                  <ma14:wrappingTextBoxFlag xmlns:ma14="http://schemas.microsoft.com/office/mac/drawingml/2011/main" xmlns:a14="http://schemas.microsoft.com/office/drawing/2010/main" xmlns:m="http://schemas.openxmlformats.org/officeDocument/2006/math" xmlns="" val="1"/>
                 </a:ext>
               </a:extLst>
             </p:spPr>
@@ -11366,7 +11320,7 @@
           </a:ln>
           <a:extLst>
             <a:ext uri="{C572A759-6A51-4108-AA02-DFA0A04FC94B}">
-              <ma14:wrappingTextBoxFlag xmlns="" xmlns:m="http://schemas.openxmlformats.org/officeDocument/2006/math" xmlns:a14="http://schemas.microsoft.com/office/drawing/2010/main" xmlns:ma14="http://schemas.microsoft.com/office/mac/drawingml/2011/main" val="1"/>
+              <ma14:wrappingTextBoxFlag xmlns:ma14="http://schemas.microsoft.com/office/mac/drawingml/2011/main" xmlns:a14="http://schemas.microsoft.com/office/drawing/2010/main" xmlns:m="http://schemas.openxmlformats.org/officeDocument/2006/math" xmlns="" val="1"/>
             </a:ext>
           </a:extLst>
         </p:spPr>
@@ -11575,7 +11529,7 @@
           </a:ln>
           <a:extLst>
             <a:ext uri="{C572A759-6A51-4108-AA02-DFA0A04FC94B}">
-              <ma14:wrappingTextBoxFlag xmlns="" xmlns:m="http://schemas.openxmlformats.org/officeDocument/2006/math" xmlns:a14="http://schemas.microsoft.com/office/drawing/2010/main" xmlns:ma14="http://schemas.microsoft.com/office/mac/drawingml/2011/main" val="1"/>
+              <ma14:wrappingTextBoxFlag xmlns:ma14="http://schemas.microsoft.com/office/mac/drawingml/2011/main" xmlns:a14="http://schemas.microsoft.com/office/drawing/2010/main" xmlns:m="http://schemas.openxmlformats.org/officeDocument/2006/math" xmlns="" val="1"/>
             </a:ext>
           </a:extLst>
         </p:spPr>
@@ -11887,7 +11841,7 @@
           </a:ln>
           <a:extLst>
             <a:ext uri="{C572A759-6A51-4108-AA02-DFA0A04FC94B}">
-              <ma14:wrappingTextBoxFlag xmlns="" xmlns:m="http://schemas.openxmlformats.org/officeDocument/2006/math" xmlns:a14="http://schemas.microsoft.com/office/drawing/2010/main" xmlns:ma14="http://schemas.microsoft.com/office/mac/drawingml/2011/main" val="1"/>
+              <ma14:wrappingTextBoxFlag xmlns:ma14="http://schemas.microsoft.com/office/mac/drawingml/2011/main" xmlns:a14="http://schemas.microsoft.com/office/drawing/2010/main" xmlns:m="http://schemas.openxmlformats.org/officeDocument/2006/math" xmlns="" val="1"/>
             </a:ext>
           </a:extLst>
         </p:spPr>
@@ -12229,7 +12183,7 @@
               <a:effectLst/>
               <a:extLst>
                 <a:ext uri="{C572A759-6A51-4108-AA02-DFA0A04FC94B}">
-                  <ma14:wrappingTextBoxFlag xmlns="" xmlns:m="http://schemas.openxmlformats.org/officeDocument/2006/math" xmlns:a14="http://schemas.microsoft.com/office/drawing/2010/main" xmlns:ma14="http://schemas.microsoft.com/office/mac/drawingml/2011/main" val="1"/>
+                  <ma14:wrappingTextBoxFlag xmlns:ma14="http://schemas.microsoft.com/office/mac/drawingml/2011/main" xmlns:a14="http://schemas.microsoft.com/office/drawing/2010/main" xmlns:m="http://schemas.openxmlformats.org/officeDocument/2006/math" xmlns="" val="1"/>
                 </a:ext>
               </a:extLst>
             </p:spPr>
@@ -12888,7 +12842,7 @@
               <a:effectLst/>
               <a:extLst>
                 <a:ext uri="{C572A759-6A51-4108-AA02-DFA0A04FC94B}">
-                  <ma14:wrappingTextBoxFlag xmlns="" xmlns:m="http://schemas.openxmlformats.org/officeDocument/2006/math" xmlns:a14="http://schemas.microsoft.com/office/drawing/2010/main" xmlns:ma14="http://schemas.microsoft.com/office/mac/drawingml/2011/main" val="1"/>
+                  <ma14:wrappingTextBoxFlag xmlns:ma14="http://schemas.microsoft.com/office/mac/drawingml/2011/main" xmlns:a14="http://schemas.microsoft.com/office/drawing/2010/main" xmlns:m="http://schemas.openxmlformats.org/officeDocument/2006/math" xmlns="" val="1"/>
                 </a:ext>
               </a:extLst>
             </p:spPr>
@@ -14171,7 +14125,7 @@
           </a:ln>
           <a:extLst>
             <a:ext uri="{C572A759-6A51-4108-AA02-DFA0A04FC94B}">
-              <ma14:wrappingTextBoxFlag xmlns="" xmlns:m="http://schemas.openxmlformats.org/officeDocument/2006/math" xmlns:a14="http://schemas.microsoft.com/office/drawing/2010/main" xmlns:ma14="http://schemas.microsoft.com/office/mac/drawingml/2011/main" val="1"/>
+              <ma14:wrappingTextBoxFlag xmlns:ma14="http://schemas.microsoft.com/office/mac/drawingml/2011/main" xmlns:a14="http://schemas.microsoft.com/office/drawing/2010/main" xmlns:m="http://schemas.openxmlformats.org/officeDocument/2006/math" xmlns="" val="1"/>
             </a:ext>
           </a:extLst>
         </p:spPr>
@@ -14281,7 +14235,7 @@
           </a:ln>
           <a:extLst>
             <a:ext uri="{C572A759-6A51-4108-AA02-DFA0A04FC94B}">
-              <ma14:wrappingTextBoxFlag xmlns="" xmlns:m="http://schemas.openxmlformats.org/officeDocument/2006/math" xmlns:a14="http://schemas.microsoft.com/office/drawing/2010/main" xmlns:ma14="http://schemas.microsoft.com/office/mac/drawingml/2011/main" val="1"/>
+              <ma14:wrappingTextBoxFlag xmlns:ma14="http://schemas.microsoft.com/office/mac/drawingml/2011/main" xmlns:a14="http://schemas.microsoft.com/office/drawing/2010/main" xmlns:m="http://schemas.openxmlformats.org/officeDocument/2006/math" xmlns="" val="1"/>
             </a:ext>
           </a:extLst>
         </p:spPr>
@@ -14482,7 +14436,7 @@
           </a:ln>
           <a:extLst>
             <a:ext uri="{C572A759-6A51-4108-AA02-DFA0A04FC94B}">
-              <ma14:wrappingTextBoxFlag xmlns="" xmlns:m="http://schemas.openxmlformats.org/officeDocument/2006/math" xmlns:a14="http://schemas.microsoft.com/office/drawing/2010/main" xmlns:ma14="http://schemas.microsoft.com/office/mac/drawingml/2011/main" val="1"/>
+              <ma14:wrappingTextBoxFlag xmlns:ma14="http://schemas.microsoft.com/office/mac/drawingml/2011/main" xmlns:a14="http://schemas.microsoft.com/office/drawing/2010/main" xmlns:m="http://schemas.openxmlformats.org/officeDocument/2006/math" xmlns="" val="1"/>
             </a:ext>
           </a:extLst>
         </p:spPr>
@@ -15779,7 +15733,7 @@
           </a:ln>
           <a:extLst>
             <a:ext uri="{C572A759-6A51-4108-AA02-DFA0A04FC94B}">
-              <ma14:wrappingTextBoxFlag xmlns="" xmlns:m="http://schemas.openxmlformats.org/officeDocument/2006/math" xmlns:a14="http://schemas.microsoft.com/office/drawing/2010/main" xmlns:ma14="http://schemas.microsoft.com/office/mac/drawingml/2011/main" val="1"/>
+              <ma14:wrappingTextBoxFlag xmlns:ma14="http://schemas.microsoft.com/office/mac/drawingml/2011/main" xmlns:a14="http://schemas.microsoft.com/office/drawing/2010/main" xmlns:m="http://schemas.openxmlformats.org/officeDocument/2006/math" xmlns="" val="1"/>
             </a:ext>
           </a:extLst>
         </p:spPr>
@@ -15831,7 +15785,7 @@
           </a:ln>
           <a:extLst>
             <a:ext uri="{C572A759-6A51-4108-AA02-DFA0A04FC94B}">
-              <ma14:wrappingTextBoxFlag xmlns="" xmlns:m="http://schemas.openxmlformats.org/officeDocument/2006/math" xmlns:a14="http://schemas.microsoft.com/office/drawing/2010/main" xmlns:ma14="http://schemas.microsoft.com/office/mac/drawingml/2011/main" val="1"/>
+              <ma14:wrappingTextBoxFlag xmlns:ma14="http://schemas.microsoft.com/office/mac/drawingml/2011/main" xmlns:a14="http://schemas.microsoft.com/office/drawing/2010/main" xmlns:m="http://schemas.openxmlformats.org/officeDocument/2006/math" xmlns="" val="1"/>
             </a:ext>
           </a:extLst>
         </p:spPr>
@@ -15883,7 +15837,7 @@
           </a:ln>
           <a:extLst>
             <a:ext uri="{C572A759-6A51-4108-AA02-DFA0A04FC94B}">
-              <ma14:wrappingTextBoxFlag xmlns="" xmlns:m="http://schemas.openxmlformats.org/officeDocument/2006/math" xmlns:a14="http://schemas.microsoft.com/office/drawing/2010/main" xmlns:ma14="http://schemas.microsoft.com/office/mac/drawingml/2011/main" val="1"/>
+              <ma14:wrappingTextBoxFlag xmlns:ma14="http://schemas.microsoft.com/office/mac/drawingml/2011/main" xmlns:a14="http://schemas.microsoft.com/office/drawing/2010/main" xmlns:m="http://schemas.openxmlformats.org/officeDocument/2006/math" xmlns="" val="1"/>
             </a:ext>
           </a:extLst>
         </p:spPr>
@@ -15971,7 +15925,7 @@
           </a:ln>
           <a:extLst>
             <a:ext uri="{C572A759-6A51-4108-AA02-DFA0A04FC94B}">
-              <ma14:wrappingTextBoxFlag xmlns="" xmlns:m="http://schemas.openxmlformats.org/officeDocument/2006/math" xmlns:a14="http://schemas.microsoft.com/office/drawing/2010/main" xmlns:ma14="http://schemas.microsoft.com/office/mac/drawingml/2011/main" val="1"/>
+              <ma14:wrappingTextBoxFlag xmlns:ma14="http://schemas.microsoft.com/office/mac/drawingml/2011/main" xmlns:a14="http://schemas.microsoft.com/office/drawing/2010/main" xmlns:m="http://schemas.openxmlformats.org/officeDocument/2006/math" xmlns="" val="1"/>
             </a:ext>
           </a:extLst>
         </p:spPr>
@@ -16103,7 +16057,7 @@
           </a:ln>
           <a:extLst>
             <a:ext uri="{C572A759-6A51-4108-AA02-DFA0A04FC94B}">
-              <ma14:wrappingTextBoxFlag xmlns="" xmlns:m="http://schemas.openxmlformats.org/officeDocument/2006/math" xmlns:a14="http://schemas.microsoft.com/office/drawing/2010/main" xmlns:ma14="http://schemas.microsoft.com/office/mac/drawingml/2011/main" val="1"/>
+              <ma14:wrappingTextBoxFlag xmlns:ma14="http://schemas.microsoft.com/office/mac/drawingml/2011/main" xmlns:a14="http://schemas.microsoft.com/office/drawing/2010/main" xmlns:m="http://schemas.openxmlformats.org/officeDocument/2006/math" xmlns="" val="1"/>
             </a:ext>
           </a:extLst>
         </p:spPr>
@@ -16193,7 +16147,7 @@
           </a:ln>
           <a:extLst>
             <a:ext uri="{C572A759-6A51-4108-AA02-DFA0A04FC94B}">
-              <ma14:wrappingTextBoxFlag xmlns="" xmlns:m="http://schemas.openxmlformats.org/officeDocument/2006/math" xmlns:a14="http://schemas.microsoft.com/office/drawing/2010/main" xmlns:ma14="http://schemas.microsoft.com/office/mac/drawingml/2011/main" val="1"/>
+              <ma14:wrappingTextBoxFlag xmlns:ma14="http://schemas.microsoft.com/office/mac/drawingml/2011/main" xmlns:a14="http://schemas.microsoft.com/office/drawing/2010/main" xmlns:m="http://schemas.openxmlformats.org/officeDocument/2006/math" xmlns="" val="1"/>
             </a:ext>
           </a:extLst>
         </p:spPr>
@@ -16337,7 +16291,7 @@
           </a:ln>
           <a:extLst>
             <a:ext uri="{C572A759-6A51-4108-AA02-DFA0A04FC94B}">
-              <ma14:wrappingTextBoxFlag xmlns="" xmlns:m="http://schemas.openxmlformats.org/officeDocument/2006/math" xmlns:a14="http://schemas.microsoft.com/office/drawing/2010/main" xmlns:ma14="http://schemas.microsoft.com/office/mac/drawingml/2011/main" val="1"/>
+              <ma14:wrappingTextBoxFlag xmlns:ma14="http://schemas.microsoft.com/office/mac/drawingml/2011/main" xmlns:a14="http://schemas.microsoft.com/office/drawing/2010/main" xmlns:m="http://schemas.openxmlformats.org/officeDocument/2006/math" xmlns="" val="1"/>
             </a:ext>
           </a:extLst>
         </p:spPr>
@@ -16379,7 +16333,7 @@
           </a:ln>
           <a:extLst>
             <a:ext uri="{C572A759-6A51-4108-AA02-DFA0A04FC94B}">
-              <ma14:wrappingTextBoxFlag xmlns="" xmlns:m="http://schemas.openxmlformats.org/officeDocument/2006/math" xmlns:a14="http://schemas.microsoft.com/office/drawing/2010/main" xmlns:ma14="http://schemas.microsoft.com/office/mac/drawingml/2011/main" val="1"/>
+              <ma14:wrappingTextBoxFlag xmlns:ma14="http://schemas.microsoft.com/office/mac/drawingml/2011/main" xmlns:a14="http://schemas.microsoft.com/office/drawing/2010/main" xmlns:m="http://schemas.openxmlformats.org/officeDocument/2006/math" xmlns="" val="1"/>
             </a:ext>
           </a:extLst>
         </p:spPr>
@@ -16542,7 +16496,7 @@
           </a:ln>
           <a:extLst>
             <a:ext uri="{C572A759-6A51-4108-AA02-DFA0A04FC94B}">
-              <ma14:wrappingTextBoxFlag xmlns="" xmlns:m="http://schemas.openxmlformats.org/officeDocument/2006/math" xmlns:a14="http://schemas.microsoft.com/office/drawing/2010/main" xmlns:ma14="http://schemas.microsoft.com/office/mac/drawingml/2011/main" val="1"/>
+              <ma14:wrappingTextBoxFlag xmlns:ma14="http://schemas.microsoft.com/office/mac/drawingml/2011/main" xmlns:a14="http://schemas.microsoft.com/office/drawing/2010/main" xmlns:m="http://schemas.openxmlformats.org/officeDocument/2006/math" xmlns="" val="1"/>
             </a:ext>
           </a:extLst>
         </p:spPr>
@@ -16584,7 +16538,7 @@
           </a:ln>
           <a:extLst>
             <a:ext uri="{C572A759-6A51-4108-AA02-DFA0A04FC94B}">
-              <ma14:wrappingTextBoxFlag xmlns="" xmlns:m="http://schemas.openxmlformats.org/officeDocument/2006/math" xmlns:a14="http://schemas.microsoft.com/office/drawing/2010/main" xmlns:ma14="http://schemas.microsoft.com/office/mac/drawingml/2011/main" val="1"/>
+              <ma14:wrappingTextBoxFlag xmlns:ma14="http://schemas.microsoft.com/office/mac/drawingml/2011/main" xmlns:a14="http://schemas.microsoft.com/office/drawing/2010/main" xmlns:m="http://schemas.openxmlformats.org/officeDocument/2006/math" xmlns="" val="1"/>
             </a:ext>
           </a:extLst>
         </p:spPr>
@@ -16699,7 +16653,7 @@
           </a:ln>
           <a:extLst>
             <a:ext uri="{C572A759-6A51-4108-AA02-DFA0A04FC94B}">
-              <ma14:wrappingTextBoxFlag xmlns="" xmlns:m="http://schemas.openxmlformats.org/officeDocument/2006/math" xmlns:a14="http://schemas.microsoft.com/office/drawing/2010/main" xmlns:ma14="http://schemas.microsoft.com/office/mac/drawingml/2011/main" val="1"/>
+              <ma14:wrappingTextBoxFlag xmlns:ma14="http://schemas.microsoft.com/office/mac/drawingml/2011/main" xmlns:a14="http://schemas.microsoft.com/office/drawing/2010/main" xmlns:m="http://schemas.openxmlformats.org/officeDocument/2006/math" xmlns="" val="1"/>
             </a:ext>
           </a:extLst>
         </p:spPr>
@@ -16803,7 +16757,7 @@
           </a:ln>
           <a:extLst>
             <a:ext uri="{C572A759-6A51-4108-AA02-DFA0A04FC94B}">
-              <ma14:wrappingTextBoxFlag xmlns="" xmlns:m="http://schemas.openxmlformats.org/officeDocument/2006/math" xmlns:a14="http://schemas.microsoft.com/office/drawing/2010/main" xmlns:ma14="http://schemas.microsoft.com/office/mac/drawingml/2011/main" val="1"/>
+              <ma14:wrappingTextBoxFlag xmlns:ma14="http://schemas.microsoft.com/office/mac/drawingml/2011/main" xmlns:a14="http://schemas.microsoft.com/office/drawing/2010/main" xmlns:m="http://schemas.openxmlformats.org/officeDocument/2006/math" xmlns="" val="1"/>
             </a:ext>
           </a:extLst>
         </p:spPr>
@@ -16845,7 +16799,7 @@
           </a:ln>
           <a:extLst>
             <a:ext uri="{C572A759-6A51-4108-AA02-DFA0A04FC94B}">
-              <ma14:wrappingTextBoxFlag xmlns="" xmlns:m="http://schemas.openxmlformats.org/officeDocument/2006/math" xmlns:a14="http://schemas.microsoft.com/office/drawing/2010/main" xmlns:ma14="http://schemas.microsoft.com/office/mac/drawingml/2011/main" val="1"/>
+              <ma14:wrappingTextBoxFlag xmlns:ma14="http://schemas.microsoft.com/office/mac/drawingml/2011/main" xmlns:a14="http://schemas.microsoft.com/office/drawing/2010/main" xmlns:m="http://schemas.openxmlformats.org/officeDocument/2006/math" xmlns="" val="1"/>
             </a:ext>
           </a:extLst>
         </p:spPr>
@@ -17127,7 +17081,7 @@
           </a:ln>
           <a:extLst>
             <a:ext uri="{C572A759-6A51-4108-AA02-DFA0A04FC94B}">
-              <ma14:wrappingTextBoxFlag xmlns="" xmlns:m="http://schemas.openxmlformats.org/officeDocument/2006/math" xmlns:a14="http://schemas.microsoft.com/office/drawing/2010/main" xmlns:ma14="http://schemas.microsoft.com/office/mac/drawingml/2011/main" val="1"/>
+              <ma14:wrappingTextBoxFlag xmlns:ma14="http://schemas.microsoft.com/office/mac/drawingml/2011/main" xmlns:a14="http://schemas.microsoft.com/office/drawing/2010/main" xmlns:m="http://schemas.openxmlformats.org/officeDocument/2006/math" xmlns="" val="1"/>
             </a:ext>
           </a:extLst>
         </p:spPr>
@@ -17265,7 +17219,7 @@
           </a:ln>
           <a:extLst>
             <a:ext uri="{C572A759-6A51-4108-AA02-DFA0A04FC94B}">
-              <ma14:wrappingTextBoxFlag xmlns="" xmlns:m="http://schemas.openxmlformats.org/officeDocument/2006/math" xmlns:a14="http://schemas.microsoft.com/office/drawing/2010/main" xmlns:ma14="http://schemas.microsoft.com/office/mac/drawingml/2011/main" val="1"/>
+              <ma14:wrappingTextBoxFlag xmlns:ma14="http://schemas.microsoft.com/office/mac/drawingml/2011/main" xmlns:a14="http://schemas.microsoft.com/office/drawing/2010/main" xmlns:m="http://schemas.openxmlformats.org/officeDocument/2006/math" xmlns="" val="1"/>
             </a:ext>
           </a:extLst>
         </p:spPr>
@@ -17355,7 +17309,7 @@
           </a:ln>
           <a:extLst>
             <a:ext uri="{C572A759-6A51-4108-AA02-DFA0A04FC94B}">
-              <ma14:wrappingTextBoxFlag xmlns="" xmlns:m="http://schemas.openxmlformats.org/officeDocument/2006/math" xmlns:a14="http://schemas.microsoft.com/office/drawing/2010/main" xmlns:ma14="http://schemas.microsoft.com/office/mac/drawingml/2011/main" val="1"/>
+              <ma14:wrappingTextBoxFlag xmlns:ma14="http://schemas.microsoft.com/office/mac/drawingml/2011/main" xmlns:a14="http://schemas.microsoft.com/office/drawing/2010/main" xmlns:m="http://schemas.openxmlformats.org/officeDocument/2006/math" xmlns="" val="1"/>
             </a:ext>
           </a:extLst>
         </p:spPr>
@@ -17397,7 +17351,7 @@
           </a:ln>
           <a:extLst>
             <a:ext uri="{C572A759-6A51-4108-AA02-DFA0A04FC94B}">
-              <ma14:wrappingTextBoxFlag xmlns="" xmlns:m="http://schemas.openxmlformats.org/officeDocument/2006/math" xmlns:a14="http://schemas.microsoft.com/office/drawing/2010/main" xmlns:ma14="http://schemas.microsoft.com/office/mac/drawingml/2011/main" val="1"/>
+              <ma14:wrappingTextBoxFlag xmlns:ma14="http://schemas.microsoft.com/office/mac/drawingml/2011/main" xmlns:a14="http://schemas.microsoft.com/office/drawing/2010/main" xmlns:m="http://schemas.openxmlformats.org/officeDocument/2006/math" xmlns="" val="1"/>
             </a:ext>
           </a:extLst>
         </p:spPr>
@@ -17760,7 +17714,7 @@
           </a:ln>
           <a:extLst>
             <a:ext uri="{C572A759-6A51-4108-AA02-DFA0A04FC94B}">
-              <ma14:wrappingTextBoxFlag xmlns="" xmlns:m="http://schemas.openxmlformats.org/officeDocument/2006/math" xmlns:a14="http://schemas.microsoft.com/office/drawing/2010/main" xmlns:ma14="http://schemas.microsoft.com/office/mac/drawingml/2011/main" val="1"/>
+              <ma14:wrappingTextBoxFlag xmlns:ma14="http://schemas.microsoft.com/office/mac/drawingml/2011/main" xmlns:a14="http://schemas.microsoft.com/office/drawing/2010/main" xmlns:m="http://schemas.openxmlformats.org/officeDocument/2006/math" xmlns="" val="1"/>
             </a:ext>
           </a:extLst>
         </p:spPr>
@@ -19354,7 +19308,7 @@
           </a:ln>
           <a:extLst>
             <a:ext uri="{C572A759-6A51-4108-AA02-DFA0A04FC94B}">
-              <ma14:wrappingTextBoxFlag xmlns="" xmlns:m="http://schemas.openxmlformats.org/officeDocument/2006/math" xmlns:a14="http://schemas.microsoft.com/office/drawing/2010/main" xmlns:ma14="http://schemas.microsoft.com/office/mac/drawingml/2011/main" val="1"/>
+              <ma14:wrappingTextBoxFlag xmlns:ma14="http://schemas.microsoft.com/office/mac/drawingml/2011/main" xmlns:a14="http://schemas.microsoft.com/office/drawing/2010/main" xmlns:m="http://schemas.openxmlformats.org/officeDocument/2006/math" xmlns="" val="1"/>
             </a:ext>
           </a:extLst>
         </p:spPr>
@@ -21944,7 +21898,7 @@
           </a:ln>
           <a:extLst>
             <a:ext uri="{C572A759-6A51-4108-AA02-DFA0A04FC94B}">
-              <ma14:wrappingTextBoxFlag xmlns="" xmlns:m="http://schemas.openxmlformats.org/officeDocument/2006/math" xmlns:a14="http://schemas.microsoft.com/office/drawing/2010/main" xmlns:ma14="http://schemas.microsoft.com/office/mac/drawingml/2011/main" val="1"/>
+              <ma14:wrappingTextBoxFlag xmlns:ma14="http://schemas.microsoft.com/office/mac/drawingml/2011/main" xmlns:a14="http://schemas.microsoft.com/office/drawing/2010/main" xmlns:m="http://schemas.openxmlformats.org/officeDocument/2006/math" xmlns="" val="1"/>
             </a:ext>
           </a:extLst>
         </p:spPr>
@@ -22164,7 +22118,7 @@
           </a:ln>
           <a:extLst>
             <a:ext uri="{C572A759-6A51-4108-AA02-DFA0A04FC94B}">
-              <ma14:wrappingTextBoxFlag xmlns="" xmlns:m="http://schemas.openxmlformats.org/officeDocument/2006/math" xmlns:a14="http://schemas.microsoft.com/office/drawing/2010/main" xmlns:ma14="http://schemas.microsoft.com/office/mac/drawingml/2011/main" val="1"/>
+              <ma14:wrappingTextBoxFlag xmlns:ma14="http://schemas.microsoft.com/office/mac/drawingml/2011/main" xmlns:a14="http://schemas.microsoft.com/office/drawing/2010/main" xmlns:m="http://schemas.openxmlformats.org/officeDocument/2006/math" xmlns="" val="1"/>
             </a:ext>
           </a:extLst>
         </p:spPr>
@@ -23302,7 +23256,7 @@
           </a:ln>
           <a:extLst>
             <a:ext uri="{C572A759-6A51-4108-AA02-DFA0A04FC94B}">
-              <ma14:wrappingTextBoxFlag xmlns="" xmlns:m="http://schemas.openxmlformats.org/officeDocument/2006/math" xmlns:a14="http://schemas.microsoft.com/office/drawing/2010/main" xmlns:ma14="http://schemas.microsoft.com/office/mac/drawingml/2011/main" val="1"/>
+              <ma14:wrappingTextBoxFlag xmlns:ma14="http://schemas.microsoft.com/office/mac/drawingml/2011/main" xmlns:a14="http://schemas.microsoft.com/office/drawing/2010/main" xmlns:m="http://schemas.openxmlformats.org/officeDocument/2006/math" xmlns="" val="1"/>
             </a:ext>
           </a:extLst>
         </p:spPr>
@@ -23390,7 +23344,7 @@
           </a:ln>
           <a:extLst>
             <a:ext uri="{C572A759-6A51-4108-AA02-DFA0A04FC94B}">
-              <ma14:wrappingTextBoxFlag xmlns="" xmlns:m="http://schemas.openxmlformats.org/officeDocument/2006/math" xmlns:a14="http://schemas.microsoft.com/office/drawing/2010/main" xmlns:ma14="http://schemas.microsoft.com/office/mac/drawingml/2011/main" val="1"/>
+              <ma14:wrappingTextBoxFlag xmlns:ma14="http://schemas.microsoft.com/office/mac/drawingml/2011/main" xmlns:a14="http://schemas.microsoft.com/office/drawing/2010/main" xmlns:m="http://schemas.openxmlformats.org/officeDocument/2006/math" xmlns="" val="1"/>
             </a:ext>
           </a:extLst>
         </p:spPr>
@@ -23466,7 +23420,7 @@
           </a:ln>
           <a:extLst>
             <a:ext uri="{C572A759-6A51-4108-AA02-DFA0A04FC94B}">
-              <ma14:wrappingTextBoxFlag xmlns="" xmlns:m="http://schemas.openxmlformats.org/officeDocument/2006/math" xmlns:a14="http://schemas.microsoft.com/office/drawing/2010/main" xmlns:ma14="http://schemas.microsoft.com/office/mac/drawingml/2011/main" val="1"/>
+              <ma14:wrappingTextBoxFlag xmlns:ma14="http://schemas.microsoft.com/office/mac/drawingml/2011/main" xmlns:a14="http://schemas.microsoft.com/office/drawing/2010/main" xmlns:m="http://schemas.openxmlformats.org/officeDocument/2006/math" xmlns="" val="1"/>
             </a:ext>
           </a:extLst>
         </p:spPr>
@@ -25758,7 +25712,7 @@
           </a:ln>
           <a:extLst>
             <a:ext uri="{C572A759-6A51-4108-AA02-DFA0A04FC94B}">
-              <ma14:wrappingTextBoxFlag xmlns="" xmlns:m="http://schemas.openxmlformats.org/officeDocument/2006/math" xmlns:a14="http://schemas.microsoft.com/office/drawing/2010/main" xmlns:ma14="http://schemas.microsoft.com/office/mac/drawingml/2011/main" val="1"/>
+              <ma14:wrappingTextBoxFlag xmlns:ma14="http://schemas.microsoft.com/office/mac/drawingml/2011/main" xmlns:a14="http://schemas.microsoft.com/office/drawing/2010/main" xmlns:m="http://schemas.openxmlformats.org/officeDocument/2006/math" xmlns="" val="1"/>
             </a:ext>
           </a:extLst>
         </p:spPr>
@@ -25840,7 +25794,7 @@
           </a:ln>
           <a:extLst>
             <a:ext uri="{C572A759-6A51-4108-AA02-DFA0A04FC94B}">
-              <ma14:wrappingTextBoxFlag xmlns="" xmlns:m="http://schemas.openxmlformats.org/officeDocument/2006/math" xmlns:a14="http://schemas.microsoft.com/office/drawing/2010/main" xmlns:ma14="http://schemas.microsoft.com/office/mac/drawingml/2011/main" val="1"/>
+              <ma14:wrappingTextBoxFlag xmlns:ma14="http://schemas.microsoft.com/office/mac/drawingml/2011/main" xmlns:a14="http://schemas.microsoft.com/office/drawing/2010/main" xmlns:m="http://schemas.openxmlformats.org/officeDocument/2006/math" xmlns="" val="1"/>
             </a:ext>
           </a:extLst>
         </p:spPr>
@@ -25876,7 +25830,7 @@
           </a:ln>
           <a:extLst>
             <a:ext uri="{C572A759-6A51-4108-AA02-DFA0A04FC94B}">
-              <ma14:wrappingTextBoxFlag xmlns="" xmlns:m="http://schemas.openxmlformats.org/officeDocument/2006/math" xmlns:a14="http://schemas.microsoft.com/office/drawing/2010/main" xmlns:ma14="http://schemas.microsoft.com/office/mac/drawingml/2011/main" val="1"/>
+              <ma14:wrappingTextBoxFlag xmlns:ma14="http://schemas.microsoft.com/office/mac/drawingml/2011/main" xmlns:a14="http://schemas.microsoft.com/office/drawing/2010/main" xmlns:m="http://schemas.openxmlformats.org/officeDocument/2006/math" xmlns="" val="1"/>
             </a:ext>
           </a:extLst>
         </p:spPr>
@@ -25912,7 +25866,7 @@
           </a:ln>
           <a:extLst>
             <a:ext uri="{C572A759-6A51-4108-AA02-DFA0A04FC94B}">
-              <ma14:wrappingTextBoxFlag xmlns="" xmlns:m="http://schemas.openxmlformats.org/officeDocument/2006/math" xmlns:a14="http://schemas.microsoft.com/office/drawing/2010/main" xmlns:ma14="http://schemas.microsoft.com/office/mac/drawingml/2011/main" val="1"/>
+              <ma14:wrappingTextBoxFlag xmlns:ma14="http://schemas.microsoft.com/office/mac/drawingml/2011/main" xmlns:a14="http://schemas.microsoft.com/office/drawing/2010/main" xmlns:m="http://schemas.openxmlformats.org/officeDocument/2006/math" xmlns="" val="1"/>
             </a:ext>
           </a:extLst>
         </p:spPr>
@@ -26131,7 +26085,7 @@
           </a:ln>
           <a:extLst>
             <a:ext uri="{C572A759-6A51-4108-AA02-DFA0A04FC94B}">
-              <ma14:wrappingTextBoxFlag xmlns="" xmlns:m="http://schemas.openxmlformats.org/officeDocument/2006/math" xmlns:a14="http://schemas.microsoft.com/office/drawing/2010/main" xmlns:ma14="http://schemas.microsoft.com/office/mac/drawingml/2011/main" val="1"/>
+              <ma14:wrappingTextBoxFlag xmlns:ma14="http://schemas.microsoft.com/office/mac/drawingml/2011/main" xmlns:a14="http://schemas.microsoft.com/office/drawing/2010/main" xmlns:m="http://schemas.openxmlformats.org/officeDocument/2006/math" xmlns="" val="1"/>
             </a:ext>
           </a:extLst>
         </p:spPr>

</xml_diff>